<commit_message>
added base infos to pptx
</commit_message>
<xml_diff>
--- a/Vortragsfolien.pptx
+++ b/Vortragsfolien.pptx
@@ -5,14 +5,27 @@
     <p:sldMasterId id="2147483696" r:id="rId1"/>
   </p:sldMasterIdLst>
   <p:notesMasterIdLst>
-    <p:notesMasterId r:id="rId4"/>
+    <p:notesMasterId r:id="rId17"/>
   </p:notesMasterIdLst>
   <p:handoutMasterIdLst>
-    <p:handoutMasterId r:id="rId5"/>
+    <p:handoutMasterId r:id="rId18"/>
   </p:handoutMasterIdLst>
   <p:sldIdLst>
     <p:sldId id="256" r:id="rId2"/>
     <p:sldId id="262" r:id="rId3"/>
+    <p:sldId id="263" r:id="rId4"/>
+    <p:sldId id="264" r:id="rId5"/>
+    <p:sldId id="274" r:id="rId6"/>
+    <p:sldId id="265" r:id="rId7"/>
+    <p:sldId id="270" r:id="rId8"/>
+    <p:sldId id="271" r:id="rId9"/>
+    <p:sldId id="272" r:id="rId10"/>
+    <p:sldId id="266" r:id="rId11"/>
+    <p:sldId id="267" r:id="rId12"/>
+    <p:sldId id="268" r:id="rId13"/>
+    <p:sldId id="269" r:id="rId14"/>
+    <p:sldId id="273" r:id="rId15"/>
+    <p:sldId id="275" r:id="rId16"/>
   </p:sldIdLst>
   <p:sldSz cx="9144000" cy="6858000" type="screen4x3"/>
   <p:notesSz cx="6797675" cy="9926638"/>
@@ -114,6 +127,9 @@
   <p:extLst>
     <p:ext uri="{EFAFB233-063F-42B5-8137-9DF3F51BA10A}">
       <p15:sldGuideLst xmlns:p15="http://schemas.microsoft.com/office/powerpoint/2012/main"/>
+    </p:ext>
+    <p:ext uri="{2D200454-40CA-4A62-9FC3-DE9A4176ACB9}">
+      <p15:notesGuideLst xmlns:p15="http://schemas.microsoft.com/office/powerpoint/2012/main"/>
     </p:ext>
   </p:extLst>
 </p:presentation>
@@ -705,7 +721,7 @@
               <a:rPr lang="en-GB" smtClean="0"/>
               <a:t>1</a:t>
             </a:fld>
-            <a:endParaRPr lang="en-GB"/>
+            <a:endParaRPr lang="en-GB" dirty="0"/>
           </a:p>
         </p:txBody>
       </p:sp>
@@ -713,6 +729,510 @@
     <p:extLst>
       <p:ext uri="{BB962C8B-B14F-4D97-AF65-F5344CB8AC3E}">
         <p14:creationId xmlns:p14="http://schemas.microsoft.com/office/powerpoint/2010/main" val="1184616151"/>
+      </p:ext>
+    </p:extLst>
+  </p:cSld>
+  <p:clrMapOvr>
+    <a:masterClrMapping/>
+  </p:clrMapOvr>
+</p:notes>
+</file>
+
+<file path=ppt/notesSlides/notesSlide10.xml><?xml version="1.0" encoding="utf-8"?>
+<p:notes xmlns:a="http://schemas.openxmlformats.org/drawingml/2006/main" xmlns:r="http://schemas.openxmlformats.org/officeDocument/2006/relationships" xmlns:p="http://schemas.openxmlformats.org/presentationml/2006/main">
+  <p:cSld>
+    <p:spTree>
+      <p:nvGrpSpPr>
+        <p:cNvPr id="1" name=""/>
+        <p:cNvGrpSpPr/>
+        <p:nvPr/>
+      </p:nvGrpSpPr>
+      <p:grpSpPr>
+        <a:xfrm>
+          <a:off x="0" y="0"/>
+          <a:ext cx="0" cy="0"/>
+          <a:chOff x="0" y="0"/>
+          <a:chExt cx="0" cy="0"/>
+        </a:xfrm>
+      </p:grpSpPr>
+      <p:sp>
+        <p:nvSpPr>
+          <p:cNvPr id="2" name="Folienbildplatzhalter 1"/>
+          <p:cNvSpPr>
+            <a:spLocks noGrp="1" noRot="1" noChangeAspect="1"/>
+          </p:cNvSpPr>
+          <p:nvPr>
+            <p:ph type="sldImg"/>
+          </p:nvPr>
+        </p:nvSpPr>
+        <p:spPr/>
+      </p:sp>
+      <p:sp>
+        <p:nvSpPr>
+          <p:cNvPr id="3" name="Notizenplatzhalter 2"/>
+          <p:cNvSpPr>
+            <a:spLocks noGrp="1"/>
+          </p:cNvSpPr>
+          <p:nvPr>
+            <p:ph type="body" idx="1"/>
+          </p:nvPr>
+        </p:nvSpPr>
+        <p:spPr/>
+        <p:txBody>
+          <a:bodyPr/>
+          <a:lstStyle/>
+          <a:p>
+            <a:endParaRPr lang="en-GB"/>
+          </a:p>
+        </p:txBody>
+      </p:sp>
+      <p:sp>
+        <p:nvSpPr>
+          <p:cNvPr id="4" name="Foliennummernplatzhalter 3"/>
+          <p:cNvSpPr>
+            <a:spLocks noGrp="1"/>
+          </p:cNvSpPr>
+          <p:nvPr>
+            <p:ph type="sldNum" sz="quarter" idx="10"/>
+          </p:nvPr>
+        </p:nvSpPr>
+        <p:spPr/>
+        <p:txBody>
+          <a:bodyPr/>
+          <a:lstStyle/>
+          <a:p>
+            <a:fld id="{0250CB43-5682-4E83-A1E5-9760697AEC77}" type="slidenum">
+              <a:rPr lang="en-GB" smtClean="0"/>
+              <a:t>10</a:t>
+            </a:fld>
+            <a:endParaRPr lang="en-GB"/>
+          </a:p>
+        </p:txBody>
+      </p:sp>
+    </p:spTree>
+    <p:extLst>
+      <p:ext uri="{BB962C8B-B14F-4D97-AF65-F5344CB8AC3E}">
+        <p14:creationId xmlns:p14="http://schemas.microsoft.com/office/powerpoint/2010/main" val="1832947796"/>
+      </p:ext>
+    </p:extLst>
+  </p:cSld>
+  <p:clrMapOvr>
+    <a:masterClrMapping/>
+  </p:clrMapOvr>
+</p:notes>
+</file>
+
+<file path=ppt/notesSlides/notesSlide11.xml><?xml version="1.0" encoding="utf-8"?>
+<p:notes xmlns:a="http://schemas.openxmlformats.org/drawingml/2006/main" xmlns:r="http://schemas.openxmlformats.org/officeDocument/2006/relationships" xmlns:p="http://schemas.openxmlformats.org/presentationml/2006/main">
+  <p:cSld>
+    <p:spTree>
+      <p:nvGrpSpPr>
+        <p:cNvPr id="1" name=""/>
+        <p:cNvGrpSpPr/>
+        <p:nvPr/>
+      </p:nvGrpSpPr>
+      <p:grpSpPr>
+        <a:xfrm>
+          <a:off x="0" y="0"/>
+          <a:ext cx="0" cy="0"/>
+          <a:chOff x="0" y="0"/>
+          <a:chExt cx="0" cy="0"/>
+        </a:xfrm>
+      </p:grpSpPr>
+      <p:sp>
+        <p:nvSpPr>
+          <p:cNvPr id="2" name="Folienbildplatzhalter 1"/>
+          <p:cNvSpPr>
+            <a:spLocks noGrp="1" noRot="1" noChangeAspect="1"/>
+          </p:cNvSpPr>
+          <p:nvPr>
+            <p:ph type="sldImg"/>
+          </p:nvPr>
+        </p:nvSpPr>
+        <p:spPr/>
+      </p:sp>
+      <p:sp>
+        <p:nvSpPr>
+          <p:cNvPr id="3" name="Notizenplatzhalter 2"/>
+          <p:cNvSpPr>
+            <a:spLocks noGrp="1"/>
+          </p:cNvSpPr>
+          <p:nvPr>
+            <p:ph type="body" idx="1"/>
+          </p:nvPr>
+        </p:nvSpPr>
+        <p:spPr/>
+        <p:txBody>
+          <a:bodyPr/>
+          <a:lstStyle/>
+          <a:p>
+            <a:endParaRPr lang="en-GB"/>
+          </a:p>
+        </p:txBody>
+      </p:sp>
+      <p:sp>
+        <p:nvSpPr>
+          <p:cNvPr id="4" name="Foliennummernplatzhalter 3"/>
+          <p:cNvSpPr>
+            <a:spLocks noGrp="1"/>
+          </p:cNvSpPr>
+          <p:nvPr>
+            <p:ph type="sldNum" sz="quarter" idx="10"/>
+          </p:nvPr>
+        </p:nvSpPr>
+        <p:spPr/>
+        <p:txBody>
+          <a:bodyPr/>
+          <a:lstStyle/>
+          <a:p>
+            <a:fld id="{0250CB43-5682-4E83-A1E5-9760697AEC77}" type="slidenum">
+              <a:rPr lang="en-GB" smtClean="0"/>
+              <a:t>11</a:t>
+            </a:fld>
+            <a:endParaRPr lang="en-GB"/>
+          </a:p>
+        </p:txBody>
+      </p:sp>
+    </p:spTree>
+    <p:extLst>
+      <p:ext uri="{BB962C8B-B14F-4D97-AF65-F5344CB8AC3E}">
+        <p14:creationId xmlns:p14="http://schemas.microsoft.com/office/powerpoint/2010/main" val="4262897057"/>
+      </p:ext>
+    </p:extLst>
+  </p:cSld>
+  <p:clrMapOvr>
+    <a:masterClrMapping/>
+  </p:clrMapOvr>
+</p:notes>
+</file>
+
+<file path=ppt/notesSlides/notesSlide12.xml><?xml version="1.0" encoding="utf-8"?>
+<p:notes xmlns:a="http://schemas.openxmlformats.org/drawingml/2006/main" xmlns:r="http://schemas.openxmlformats.org/officeDocument/2006/relationships" xmlns:p="http://schemas.openxmlformats.org/presentationml/2006/main">
+  <p:cSld>
+    <p:spTree>
+      <p:nvGrpSpPr>
+        <p:cNvPr id="1" name=""/>
+        <p:cNvGrpSpPr/>
+        <p:nvPr/>
+      </p:nvGrpSpPr>
+      <p:grpSpPr>
+        <a:xfrm>
+          <a:off x="0" y="0"/>
+          <a:ext cx="0" cy="0"/>
+          <a:chOff x="0" y="0"/>
+          <a:chExt cx="0" cy="0"/>
+        </a:xfrm>
+      </p:grpSpPr>
+      <p:sp>
+        <p:nvSpPr>
+          <p:cNvPr id="2" name="Folienbildplatzhalter 1"/>
+          <p:cNvSpPr>
+            <a:spLocks noGrp="1" noRot="1" noChangeAspect="1"/>
+          </p:cNvSpPr>
+          <p:nvPr>
+            <p:ph type="sldImg"/>
+          </p:nvPr>
+        </p:nvSpPr>
+        <p:spPr/>
+      </p:sp>
+      <p:sp>
+        <p:nvSpPr>
+          <p:cNvPr id="3" name="Notizenplatzhalter 2"/>
+          <p:cNvSpPr>
+            <a:spLocks noGrp="1"/>
+          </p:cNvSpPr>
+          <p:nvPr>
+            <p:ph type="body" idx="1"/>
+          </p:nvPr>
+        </p:nvSpPr>
+        <p:spPr/>
+        <p:txBody>
+          <a:bodyPr/>
+          <a:lstStyle/>
+          <a:p>
+            <a:endParaRPr lang="en-GB"/>
+          </a:p>
+        </p:txBody>
+      </p:sp>
+      <p:sp>
+        <p:nvSpPr>
+          <p:cNvPr id="4" name="Foliennummernplatzhalter 3"/>
+          <p:cNvSpPr>
+            <a:spLocks noGrp="1"/>
+          </p:cNvSpPr>
+          <p:nvPr>
+            <p:ph type="sldNum" sz="quarter" idx="10"/>
+          </p:nvPr>
+        </p:nvSpPr>
+        <p:spPr/>
+        <p:txBody>
+          <a:bodyPr/>
+          <a:lstStyle/>
+          <a:p>
+            <a:fld id="{0250CB43-5682-4E83-A1E5-9760697AEC77}" type="slidenum">
+              <a:rPr lang="en-GB" smtClean="0"/>
+              <a:t>12</a:t>
+            </a:fld>
+            <a:endParaRPr lang="en-GB"/>
+          </a:p>
+        </p:txBody>
+      </p:sp>
+    </p:spTree>
+    <p:extLst>
+      <p:ext uri="{BB962C8B-B14F-4D97-AF65-F5344CB8AC3E}">
+        <p14:creationId xmlns:p14="http://schemas.microsoft.com/office/powerpoint/2010/main" val="492304999"/>
+      </p:ext>
+    </p:extLst>
+  </p:cSld>
+  <p:clrMapOvr>
+    <a:masterClrMapping/>
+  </p:clrMapOvr>
+</p:notes>
+</file>
+
+<file path=ppt/notesSlides/notesSlide13.xml><?xml version="1.0" encoding="utf-8"?>
+<p:notes xmlns:a="http://schemas.openxmlformats.org/drawingml/2006/main" xmlns:r="http://schemas.openxmlformats.org/officeDocument/2006/relationships" xmlns:p="http://schemas.openxmlformats.org/presentationml/2006/main">
+  <p:cSld>
+    <p:spTree>
+      <p:nvGrpSpPr>
+        <p:cNvPr id="1" name=""/>
+        <p:cNvGrpSpPr/>
+        <p:nvPr/>
+      </p:nvGrpSpPr>
+      <p:grpSpPr>
+        <a:xfrm>
+          <a:off x="0" y="0"/>
+          <a:ext cx="0" cy="0"/>
+          <a:chOff x="0" y="0"/>
+          <a:chExt cx="0" cy="0"/>
+        </a:xfrm>
+      </p:grpSpPr>
+      <p:sp>
+        <p:nvSpPr>
+          <p:cNvPr id="2" name="Folienbildplatzhalter 1"/>
+          <p:cNvSpPr>
+            <a:spLocks noGrp="1" noRot="1" noChangeAspect="1"/>
+          </p:cNvSpPr>
+          <p:nvPr>
+            <p:ph type="sldImg"/>
+          </p:nvPr>
+        </p:nvSpPr>
+        <p:spPr/>
+      </p:sp>
+      <p:sp>
+        <p:nvSpPr>
+          <p:cNvPr id="3" name="Notizenplatzhalter 2"/>
+          <p:cNvSpPr>
+            <a:spLocks noGrp="1"/>
+          </p:cNvSpPr>
+          <p:nvPr>
+            <p:ph type="body" idx="1"/>
+          </p:nvPr>
+        </p:nvSpPr>
+        <p:spPr/>
+        <p:txBody>
+          <a:bodyPr/>
+          <a:lstStyle/>
+          <a:p>
+            <a:endParaRPr lang="en-GB"/>
+          </a:p>
+        </p:txBody>
+      </p:sp>
+      <p:sp>
+        <p:nvSpPr>
+          <p:cNvPr id="4" name="Foliennummernplatzhalter 3"/>
+          <p:cNvSpPr>
+            <a:spLocks noGrp="1"/>
+          </p:cNvSpPr>
+          <p:nvPr>
+            <p:ph type="sldNum" sz="quarter" idx="10"/>
+          </p:nvPr>
+        </p:nvSpPr>
+        <p:spPr/>
+        <p:txBody>
+          <a:bodyPr/>
+          <a:lstStyle/>
+          <a:p>
+            <a:fld id="{0250CB43-5682-4E83-A1E5-9760697AEC77}" type="slidenum">
+              <a:rPr lang="en-GB" smtClean="0"/>
+              <a:t>13</a:t>
+            </a:fld>
+            <a:endParaRPr lang="en-GB"/>
+          </a:p>
+        </p:txBody>
+      </p:sp>
+    </p:spTree>
+    <p:extLst>
+      <p:ext uri="{BB962C8B-B14F-4D97-AF65-F5344CB8AC3E}">
+        <p14:creationId xmlns:p14="http://schemas.microsoft.com/office/powerpoint/2010/main" val="502191871"/>
+      </p:ext>
+    </p:extLst>
+  </p:cSld>
+  <p:clrMapOvr>
+    <a:masterClrMapping/>
+  </p:clrMapOvr>
+</p:notes>
+</file>
+
+<file path=ppt/notesSlides/notesSlide14.xml><?xml version="1.0" encoding="utf-8"?>
+<p:notes xmlns:a="http://schemas.openxmlformats.org/drawingml/2006/main" xmlns:r="http://schemas.openxmlformats.org/officeDocument/2006/relationships" xmlns:p="http://schemas.openxmlformats.org/presentationml/2006/main">
+  <p:cSld>
+    <p:spTree>
+      <p:nvGrpSpPr>
+        <p:cNvPr id="1" name=""/>
+        <p:cNvGrpSpPr/>
+        <p:nvPr/>
+      </p:nvGrpSpPr>
+      <p:grpSpPr>
+        <a:xfrm>
+          <a:off x="0" y="0"/>
+          <a:ext cx="0" cy="0"/>
+          <a:chOff x="0" y="0"/>
+          <a:chExt cx="0" cy="0"/>
+        </a:xfrm>
+      </p:grpSpPr>
+      <p:sp>
+        <p:nvSpPr>
+          <p:cNvPr id="2" name="Folienbildplatzhalter 1"/>
+          <p:cNvSpPr>
+            <a:spLocks noGrp="1" noRot="1" noChangeAspect="1"/>
+          </p:cNvSpPr>
+          <p:nvPr>
+            <p:ph type="sldImg"/>
+          </p:nvPr>
+        </p:nvSpPr>
+        <p:spPr/>
+      </p:sp>
+      <p:sp>
+        <p:nvSpPr>
+          <p:cNvPr id="3" name="Notizenplatzhalter 2"/>
+          <p:cNvSpPr>
+            <a:spLocks noGrp="1"/>
+          </p:cNvSpPr>
+          <p:nvPr>
+            <p:ph type="body" idx="1"/>
+          </p:nvPr>
+        </p:nvSpPr>
+        <p:spPr/>
+        <p:txBody>
+          <a:bodyPr/>
+          <a:lstStyle/>
+          <a:p>
+            <a:endParaRPr lang="en-GB"/>
+          </a:p>
+        </p:txBody>
+      </p:sp>
+      <p:sp>
+        <p:nvSpPr>
+          <p:cNvPr id="4" name="Foliennummernplatzhalter 3"/>
+          <p:cNvSpPr>
+            <a:spLocks noGrp="1"/>
+          </p:cNvSpPr>
+          <p:nvPr>
+            <p:ph type="sldNum" sz="quarter" idx="10"/>
+          </p:nvPr>
+        </p:nvSpPr>
+        <p:spPr/>
+        <p:txBody>
+          <a:bodyPr/>
+          <a:lstStyle/>
+          <a:p>
+            <a:fld id="{0250CB43-5682-4E83-A1E5-9760697AEC77}" type="slidenum">
+              <a:rPr lang="en-GB" smtClean="0"/>
+              <a:t>14</a:t>
+            </a:fld>
+            <a:endParaRPr lang="en-GB"/>
+          </a:p>
+        </p:txBody>
+      </p:sp>
+    </p:spTree>
+    <p:extLst>
+      <p:ext uri="{BB962C8B-B14F-4D97-AF65-F5344CB8AC3E}">
+        <p14:creationId xmlns:p14="http://schemas.microsoft.com/office/powerpoint/2010/main" val="3279664561"/>
+      </p:ext>
+    </p:extLst>
+  </p:cSld>
+  <p:clrMapOvr>
+    <a:masterClrMapping/>
+  </p:clrMapOvr>
+</p:notes>
+</file>
+
+<file path=ppt/notesSlides/notesSlide15.xml><?xml version="1.0" encoding="utf-8"?>
+<p:notes xmlns:a="http://schemas.openxmlformats.org/drawingml/2006/main" xmlns:r="http://schemas.openxmlformats.org/officeDocument/2006/relationships" xmlns:p="http://schemas.openxmlformats.org/presentationml/2006/main">
+  <p:cSld>
+    <p:spTree>
+      <p:nvGrpSpPr>
+        <p:cNvPr id="1" name=""/>
+        <p:cNvGrpSpPr/>
+        <p:nvPr/>
+      </p:nvGrpSpPr>
+      <p:grpSpPr>
+        <a:xfrm>
+          <a:off x="0" y="0"/>
+          <a:ext cx="0" cy="0"/>
+          <a:chOff x="0" y="0"/>
+          <a:chExt cx="0" cy="0"/>
+        </a:xfrm>
+      </p:grpSpPr>
+      <p:sp>
+        <p:nvSpPr>
+          <p:cNvPr id="2" name="Folienbildplatzhalter 1"/>
+          <p:cNvSpPr>
+            <a:spLocks noGrp="1" noRot="1" noChangeAspect="1"/>
+          </p:cNvSpPr>
+          <p:nvPr>
+            <p:ph type="sldImg"/>
+          </p:nvPr>
+        </p:nvSpPr>
+        <p:spPr/>
+      </p:sp>
+      <p:sp>
+        <p:nvSpPr>
+          <p:cNvPr id="3" name="Notizenplatzhalter 2"/>
+          <p:cNvSpPr>
+            <a:spLocks noGrp="1"/>
+          </p:cNvSpPr>
+          <p:nvPr>
+            <p:ph type="body" idx="1"/>
+          </p:nvPr>
+        </p:nvSpPr>
+        <p:spPr/>
+        <p:txBody>
+          <a:bodyPr/>
+          <a:lstStyle/>
+          <a:p>
+            <a:endParaRPr lang="en-GB"/>
+          </a:p>
+        </p:txBody>
+      </p:sp>
+      <p:sp>
+        <p:nvSpPr>
+          <p:cNvPr id="4" name="Foliennummernplatzhalter 3"/>
+          <p:cNvSpPr>
+            <a:spLocks noGrp="1"/>
+          </p:cNvSpPr>
+          <p:nvPr>
+            <p:ph type="sldNum" sz="quarter" idx="10"/>
+          </p:nvPr>
+        </p:nvSpPr>
+        <p:spPr/>
+        <p:txBody>
+          <a:bodyPr/>
+          <a:lstStyle/>
+          <a:p>
+            <a:fld id="{0250CB43-5682-4E83-A1E5-9760697AEC77}" type="slidenum">
+              <a:rPr lang="en-GB" smtClean="0"/>
+              <a:t>15</a:t>
+            </a:fld>
+            <a:endParaRPr lang="en-GB"/>
+          </a:p>
+        </p:txBody>
+      </p:sp>
+    </p:spTree>
+    <p:extLst>
+      <p:ext uri="{BB962C8B-B14F-4D97-AF65-F5344CB8AC3E}">
+        <p14:creationId xmlns:p14="http://schemas.microsoft.com/office/powerpoint/2010/main" val="4129358632"/>
       </p:ext>
     </p:extLst>
   </p:cSld>
@@ -766,7 +1286,7 @@
           <a:bodyPr/>
           <a:lstStyle/>
           <a:p>
-            <a:endParaRPr lang="en-GB"/>
+            <a:endParaRPr lang="en-GB" dirty="0"/>
           </a:p>
         </p:txBody>
       </p:sp>
@@ -789,7 +1309,7 @@
               <a:rPr lang="en-GB" smtClean="0"/>
               <a:t>2</a:t>
             </a:fld>
-            <a:endParaRPr lang="en-GB"/>
+            <a:endParaRPr lang="en-GB" dirty="0"/>
           </a:p>
         </p:txBody>
       </p:sp>
@@ -797,6 +1317,800 @@
     <p:extLst>
       <p:ext uri="{BB962C8B-B14F-4D97-AF65-F5344CB8AC3E}">
         <p14:creationId xmlns:p14="http://schemas.microsoft.com/office/powerpoint/2010/main" val="256562714"/>
+      </p:ext>
+    </p:extLst>
+  </p:cSld>
+  <p:clrMapOvr>
+    <a:masterClrMapping/>
+  </p:clrMapOvr>
+</p:notes>
+</file>
+
+<file path=ppt/notesSlides/notesSlide3.xml><?xml version="1.0" encoding="utf-8"?>
+<p:notes xmlns:a="http://schemas.openxmlformats.org/drawingml/2006/main" xmlns:r="http://schemas.openxmlformats.org/officeDocument/2006/relationships" xmlns:p="http://schemas.openxmlformats.org/presentationml/2006/main">
+  <p:cSld>
+    <p:spTree>
+      <p:nvGrpSpPr>
+        <p:cNvPr id="1" name=""/>
+        <p:cNvGrpSpPr/>
+        <p:nvPr/>
+      </p:nvGrpSpPr>
+      <p:grpSpPr>
+        <a:xfrm>
+          <a:off x="0" y="0"/>
+          <a:ext cx="0" cy="0"/>
+          <a:chOff x="0" y="0"/>
+          <a:chExt cx="0" cy="0"/>
+        </a:xfrm>
+      </p:grpSpPr>
+      <p:sp>
+        <p:nvSpPr>
+          <p:cNvPr id="2" name="Folienbildplatzhalter 1"/>
+          <p:cNvSpPr>
+            <a:spLocks noGrp="1" noRot="1" noChangeAspect="1"/>
+          </p:cNvSpPr>
+          <p:nvPr>
+            <p:ph type="sldImg"/>
+          </p:nvPr>
+        </p:nvSpPr>
+        <p:spPr/>
+      </p:sp>
+      <p:sp>
+        <p:nvSpPr>
+          <p:cNvPr id="3" name="Notizenplatzhalter 2"/>
+          <p:cNvSpPr>
+            <a:spLocks noGrp="1"/>
+          </p:cNvSpPr>
+          <p:nvPr>
+            <p:ph type="body" idx="1"/>
+          </p:nvPr>
+        </p:nvSpPr>
+        <p:spPr/>
+        <p:txBody>
+          <a:bodyPr/>
+          <a:lstStyle/>
+          <a:p>
+            <a:endParaRPr lang="en-GB" dirty="0"/>
+          </a:p>
+        </p:txBody>
+      </p:sp>
+      <p:sp>
+        <p:nvSpPr>
+          <p:cNvPr id="4" name="Foliennummernplatzhalter 3"/>
+          <p:cNvSpPr>
+            <a:spLocks noGrp="1"/>
+          </p:cNvSpPr>
+          <p:nvPr>
+            <p:ph type="sldNum" sz="quarter" idx="10"/>
+          </p:nvPr>
+        </p:nvSpPr>
+        <p:spPr/>
+        <p:txBody>
+          <a:bodyPr/>
+          <a:lstStyle/>
+          <a:p>
+            <a:fld id="{0250CB43-5682-4E83-A1E5-9760697AEC77}" type="slidenum">
+              <a:rPr lang="en-GB" smtClean="0"/>
+              <a:t>3</a:t>
+            </a:fld>
+            <a:endParaRPr lang="en-GB" dirty="0"/>
+          </a:p>
+        </p:txBody>
+      </p:sp>
+    </p:spTree>
+    <p:extLst>
+      <p:ext uri="{BB962C8B-B14F-4D97-AF65-F5344CB8AC3E}">
+        <p14:creationId xmlns:p14="http://schemas.microsoft.com/office/powerpoint/2010/main" val="2168601461"/>
+      </p:ext>
+    </p:extLst>
+  </p:cSld>
+  <p:clrMapOvr>
+    <a:masterClrMapping/>
+  </p:clrMapOvr>
+</p:notes>
+</file>
+
+<file path=ppt/notesSlides/notesSlide4.xml><?xml version="1.0" encoding="utf-8"?>
+<p:notes xmlns:a="http://schemas.openxmlformats.org/drawingml/2006/main" xmlns:r="http://schemas.openxmlformats.org/officeDocument/2006/relationships" xmlns:p="http://schemas.openxmlformats.org/presentationml/2006/main">
+  <p:cSld>
+    <p:spTree>
+      <p:nvGrpSpPr>
+        <p:cNvPr id="1" name=""/>
+        <p:cNvGrpSpPr/>
+        <p:nvPr/>
+      </p:nvGrpSpPr>
+      <p:grpSpPr>
+        <a:xfrm>
+          <a:off x="0" y="0"/>
+          <a:ext cx="0" cy="0"/>
+          <a:chOff x="0" y="0"/>
+          <a:chExt cx="0" cy="0"/>
+        </a:xfrm>
+      </p:grpSpPr>
+      <p:sp>
+        <p:nvSpPr>
+          <p:cNvPr id="2" name="Folienbildplatzhalter 1"/>
+          <p:cNvSpPr>
+            <a:spLocks noGrp="1" noRot="1" noChangeAspect="1"/>
+          </p:cNvSpPr>
+          <p:nvPr>
+            <p:ph type="sldImg"/>
+          </p:nvPr>
+        </p:nvSpPr>
+        <p:spPr/>
+      </p:sp>
+      <p:sp>
+        <p:nvSpPr>
+          <p:cNvPr id="3" name="Notizenplatzhalter 2"/>
+          <p:cNvSpPr>
+            <a:spLocks noGrp="1"/>
+          </p:cNvSpPr>
+          <p:nvPr>
+            <p:ph type="body" idx="1"/>
+          </p:nvPr>
+        </p:nvSpPr>
+        <p:spPr/>
+        <p:txBody>
+          <a:bodyPr/>
+          <a:lstStyle/>
+          <a:p>
+            <a:endParaRPr lang="en-GB" dirty="0"/>
+          </a:p>
+        </p:txBody>
+      </p:sp>
+      <p:sp>
+        <p:nvSpPr>
+          <p:cNvPr id="4" name="Foliennummernplatzhalter 3"/>
+          <p:cNvSpPr>
+            <a:spLocks noGrp="1"/>
+          </p:cNvSpPr>
+          <p:nvPr>
+            <p:ph type="sldNum" sz="quarter" idx="10"/>
+          </p:nvPr>
+        </p:nvSpPr>
+        <p:spPr/>
+        <p:txBody>
+          <a:bodyPr/>
+          <a:lstStyle/>
+          <a:p>
+            <a:fld id="{0250CB43-5682-4E83-A1E5-9760697AEC77}" type="slidenum">
+              <a:rPr lang="en-GB" smtClean="0"/>
+              <a:t>4</a:t>
+            </a:fld>
+            <a:endParaRPr lang="en-GB" dirty="0"/>
+          </a:p>
+        </p:txBody>
+      </p:sp>
+    </p:spTree>
+    <p:extLst>
+      <p:ext uri="{BB962C8B-B14F-4D97-AF65-F5344CB8AC3E}">
+        <p14:creationId xmlns:p14="http://schemas.microsoft.com/office/powerpoint/2010/main" val="2076467085"/>
+      </p:ext>
+    </p:extLst>
+  </p:cSld>
+  <p:clrMapOvr>
+    <a:masterClrMapping/>
+  </p:clrMapOvr>
+</p:notes>
+</file>
+
+<file path=ppt/notesSlides/notesSlide5.xml><?xml version="1.0" encoding="utf-8"?>
+<p:notes xmlns:a="http://schemas.openxmlformats.org/drawingml/2006/main" xmlns:r="http://schemas.openxmlformats.org/officeDocument/2006/relationships" xmlns:p="http://schemas.openxmlformats.org/presentationml/2006/main">
+  <p:cSld>
+    <p:spTree>
+      <p:nvGrpSpPr>
+        <p:cNvPr id="1" name=""/>
+        <p:cNvGrpSpPr/>
+        <p:nvPr/>
+      </p:nvGrpSpPr>
+      <p:grpSpPr>
+        <a:xfrm>
+          <a:off x="0" y="0"/>
+          <a:ext cx="0" cy="0"/>
+          <a:chOff x="0" y="0"/>
+          <a:chExt cx="0" cy="0"/>
+        </a:xfrm>
+      </p:grpSpPr>
+      <p:sp>
+        <p:nvSpPr>
+          <p:cNvPr id="2" name="Folienbildplatzhalter 1"/>
+          <p:cNvSpPr>
+            <a:spLocks noGrp="1" noRot="1" noChangeAspect="1"/>
+          </p:cNvSpPr>
+          <p:nvPr>
+            <p:ph type="sldImg"/>
+          </p:nvPr>
+        </p:nvSpPr>
+        <p:spPr/>
+      </p:sp>
+      <p:sp>
+        <p:nvSpPr>
+          <p:cNvPr id="3" name="Notizenplatzhalter 2"/>
+          <p:cNvSpPr>
+            <a:spLocks noGrp="1"/>
+          </p:cNvSpPr>
+          <p:nvPr>
+            <p:ph type="body" idx="1"/>
+          </p:nvPr>
+        </p:nvSpPr>
+        <p:spPr/>
+        <p:txBody>
+          <a:bodyPr/>
+          <a:lstStyle/>
+          <a:p>
+            <a:endParaRPr lang="en-GB"/>
+          </a:p>
+        </p:txBody>
+      </p:sp>
+      <p:sp>
+        <p:nvSpPr>
+          <p:cNvPr id="4" name="Foliennummernplatzhalter 3"/>
+          <p:cNvSpPr>
+            <a:spLocks noGrp="1"/>
+          </p:cNvSpPr>
+          <p:nvPr>
+            <p:ph type="sldNum" sz="quarter" idx="10"/>
+          </p:nvPr>
+        </p:nvSpPr>
+        <p:spPr/>
+        <p:txBody>
+          <a:bodyPr/>
+          <a:lstStyle/>
+          <a:p>
+            <a:fld id="{0250CB43-5682-4E83-A1E5-9760697AEC77}" type="slidenum">
+              <a:rPr lang="en-GB" smtClean="0"/>
+              <a:t>5</a:t>
+            </a:fld>
+            <a:endParaRPr lang="en-GB"/>
+          </a:p>
+        </p:txBody>
+      </p:sp>
+    </p:spTree>
+    <p:extLst>
+      <p:ext uri="{BB962C8B-B14F-4D97-AF65-F5344CB8AC3E}">
+        <p14:creationId xmlns:p14="http://schemas.microsoft.com/office/powerpoint/2010/main" val="2366772878"/>
+      </p:ext>
+    </p:extLst>
+  </p:cSld>
+  <p:clrMapOvr>
+    <a:masterClrMapping/>
+  </p:clrMapOvr>
+</p:notes>
+</file>
+
+<file path=ppt/notesSlides/notesSlide6.xml><?xml version="1.0" encoding="utf-8"?>
+<p:notes xmlns:a="http://schemas.openxmlformats.org/drawingml/2006/main" xmlns:r="http://schemas.openxmlformats.org/officeDocument/2006/relationships" xmlns:p="http://schemas.openxmlformats.org/presentationml/2006/main">
+  <p:cSld>
+    <p:spTree>
+      <p:nvGrpSpPr>
+        <p:cNvPr id="1" name=""/>
+        <p:cNvGrpSpPr/>
+        <p:nvPr/>
+      </p:nvGrpSpPr>
+      <p:grpSpPr>
+        <a:xfrm>
+          <a:off x="0" y="0"/>
+          <a:ext cx="0" cy="0"/>
+          <a:chOff x="0" y="0"/>
+          <a:chExt cx="0" cy="0"/>
+        </a:xfrm>
+      </p:grpSpPr>
+      <p:sp>
+        <p:nvSpPr>
+          <p:cNvPr id="2" name="Folienbildplatzhalter 1"/>
+          <p:cNvSpPr>
+            <a:spLocks noGrp="1" noRot="1" noChangeAspect="1"/>
+          </p:cNvSpPr>
+          <p:nvPr>
+            <p:ph type="sldImg"/>
+          </p:nvPr>
+        </p:nvSpPr>
+        <p:spPr/>
+      </p:sp>
+      <p:sp>
+        <p:nvSpPr>
+          <p:cNvPr id="3" name="Notizenplatzhalter 2"/>
+          <p:cNvSpPr>
+            <a:spLocks noGrp="1"/>
+          </p:cNvSpPr>
+          <p:nvPr>
+            <p:ph type="body" idx="1"/>
+          </p:nvPr>
+        </p:nvSpPr>
+        <p:spPr/>
+        <p:txBody>
+          <a:bodyPr/>
+          <a:lstStyle/>
+          <a:p>
+            <a:r>
+              <a:rPr lang="de-DE" dirty="0"/>
+              <a:t>Classification Problem: Lösung soll in verschiedene Kategorien klassifiziert werden.</a:t>
+            </a:r>
+          </a:p>
+          <a:p>
+            <a:r>
+              <a:rPr lang="de-DE" dirty="0"/>
+              <a:t>Multimodal Spin </a:t>
+            </a:r>
+            <a:r>
+              <a:rPr lang="de-DE" dirty="0" err="1"/>
+              <a:t>Lattice</a:t>
+            </a:r>
+            <a:r>
+              <a:rPr lang="de-DE" dirty="0"/>
+              <a:t> Problem: Suchen eines minimalen Energiezustandes für 450 Spins mit je vier Zuständen auf einem 2D-Gitter.</a:t>
+            </a:r>
+          </a:p>
+          <a:p>
+            <a:endParaRPr lang="de-DE" dirty="0"/>
+          </a:p>
+          <a:p>
+            <a:r>
+              <a:rPr lang="en-GB" dirty="0"/>
+              <a:t>Self-Crossover: </a:t>
+            </a:r>
+            <a:r>
+              <a:rPr lang="en-GB" dirty="0" err="1"/>
+              <a:t>Tauschen</a:t>
+            </a:r>
+            <a:r>
+              <a:rPr lang="en-GB" dirty="0"/>
+              <a:t> von </a:t>
+            </a:r>
+            <a:r>
+              <a:rPr lang="en-GB" dirty="0" err="1"/>
+              <a:t>einzelnen</a:t>
+            </a:r>
+            <a:r>
+              <a:rPr lang="en-GB" dirty="0"/>
+              <a:t> Bits </a:t>
+            </a:r>
+            <a:r>
+              <a:rPr lang="en-GB" dirty="0" err="1"/>
+              <a:t>innerhalb</a:t>
+            </a:r>
+            <a:r>
+              <a:rPr lang="en-GB" dirty="0"/>
+              <a:t> des </a:t>
+            </a:r>
+            <a:r>
+              <a:rPr lang="en-GB" dirty="0" err="1"/>
+              <a:t>Chromosoms</a:t>
+            </a:r>
+            <a:r>
+              <a:rPr lang="en-GB" dirty="0"/>
+              <a:t>.</a:t>
+            </a:r>
+          </a:p>
+          <a:p>
+            <a:r>
+              <a:rPr lang="en-GB" dirty="0"/>
+              <a:t>Supplementary Crossover: </a:t>
+            </a:r>
+            <a:r>
+              <a:rPr lang="en-GB" dirty="0" err="1"/>
+              <a:t>Nutzt</a:t>
+            </a:r>
+            <a:r>
+              <a:rPr lang="en-GB" dirty="0"/>
+              <a:t> das </a:t>
+            </a:r>
+            <a:r>
+              <a:rPr lang="en-GB" dirty="0" err="1"/>
+              <a:t>Center</a:t>
+            </a:r>
+            <a:r>
+              <a:rPr lang="en-GB" dirty="0"/>
+              <a:t> of Gravity-</a:t>
+            </a:r>
+            <a:r>
+              <a:rPr lang="en-GB" dirty="0" err="1"/>
+              <a:t>Paradigma</a:t>
+            </a:r>
+            <a:r>
+              <a:rPr lang="en-GB" dirty="0"/>
+              <a:t> um Kinder </a:t>
+            </a:r>
+            <a:r>
+              <a:rPr lang="en-GB" dirty="0" err="1"/>
+              <a:t>zu</a:t>
+            </a:r>
+            <a:r>
+              <a:rPr lang="en-GB" dirty="0"/>
+              <a:t> </a:t>
+            </a:r>
+            <a:r>
+              <a:rPr lang="en-GB" dirty="0" err="1"/>
+              <a:t>erzeugen</a:t>
+            </a:r>
+            <a:r>
+              <a:rPr lang="en-GB" dirty="0"/>
+              <a:t>.</a:t>
+            </a:r>
+          </a:p>
+          <a:p>
+            <a:r>
+              <a:rPr lang="en-GB" dirty="0"/>
+              <a:t>Generalized crossover: </a:t>
+            </a:r>
+            <a:r>
+              <a:rPr lang="en-GB" dirty="0" err="1"/>
+              <a:t>Interpretiert</a:t>
+            </a:r>
+            <a:r>
+              <a:rPr lang="en-GB" dirty="0"/>
+              <a:t> </a:t>
+            </a:r>
+            <a:r>
+              <a:rPr lang="en-GB" dirty="0" err="1"/>
+              <a:t>Chromosom</a:t>
+            </a:r>
+            <a:r>
+              <a:rPr lang="en-GB" dirty="0"/>
+              <a:t> </a:t>
+            </a:r>
+            <a:r>
+              <a:rPr lang="en-GB" dirty="0" err="1"/>
+              <a:t>als</a:t>
+            </a:r>
+            <a:r>
+              <a:rPr lang="en-GB" dirty="0"/>
+              <a:t> </a:t>
+            </a:r>
+            <a:r>
+              <a:rPr lang="en-GB" dirty="0" err="1"/>
+              <a:t>Ganzzahl</a:t>
+            </a:r>
+            <a:r>
+              <a:rPr lang="en-GB" dirty="0"/>
+              <a:t> und </a:t>
+            </a:r>
+            <a:r>
+              <a:rPr lang="en-GB" dirty="0" err="1"/>
+              <a:t>dividiert</a:t>
+            </a:r>
+            <a:r>
+              <a:rPr lang="en-GB" dirty="0"/>
+              <a:t> </a:t>
+            </a:r>
+            <a:r>
+              <a:rPr lang="en-GB" dirty="0" err="1"/>
+              <a:t>diese</a:t>
+            </a:r>
+            <a:r>
+              <a:rPr lang="en-GB" dirty="0"/>
+              <a:t> </a:t>
+            </a:r>
+            <a:r>
+              <a:rPr lang="en-GB" dirty="0" err="1"/>
+              <a:t>durch</a:t>
+            </a:r>
+            <a:r>
+              <a:rPr lang="en-GB" dirty="0"/>
+              <a:t> </a:t>
+            </a:r>
+            <a:r>
+              <a:rPr lang="en-GB" dirty="0" err="1"/>
+              <a:t>eine</a:t>
+            </a:r>
+            <a:r>
+              <a:rPr lang="en-GB" dirty="0"/>
+              <a:t> </a:t>
+            </a:r>
+            <a:r>
+              <a:rPr lang="en-GB" dirty="0" err="1"/>
+              <a:t>andere</a:t>
+            </a:r>
+            <a:r>
+              <a:rPr lang="en-GB" dirty="0"/>
+              <a:t>, </a:t>
+            </a:r>
+            <a:r>
+              <a:rPr lang="en-GB" dirty="0" err="1"/>
+              <a:t>zufällig</a:t>
+            </a:r>
+            <a:r>
+              <a:rPr lang="en-GB" dirty="0"/>
+              <a:t> </a:t>
+            </a:r>
+            <a:r>
+              <a:rPr lang="en-GB" dirty="0" err="1"/>
+              <a:t>ausgewählte</a:t>
+            </a:r>
+            <a:r>
+              <a:rPr lang="en-GB" dirty="0"/>
+              <a:t> </a:t>
+            </a:r>
+            <a:r>
+              <a:rPr lang="en-GB" dirty="0" err="1"/>
+              <a:t>Ganzzahl</a:t>
+            </a:r>
+            <a:r>
+              <a:rPr lang="en-GB" dirty="0"/>
+              <a:t>.</a:t>
+            </a:r>
+          </a:p>
+        </p:txBody>
+      </p:sp>
+      <p:sp>
+        <p:nvSpPr>
+          <p:cNvPr id="4" name="Foliennummernplatzhalter 3"/>
+          <p:cNvSpPr>
+            <a:spLocks noGrp="1"/>
+          </p:cNvSpPr>
+          <p:nvPr>
+            <p:ph type="sldNum" sz="quarter" idx="10"/>
+          </p:nvPr>
+        </p:nvSpPr>
+        <p:spPr/>
+        <p:txBody>
+          <a:bodyPr/>
+          <a:lstStyle/>
+          <a:p>
+            <a:fld id="{0250CB43-5682-4E83-A1E5-9760697AEC77}" type="slidenum">
+              <a:rPr lang="en-GB" smtClean="0"/>
+              <a:t>6</a:t>
+            </a:fld>
+            <a:endParaRPr lang="en-GB"/>
+          </a:p>
+        </p:txBody>
+      </p:sp>
+    </p:spTree>
+    <p:extLst>
+      <p:ext uri="{BB962C8B-B14F-4D97-AF65-F5344CB8AC3E}">
+        <p14:creationId xmlns:p14="http://schemas.microsoft.com/office/powerpoint/2010/main" val="4188298045"/>
+      </p:ext>
+    </p:extLst>
+  </p:cSld>
+  <p:clrMapOvr>
+    <a:masterClrMapping/>
+  </p:clrMapOvr>
+</p:notes>
+</file>
+
+<file path=ppt/notesSlides/notesSlide7.xml><?xml version="1.0" encoding="utf-8"?>
+<p:notes xmlns:a="http://schemas.openxmlformats.org/drawingml/2006/main" xmlns:r="http://schemas.openxmlformats.org/officeDocument/2006/relationships" xmlns:p="http://schemas.openxmlformats.org/presentationml/2006/main">
+  <p:cSld>
+    <p:spTree>
+      <p:nvGrpSpPr>
+        <p:cNvPr id="1" name=""/>
+        <p:cNvGrpSpPr/>
+        <p:nvPr/>
+      </p:nvGrpSpPr>
+      <p:grpSpPr>
+        <a:xfrm>
+          <a:off x="0" y="0"/>
+          <a:ext cx="0" cy="0"/>
+          <a:chOff x="0" y="0"/>
+          <a:chExt cx="0" cy="0"/>
+        </a:xfrm>
+      </p:grpSpPr>
+      <p:sp>
+        <p:nvSpPr>
+          <p:cNvPr id="2" name="Folienbildplatzhalter 1"/>
+          <p:cNvSpPr>
+            <a:spLocks noGrp="1" noRot="1" noChangeAspect="1"/>
+          </p:cNvSpPr>
+          <p:nvPr>
+            <p:ph type="sldImg"/>
+          </p:nvPr>
+        </p:nvSpPr>
+        <p:spPr/>
+      </p:sp>
+      <p:sp>
+        <p:nvSpPr>
+          <p:cNvPr id="3" name="Notizenplatzhalter 2"/>
+          <p:cNvSpPr>
+            <a:spLocks noGrp="1"/>
+          </p:cNvSpPr>
+          <p:nvPr>
+            <p:ph type="body" idx="1"/>
+          </p:nvPr>
+        </p:nvSpPr>
+        <p:spPr/>
+        <p:txBody>
+          <a:bodyPr/>
+          <a:lstStyle/>
+          <a:p>
+            <a:endParaRPr lang="en-GB"/>
+          </a:p>
+        </p:txBody>
+      </p:sp>
+      <p:sp>
+        <p:nvSpPr>
+          <p:cNvPr id="4" name="Foliennummernplatzhalter 3"/>
+          <p:cNvSpPr>
+            <a:spLocks noGrp="1"/>
+          </p:cNvSpPr>
+          <p:nvPr>
+            <p:ph type="sldNum" sz="quarter" idx="10"/>
+          </p:nvPr>
+        </p:nvSpPr>
+        <p:spPr/>
+        <p:txBody>
+          <a:bodyPr/>
+          <a:lstStyle/>
+          <a:p>
+            <a:fld id="{0250CB43-5682-4E83-A1E5-9760697AEC77}" type="slidenum">
+              <a:rPr lang="en-GB" smtClean="0"/>
+              <a:t>7</a:t>
+            </a:fld>
+            <a:endParaRPr lang="en-GB"/>
+          </a:p>
+        </p:txBody>
+      </p:sp>
+    </p:spTree>
+    <p:extLst>
+      <p:ext uri="{BB962C8B-B14F-4D97-AF65-F5344CB8AC3E}">
+        <p14:creationId xmlns:p14="http://schemas.microsoft.com/office/powerpoint/2010/main" val="327305791"/>
+      </p:ext>
+    </p:extLst>
+  </p:cSld>
+  <p:clrMapOvr>
+    <a:masterClrMapping/>
+  </p:clrMapOvr>
+</p:notes>
+</file>
+
+<file path=ppt/notesSlides/notesSlide8.xml><?xml version="1.0" encoding="utf-8"?>
+<p:notes xmlns:a="http://schemas.openxmlformats.org/drawingml/2006/main" xmlns:r="http://schemas.openxmlformats.org/officeDocument/2006/relationships" xmlns:p="http://schemas.openxmlformats.org/presentationml/2006/main">
+  <p:cSld>
+    <p:spTree>
+      <p:nvGrpSpPr>
+        <p:cNvPr id="1" name=""/>
+        <p:cNvGrpSpPr/>
+        <p:nvPr/>
+      </p:nvGrpSpPr>
+      <p:grpSpPr>
+        <a:xfrm>
+          <a:off x="0" y="0"/>
+          <a:ext cx="0" cy="0"/>
+          <a:chOff x="0" y="0"/>
+          <a:chExt cx="0" cy="0"/>
+        </a:xfrm>
+      </p:grpSpPr>
+      <p:sp>
+        <p:nvSpPr>
+          <p:cNvPr id="2" name="Folienbildplatzhalter 1"/>
+          <p:cNvSpPr>
+            <a:spLocks noGrp="1" noRot="1" noChangeAspect="1"/>
+          </p:cNvSpPr>
+          <p:nvPr>
+            <p:ph type="sldImg"/>
+          </p:nvPr>
+        </p:nvSpPr>
+        <p:spPr/>
+      </p:sp>
+      <p:sp>
+        <p:nvSpPr>
+          <p:cNvPr id="3" name="Notizenplatzhalter 2"/>
+          <p:cNvSpPr>
+            <a:spLocks noGrp="1"/>
+          </p:cNvSpPr>
+          <p:nvPr>
+            <p:ph type="body" idx="1"/>
+          </p:nvPr>
+        </p:nvSpPr>
+        <p:spPr/>
+        <p:txBody>
+          <a:bodyPr/>
+          <a:lstStyle/>
+          <a:p>
+            <a:endParaRPr lang="en-GB"/>
+          </a:p>
+        </p:txBody>
+      </p:sp>
+      <p:sp>
+        <p:nvSpPr>
+          <p:cNvPr id="4" name="Foliennummernplatzhalter 3"/>
+          <p:cNvSpPr>
+            <a:spLocks noGrp="1"/>
+          </p:cNvSpPr>
+          <p:nvPr>
+            <p:ph type="sldNum" sz="quarter" idx="10"/>
+          </p:nvPr>
+        </p:nvSpPr>
+        <p:spPr/>
+        <p:txBody>
+          <a:bodyPr/>
+          <a:lstStyle/>
+          <a:p>
+            <a:fld id="{0250CB43-5682-4E83-A1E5-9760697AEC77}" type="slidenum">
+              <a:rPr lang="en-GB" smtClean="0"/>
+              <a:t>8</a:t>
+            </a:fld>
+            <a:endParaRPr lang="en-GB"/>
+          </a:p>
+        </p:txBody>
+      </p:sp>
+    </p:spTree>
+    <p:extLst>
+      <p:ext uri="{BB962C8B-B14F-4D97-AF65-F5344CB8AC3E}">
+        <p14:creationId xmlns:p14="http://schemas.microsoft.com/office/powerpoint/2010/main" val="658910433"/>
+      </p:ext>
+    </p:extLst>
+  </p:cSld>
+  <p:clrMapOvr>
+    <a:masterClrMapping/>
+  </p:clrMapOvr>
+</p:notes>
+</file>
+
+<file path=ppt/notesSlides/notesSlide9.xml><?xml version="1.0" encoding="utf-8"?>
+<p:notes xmlns:a="http://schemas.openxmlformats.org/drawingml/2006/main" xmlns:r="http://schemas.openxmlformats.org/officeDocument/2006/relationships" xmlns:p="http://schemas.openxmlformats.org/presentationml/2006/main">
+  <p:cSld>
+    <p:spTree>
+      <p:nvGrpSpPr>
+        <p:cNvPr id="1" name=""/>
+        <p:cNvGrpSpPr/>
+        <p:nvPr/>
+      </p:nvGrpSpPr>
+      <p:grpSpPr>
+        <a:xfrm>
+          <a:off x="0" y="0"/>
+          <a:ext cx="0" cy="0"/>
+          <a:chOff x="0" y="0"/>
+          <a:chExt cx="0" cy="0"/>
+        </a:xfrm>
+      </p:grpSpPr>
+      <p:sp>
+        <p:nvSpPr>
+          <p:cNvPr id="2" name="Folienbildplatzhalter 1"/>
+          <p:cNvSpPr>
+            <a:spLocks noGrp="1" noRot="1" noChangeAspect="1"/>
+          </p:cNvSpPr>
+          <p:nvPr>
+            <p:ph type="sldImg"/>
+          </p:nvPr>
+        </p:nvSpPr>
+        <p:spPr/>
+      </p:sp>
+      <p:sp>
+        <p:nvSpPr>
+          <p:cNvPr id="3" name="Notizenplatzhalter 2"/>
+          <p:cNvSpPr>
+            <a:spLocks noGrp="1"/>
+          </p:cNvSpPr>
+          <p:nvPr>
+            <p:ph type="body" idx="1"/>
+          </p:nvPr>
+        </p:nvSpPr>
+        <p:spPr/>
+        <p:txBody>
+          <a:bodyPr/>
+          <a:lstStyle/>
+          <a:p>
+            <a:endParaRPr lang="en-GB"/>
+          </a:p>
+        </p:txBody>
+      </p:sp>
+      <p:sp>
+        <p:nvSpPr>
+          <p:cNvPr id="4" name="Foliennummernplatzhalter 3"/>
+          <p:cNvSpPr>
+            <a:spLocks noGrp="1"/>
+          </p:cNvSpPr>
+          <p:nvPr>
+            <p:ph type="sldNum" sz="quarter" idx="10"/>
+          </p:nvPr>
+        </p:nvSpPr>
+        <p:spPr/>
+        <p:txBody>
+          <a:bodyPr/>
+          <a:lstStyle/>
+          <a:p>
+            <a:fld id="{0250CB43-5682-4E83-A1E5-9760697AEC77}" type="slidenum">
+              <a:rPr lang="en-GB" smtClean="0"/>
+              <a:t>9</a:t>
+            </a:fld>
+            <a:endParaRPr lang="en-GB"/>
+          </a:p>
+        </p:txBody>
+      </p:sp>
+    </p:spTree>
+    <p:extLst>
+      <p:ext uri="{BB962C8B-B14F-4D97-AF65-F5344CB8AC3E}">
+        <p14:creationId xmlns:p14="http://schemas.microsoft.com/office/powerpoint/2010/main" val="1725312994"/>
       </p:ext>
     </p:extLst>
   </p:cSld>
@@ -4395,6 +5709,776 @@
 </p:sld>
 </file>
 
+<file path=ppt/slides/slide10.xml><?xml version="1.0" encoding="utf-8"?>
+<p:sld xmlns:a="http://schemas.openxmlformats.org/drawingml/2006/main" xmlns:r="http://schemas.openxmlformats.org/officeDocument/2006/relationships" xmlns:p="http://schemas.openxmlformats.org/presentationml/2006/main">
+  <p:cSld>
+    <p:spTree>
+      <p:nvGrpSpPr>
+        <p:cNvPr id="1" name=""/>
+        <p:cNvGrpSpPr/>
+        <p:nvPr/>
+      </p:nvGrpSpPr>
+      <p:grpSpPr>
+        <a:xfrm>
+          <a:off x="0" y="0"/>
+          <a:ext cx="0" cy="0"/>
+          <a:chOff x="0" y="0"/>
+          <a:chExt cx="0" cy="0"/>
+        </a:xfrm>
+      </p:grpSpPr>
+      <p:sp>
+        <p:nvSpPr>
+          <p:cNvPr id="2" name="Titel 1"/>
+          <p:cNvSpPr>
+            <a:spLocks noGrp="1"/>
+          </p:cNvSpPr>
+          <p:nvPr>
+            <p:ph type="title"/>
+          </p:nvPr>
+        </p:nvSpPr>
+        <p:spPr/>
+        <p:txBody>
+          <a:bodyPr/>
+          <a:lstStyle/>
+          <a:p>
+            <a:r>
+              <a:rPr lang="de-DE" dirty="0"/>
+              <a:t>Mehrdimensionale Repräsentationen</a:t>
+            </a:r>
+            <a:endParaRPr lang="en-GB" dirty="0"/>
+          </a:p>
+        </p:txBody>
+      </p:sp>
+      <p:sp>
+        <p:nvSpPr>
+          <p:cNvPr id="3" name="Inhaltsplatzhalter 2"/>
+          <p:cNvSpPr>
+            <a:spLocks noGrp="1"/>
+          </p:cNvSpPr>
+          <p:nvPr>
+            <p:ph idx="1"/>
+          </p:nvPr>
+        </p:nvSpPr>
+        <p:spPr/>
+        <p:txBody>
+          <a:bodyPr>
+            <a:noAutofit/>
+          </a:bodyPr>
+          <a:lstStyle/>
+          <a:p>
+            <a:pPr>
+              <a:buFont typeface="Wingdings" panose="05000000000000000000" pitchFamily="2" charset="2"/>
+              <a:buChar char="§"/>
+            </a:pPr>
+            <a:r>
+              <a:rPr lang="de-DE" dirty="0"/>
+              <a:t>Text</a:t>
+            </a:r>
+            <a:endParaRPr lang="en-GB" sz="1400" dirty="0"/>
+          </a:p>
+        </p:txBody>
+      </p:sp>
+      <p:sp>
+        <p:nvSpPr>
+          <p:cNvPr id="6" name="Datumsplatzhalter 5"/>
+          <p:cNvSpPr>
+            <a:spLocks noGrp="1"/>
+          </p:cNvSpPr>
+          <p:nvPr>
+            <p:ph type="dt" sz="half" idx="10"/>
+          </p:nvPr>
+        </p:nvSpPr>
+        <p:spPr/>
+        <p:txBody>
+          <a:bodyPr/>
+          <a:lstStyle/>
+          <a:p>
+            <a:fld id="{7A101A87-D014-4826-A19A-EE438A1F464F}" type="datetime1">
+              <a:rPr lang="de-DE" smtClean="0"/>
+              <a:t>06.07.2017</a:t>
+            </a:fld>
+            <a:endParaRPr lang="en-GB" dirty="0"/>
+          </a:p>
+        </p:txBody>
+      </p:sp>
+      <p:sp>
+        <p:nvSpPr>
+          <p:cNvPr id="7" name="Foliennummernplatzhalter 6"/>
+          <p:cNvSpPr>
+            <a:spLocks noGrp="1"/>
+          </p:cNvSpPr>
+          <p:nvPr>
+            <p:ph type="sldNum" sz="quarter" idx="12"/>
+          </p:nvPr>
+        </p:nvSpPr>
+        <p:spPr/>
+        <p:txBody>
+          <a:bodyPr/>
+          <a:lstStyle/>
+          <a:p>
+            <a:fld id="{D28BEBC9-775D-4085-B138-BED27E854DA8}" type="slidenum">
+              <a:rPr lang="en-GB" smtClean="0"/>
+              <a:pPr/>
+              <a:t>10</a:t>
+            </a:fld>
+            <a:endParaRPr lang="en-GB"/>
+          </a:p>
+        </p:txBody>
+      </p:sp>
+    </p:spTree>
+    <p:extLst>
+      <p:ext uri="{BB962C8B-B14F-4D97-AF65-F5344CB8AC3E}">
+        <p14:creationId xmlns:p14="http://schemas.microsoft.com/office/powerpoint/2010/main" val="1876670147"/>
+      </p:ext>
+    </p:extLst>
+  </p:cSld>
+  <p:clrMapOvr>
+    <a:masterClrMapping/>
+  </p:clrMapOvr>
+</p:sld>
+</file>
+
+<file path=ppt/slides/slide11.xml><?xml version="1.0" encoding="utf-8"?>
+<p:sld xmlns:a="http://schemas.openxmlformats.org/drawingml/2006/main" xmlns:r="http://schemas.openxmlformats.org/officeDocument/2006/relationships" xmlns:p="http://schemas.openxmlformats.org/presentationml/2006/main">
+  <p:cSld>
+    <p:spTree>
+      <p:nvGrpSpPr>
+        <p:cNvPr id="1" name=""/>
+        <p:cNvGrpSpPr/>
+        <p:nvPr/>
+      </p:nvGrpSpPr>
+      <p:grpSpPr>
+        <a:xfrm>
+          <a:off x="0" y="0"/>
+          <a:ext cx="0" cy="0"/>
+          <a:chOff x="0" y="0"/>
+          <a:chExt cx="0" cy="0"/>
+        </a:xfrm>
+      </p:grpSpPr>
+      <p:sp>
+        <p:nvSpPr>
+          <p:cNvPr id="2" name="Titel 1"/>
+          <p:cNvSpPr>
+            <a:spLocks noGrp="1"/>
+          </p:cNvSpPr>
+          <p:nvPr>
+            <p:ph type="title"/>
+          </p:nvPr>
+        </p:nvSpPr>
+        <p:spPr/>
+        <p:txBody>
+          <a:bodyPr/>
+          <a:lstStyle/>
+          <a:p>
+            <a:r>
+              <a:rPr lang="de-DE" dirty="0"/>
+              <a:t>Anwendungsspezifische Codierungen</a:t>
+            </a:r>
+            <a:endParaRPr lang="en-GB" dirty="0"/>
+          </a:p>
+        </p:txBody>
+      </p:sp>
+      <p:sp>
+        <p:nvSpPr>
+          <p:cNvPr id="3" name="Inhaltsplatzhalter 2"/>
+          <p:cNvSpPr>
+            <a:spLocks noGrp="1"/>
+          </p:cNvSpPr>
+          <p:nvPr>
+            <p:ph idx="1"/>
+          </p:nvPr>
+        </p:nvSpPr>
+        <p:spPr/>
+        <p:txBody>
+          <a:bodyPr>
+            <a:noAutofit/>
+          </a:bodyPr>
+          <a:lstStyle/>
+          <a:p>
+            <a:pPr>
+              <a:buFont typeface="Wingdings" panose="05000000000000000000" pitchFamily="2" charset="2"/>
+              <a:buChar char="§"/>
+            </a:pPr>
+            <a:r>
+              <a:rPr lang="de-DE" dirty="0"/>
+              <a:t>Text</a:t>
+            </a:r>
+            <a:endParaRPr lang="en-GB" sz="1400" dirty="0"/>
+          </a:p>
+        </p:txBody>
+      </p:sp>
+      <p:sp>
+        <p:nvSpPr>
+          <p:cNvPr id="6" name="Datumsplatzhalter 5"/>
+          <p:cNvSpPr>
+            <a:spLocks noGrp="1"/>
+          </p:cNvSpPr>
+          <p:nvPr>
+            <p:ph type="dt" sz="half" idx="10"/>
+          </p:nvPr>
+        </p:nvSpPr>
+        <p:spPr/>
+        <p:txBody>
+          <a:bodyPr/>
+          <a:lstStyle/>
+          <a:p>
+            <a:fld id="{7A101A87-D014-4826-A19A-EE438A1F464F}" type="datetime1">
+              <a:rPr lang="de-DE" smtClean="0"/>
+              <a:t>06.07.2017</a:t>
+            </a:fld>
+            <a:endParaRPr lang="en-GB" dirty="0"/>
+          </a:p>
+        </p:txBody>
+      </p:sp>
+      <p:sp>
+        <p:nvSpPr>
+          <p:cNvPr id="7" name="Foliennummernplatzhalter 6"/>
+          <p:cNvSpPr>
+            <a:spLocks noGrp="1"/>
+          </p:cNvSpPr>
+          <p:nvPr>
+            <p:ph type="sldNum" sz="quarter" idx="12"/>
+          </p:nvPr>
+        </p:nvSpPr>
+        <p:spPr/>
+        <p:txBody>
+          <a:bodyPr/>
+          <a:lstStyle/>
+          <a:p>
+            <a:fld id="{D28BEBC9-775D-4085-B138-BED27E854DA8}" type="slidenum">
+              <a:rPr lang="en-GB" smtClean="0"/>
+              <a:pPr/>
+              <a:t>11</a:t>
+            </a:fld>
+            <a:endParaRPr lang="en-GB"/>
+          </a:p>
+        </p:txBody>
+      </p:sp>
+    </p:spTree>
+    <p:extLst>
+      <p:ext uri="{BB962C8B-B14F-4D97-AF65-F5344CB8AC3E}">
+        <p14:creationId xmlns:p14="http://schemas.microsoft.com/office/powerpoint/2010/main" val="344538528"/>
+      </p:ext>
+    </p:extLst>
+  </p:cSld>
+  <p:clrMapOvr>
+    <a:masterClrMapping/>
+  </p:clrMapOvr>
+</p:sld>
+</file>
+
+<file path=ppt/slides/slide12.xml><?xml version="1.0" encoding="utf-8"?>
+<p:sld xmlns:a="http://schemas.openxmlformats.org/drawingml/2006/main" xmlns:r="http://schemas.openxmlformats.org/officeDocument/2006/relationships" xmlns:p="http://schemas.openxmlformats.org/presentationml/2006/main">
+  <p:cSld>
+    <p:spTree>
+      <p:nvGrpSpPr>
+        <p:cNvPr id="1" name=""/>
+        <p:cNvGrpSpPr/>
+        <p:nvPr/>
+      </p:nvGrpSpPr>
+      <p:grpSpPr>
+        <a:xfrm>
+          <a:off x="0" y="0"/>
+          <a:ext cx="0" cy="0"/>
+          <a:chOff x="0" y="0"/>
+          <a:chExt cx="0" cy="0"/>
+        </a:xfrm>
+      </p:grpSpPr>
+      <p:sp>
+        <p:nvSpPr>
+          <p:cNvPr id="2" name="Titel 1"/>
+          <p:cNvSpPr>
+            <a:spLocks noGrp="1"/>
+          </p:cNvSpPr>
+          <p:nvPr>
+            <p:ph type="title"/>
+          </p:nvPr>
+        </p:nvSpPr>
+        <p:spPr/>
+        <p:txBody>
+          <a:bodyPr/>
+          <a:lstStyle/>
+          <a:p>
+            <a:r>
+              <a:rPr lang="de-DE" dirty="0"/>
+              <a:t>Universelle Crossover-Operationen</a:t>
+            </a:r>
+            <a:endParaRPr lang="en-GB" dirty="0"/>
+          </a:p>
+        </p:txBody>
+      </p:sp>
+      <p:sp>
+        <p:nvSpPr>
+          <p:cNvPr id="3" name="Inhaltsplatzhalter 2"/>
+          <p:cNvSpPr>
+            <a:spLocks noGrp="1"/>
+          </p:cNvSpPr>
+          <p:nvPr>
+            <p:ph idx="1"/>
+          </p:nvPr>
+        </p:nvSpPr>
+        <p:spPr/>
+        <p:txBody>
+          <a:bodyPr>
+            <a:noAutofit/>
+          </a:bodyPr>
+          <a:lstStyle/>
+          <a:p>
+            <a:pPr>
+              <a:buFont typeface="Wingdings" panose="05000000000000000000" pitchFamily="2" charset="2"/>
+              <a:buChar char="§"/>
+            </a:pPr>
+            <a:r>
+              <a:rPr lang="de-DE" dirty="0"/>
+              <a:t>Text</a:t>
+            </a:r>
+            <a:endParaRPr lang="en-GB" sz="1400" dirty="0"/>
+          </a:p>
+        </p:txBody>
+      </p:sp>
+      <p:sp>
+        <p:nvSpPr>
+          <p:cNvPr id="6" name="Datumsplatzhalter 5"/>
+          <p:cNvSpPr>
+            <a:spLocks noGrp="1"/>
+          </p:cNvSpPr>
+          <p:nvPr>
+            <p:ph type="dt" sz="half" idx="10"/>
+          </p:nvPr>
+        </p:nvSpPr>
+        <p:spPr/>
+        <p:txBody>
+          <a:bodyPr/>
+          <a:lstStyle/>
+          <a:p>
+            <a:fld id="{7A101A87-D014-4826-A19A-EE438A1F464F}" type="datetime1">
+              <a:rPr lang="de-DE" smtClean="0"/>
+              <a:t>06.07.2017</a:t>
+            </a:fld>
+            <a:endParaRPr lang="en-GB" dirty="0"/>
+          </a:p>
+        </p:txBody>
+      </p:sp>
+      <p:sp>
+        <p:nvSpPr>
+          <p:cNvPr id="7" name="Foliennummernplatzhalter 6"/>
+          <p:cNvSpPr>
+            <a:spLocks noGrp="1"/>
+          </p:cNvSpPr>
+          <p:nvPr>
+            <p:ph type="sldNum" sz="quarter" idx="12"/>
+          </p:nvPr>
+        </p:nvSpPr>
+        <p:spPr/>
+        <p:txBody>
+          <a:bodyPr/>
+          <a:lstStyle/>
+          <a:p>
+            <a:fld id="{D28BEBC9-775D-4085-B138-BED27E854DA8}" type="slidenum">
+              <a:rPr lang="en-GB" smtClean="0"/>
+              <a:pPr/>
+              <a:t>12</a:t>
+            </a:fld>
+            <a:endParaRPr lang="en-GB"/>
+          </a:p>
+        </p:txBody>
+      </p:sp>
+    </p:spTree>
+    <p:extLst>
+      <p:ext uri="{BB962C8B-B14F-4D97-AF65-F5344CB8AC3E}">
+        <p14:creationId xmlns:p14="http://schemas.microsoft.com/office/powerpoint/2010/main" val="1971648870"/>
+      </p:ext>
+    </p:extLst>
+  </p:cSld>
+  <p:clrMapOvr>
+    <a:masterClrMapping/>
+  </p:clrMapOvr>
+</p:sld>
+</file>
+
+<file path=ppt/slides/slide13.xml><?xml version="1.0" encoding="utf-8"?>
+<p:sld xmlns:a="http://schemas.openxmlformats.org/drawingml/2006/main" xmlns:r="http://schemas.openxmlformats.org/officeDocument/2006/relationships" xmlns:p="http://schemas.openxmlformats.org/presentationml/2006/main">
+  <p:cSld>
+    <p:spTree>
+      <p:nvGrpSpPr>
+        <p:cNvPr id="1" name=""/>
+        <p:cNvGrpSpPr/>
+        <p:nvPr/>
+      </p:nvGrpSpPr>
+      <p:grpSpPr>
+        <a:xfrm>
+          <a:off x="0" y="0"/>
+          <a:ext cx="0" cy="0"/>
+          <a:chOff x="0" y="0"/>
+          <a:chExt cx="0" cy="0"/>
+        </a:xfrm>
+      </p:grpSpPr>
+      <p:sp>
+        <p:nvSpPr>
+          <p:cNvPr id="2" name="Titel 1"/>
+          <p:cNvSpPr>
+            <a:spLocks noGrp="1"/>
+          </p:cNvSpPr>
+          <p:nvPr>
+            <p:ph type="title"/>
+          </p:nvPr>
+        </p:nvSpPr>
+        <p:spPr/>
+        <p:txBody>
+          <a:bodyPr/>
+          <a:lstStyle/>
+          <a:p>
+            <a:r>
+              <a:rPr lang="de-DE" dirty="0"/>
+              <a:t>Worauf kommt es bei der Auswahl an?</a:t>
+            </a:r>
+            <a:endParaRPr lang="en-GB" dirty="0"/>
+          </a:p>
+        </p:txBody>
+      </p:sp>
+      <p:sp>
+        <p:nvSpPr>
+          <p:cNvPr id="3" name="Inhaltsplatzhalter 2"/>
+          <p:cNvSpPr>
+            <a:spLocks noGrp="1"/>
+          </p:cNvSpPr>
+          <p:nvPr>
+            <p:ph idx="1"/>
+          </p:nvPr>
+        </p:nvSpPr>
+        <p:spPr/>
+        <p:txBody>
+          <a:bodyPr>
+            <a:noAutofit/>
+          </a:bodyPr>
+          <a:lstStyle/>
+          <a:p>
+            <a:pPr>
+              <a:buFont typeface="Wingdings" panose="05000000000000000000" pitchFamily="2" charset="2"/>
+              <a:buChar char="§"/>
+            </a:pPr>
+            <a:r>
+              <a:rPr lang="de-DE" dirty="0"/>
+              <a:t>Vor allem eins: Effizienz des Genetischen Algorithmus</a:t>
+            </a:r>
+            <a:endParaRPr lang="en-GB" sz="1400" dirty="0"/>
+          </a:p>
+        </p:txBody>
+      </p:sp>
+      <p:sp>
+        <p:nvSpPr>
+          <p:cNvPr id="6" name="Datumsplatzhalter 5"/>
+          <p:cNvSpPr>
+            <a:spLocks noGrp="1"/>
+          </p:cNvSpPr>
+          <p:nvPr>
+            <p:ph type="dt" sz="half" idx="10"/>
+          </p:nvPr>
+        </p:nvSpPr>
+        <p:spPr/>
+        <p:txBody>
+          <a:bodyPr/>
+          <a:lstStyle/>
+          <a:p>
+            <a:fld id="{7A101A87-D014-4826-A19A-EE438A1F464F}" type="datetime1">
+              <a:rPr lang="de-DE" smtClean="0"/>
+              <a:t>06.07.2017</a:t>
+            </a:fld>
+            <a:endParaRPr lang="en-GB" dirty="0"/>
+          </a:p>
+        </p:txBody>
+      </p:sp>
+      <p:sp>
+        <p:nvSpPr>
+          <p:cNvPr id="7" name="Foliennummernplatzhalter 6"/>
+          <p:cNvSpPr>
+            <a:spLocks noGrp="1"/>
+          </p:cNvSpPr>
+          <p:nvPr>
+            <p:ph type="sldNum" sz="quarter" idx="12"/>
+          </p:nvPr>
+        </p:nvSpPr>
+        <p:spPr/>
+        <p:txBody>
+          <a:bodyPr/>
+          <a:lstStyle/>
+          <a:p>
+            <a:fld id="{D28BEBC9-775D-4085-B138-BED27E854DA8}" type="slidenum">
+              <a:rPr lang="en-GB" smtClean="0"/>
+              <a:pPr/>
+              <a:t>13</a:t>
+            </a:fld>
+            <a:endParaRPr lang="en-GB"/>
+          </a:p>
+        </p:txBody>
+      </p:sp>
+    </p:spTree>
+    <p:extLst>
+      <p:ext uri="{BB962C8B-B14F-4D97-AF65-F5344CB8AC3E}">
+        <p14:creationId xmlns:p14="http://schemas.microsoft.com/office/powerpoint/2010/main" val="3994059908"/>
+      </p:ext>
+    </p:extLst>
+  </p:cSld>
+  <p:clrMapOvr>
+    <a:masterClrMapping/>
+  </p:clrMapOvr>
+</p:sld>
+</file>
+
+<file path=ppt/slides/slide14.xml><?xml version="1.0" encoding="utf-8"?>
+<p:sld xmlns:a="http://schemas.openxmlformats.org/drawingml/2006/main" xmlns:r="http://schemas.openxmlformats.org/officeDocument/2006/relationships" xmlns:p="http://schemas.openxmlformats.org/presentationml/2006/main">
+  <p:cSld>
+    <p:spTree>
+      <p:nvGrpSpPr>
+        <p:cNvPr id="1" name=""/>
+        <p:cNvGrpSpPr/>
+        <p:nvPr/>
+      </p:nvGrpSpPr>
+      <p:grpSpPr>
+        <a:xfrm>
+          <a:off x="0" y="0"/>
+          <a:ext cx="0" cy="0"/>
+          <a:chOff x="0" y="0"/>
+          <a:chExt cx="0" cy="0"/>
+        </a:xfrm>
+      </p:grpSpPr>
+      <p:sp>
+        <p:nvSpPr>
+          <p:cNvPr id="2" name="Titel 1"/>
+          <p:cNvSpPr>
+            <a:spLocks noGrp="1"/>
+          </p:cNvSpPr>
+          <p:nvPr>
+            <p:ph type="title"/>
+          </p:nvPr>
+        </p:nvSpPr>
+        <p:spPr/>
+        <p:txBody>
+          <a:bodyPr/>
+          <a:lstStyle/>
+          <a:p>
+            <a:r>
+              <a:rPr lang="de-DE" dirty="0"/>
+              <a:t>Noch fragen?</a:t>
+            </a:r>
+            <a:endParaRPr lang="en-GB" dirty="0"/>
+          </a:p>
+        </p:txBody>
+      </p:sp>
+      <p:sp>
+        <p:nvSpPr>
+          <p:cNvPr id="3" name="Inhaltsplatzhalter 2"/>
+          <p:cNvSpPr>
+            <a:spLocks noGrp="1"/>
+          </p:cNvSpPr>
+          <p:nvPr>
+            <p:ph idx="1"/>
+          </p:nvPr>
+        </p:nvSpPr>
+        <p:spPr/>
+        <p:txBody>
+          <a:bodyPr>
+            <a:noAutofit/>
+          </a:bodyPr>
+          <a:lstStyle/>
+          <a:p>
+            <a:pPr>
+              <a:buFont typeface="Wingdings" panose="05000000000000000000" pitchFamily="2" charset="2"/>
+              <a:buChar char="§"/>
+            </a:pPr>
+            <a:endParaRPr lang="en-GB" sz="1400" dirty="0"/>
+          </a:p>
+        </p:txBody>
+      </p:sp>
+      <p:sp>
+        <p:nvSpPr>
+          <p:cNvPr id="6" name="Datumsplatzhalter 5"/>
+          <p:cNvSpPr>
+            <a:spLocks noGrp="1"/>
+          </p:cNvSpPr>
+          <p:nvPr>
+            <p:ph type="dt" sz="half" idx="10"/>
+          </p:nvPr>
+        </p:nvSpPr>
+        <p:spPr/>
+        <p:txBody>
+          <a:bodyPr/>
+          <a:lstStyle/>
+          <a:p>
+            <a:fld id="{7A101A87-D014-4826-A19A-EE438A1F464F}" type="datetime1">
+              <a:rPr lang="de-DE" smtClean="0"/>
+              <a:t>06.07.2017</a:t>
+            </a:fld>
+            <a:endParaRPr lang="en-GB" dirty="0"/>
+          </a:p>
+        </p:txBody>
+      </p:sp>
+      <p:sp>
+        <p:nvSpPr>
+          <p:cNvPr id="7" name="Foliennummernplatzhalter 6"/>
+          <p:cNvSpPr>
+            <a:spLocks noGrp="1"/>
+          </p:cNvSpPr>
+          <p:nvPr>
+            <p:ph type="sldNum" sz="quarter" idx="12"/>
+          </p:nvPr>
+        </p:nvSpPr>
+        <p:spPr/>
+        <p:txBody>
+          <a:bodyPr/>
+          <a:lstStyle/>
+          <a:p>
+            <a:fld id="{D28BEBC9-775D-4085-B138-BED27E854DA8}" type="slidenum">
+              <a:rPr lang="en-GB" smtClean="0"/>
+              <a:pPr/>
+              <a:t>14</a:t>
+            </a:fld>
+            <a:endParaRPr lang="en-GB"/>
+          </a:p>
+        </p:txBody>
+      </p:sp>
+    </p:spTree>
+    <p:extLst>
+      <p:ext uri="{BB962C8B-B14F-4D97-AF65-F5344CB8AC3E}">
+        <p14:creationId xmlns:p14="http://schemas.microsoft.com/office/powerpoint/2010/main" val="1755377436"/>
+      </p:ext>
+    </p:extLst>
+  </p:cSld>
+  <p:clrMapOvr>
+    <a:masterClrMapping/>
+  </p:clrMapOvr>
+</p:sld>
+</file>
+
+<file path=ppt/slides/slide15.xml><?xml version="1.0" encoding="utf-8"?>
+<p:sld xmlns:a="http://schemas.openxmlformats.org/drawingml/2006/main" xmlns:r="http://schemas.openxmlformats.org/officeDocument/2006/relationships" xmlns:p="http://schemas.openxmlformats.org/presentationml/2006/main">
+  <p:cSld>
+    <p:spTree>
+      <p:nvGrpSpPr>
+        <p:cNvPr id="1" name=""/>
+        <p:cNvGrpSpPr/>
+        <p:nvPr/>
+      </p:nvGrpSpPr>
+      <p:grpSpPr>
+        <a:xfrm>
+          <a:off x="0" y="0"/>
+          <a:ext cx="0" cy="0"/>
+          <a:chOff x="0" y="0"/>
+          <a:chExt cx="0" cy="0"/>
+        </a:xfrm>
+      </p:grpSpPr>
+      <p:sp>
+        <p:nvSpPr>
+          <p:cNvPr id="2" name="Titel 1"/>
+          <p:cNvSpPr>
+            <a:spLocks noGrp="1"/>
+          </p:cNvSpPr>
+          <p:nvPr>
+            <p:ph type="title"/>
+          </p:nvPr>
+        </p:nvSpPr>
+        <p:spPr/>
+        <p:txBody>
+          <a:bodyPr/>
+          <a:lstStyle/>
+          <a:p>
+            <a:r>
+              <a:rPr lang="de-DE" dirty="0"/>
+              <a:t>Überschrift Folie</a:t>
+            </a:r>
+            <a:endParaRPr lang="en-GB" dirty="0"/>
+          </a:p>
+        </p:txBody>
+      </p:sp>
+      <p:sp>
+        <p:nvSpPr>
+          <p:cNvPr id="3" name="Inhaltsplatzhalter 2"/>
+          <p:cNvSpPr>
+            <a:spLocks noGrp="1"/>
+          </p:cNvSpPr>
+          <p:nvPr>
+            <p:ph idx="1"/>
+          </p:nvPr>
+        </p:nvSpPr>
+        <p:spPr/>
+        <p:txBody>
+          <a:bodyPr>
+            <a:noAutofit/>
+          </a:bodyPr>
+          <a:lstStyle/>
+          <a:p>
+            <a:pPr>
+              <a:buFont typeface="Wingdings" panose="05000000000000000000" pitchFamily="2" charset="2"/>
+              <a:buChar char="§"/>
+            </a:pPr>
+            <a:r>
+              <a:rPr lang="de-DE" dirty="0"/>
+              <a:t>Text</a:t>
+            </a:r>
+            <a:endParaRPr lang="en-GB" sz="1400" dirty="0"/>
+          </a:p>
+        </p:txBody>
+      </p:sp>
+      <p:sp>
+        <p:nvSpPr>
+          <p:cNvPr id="6" name="Datumsplatzhalter 5"/>
+          <p:cNvSpPr>
+            <a:spLocks noGrp="1"/>
+          </p:cNvSpPr>
+          <p:nvPr>
+            <p:ph type="dt" sz="half" idx="10"/>
+          </p:nvPr>
+        </p:nvSpPr>
+        <p:spPr/>
+        <p:txBody>
+          <a:bodyPr/>
+          <a:lstStyle/>
+          <a:p>
+            <a:fld id="{7A101A87-D014-4826-A19A-EE438A1F464F}" type="datetime1">
+              <a:rPr lang="de-DE" smtClean="0"/>
+              <a:t>06.07.2017</a:t>
+            </a:fld>
+            <a:endParaRPr lang="en-GB" dirty="0"/>
+          </a:p>
+        </p:txBody>
+      </p:sp>
+      <p:sp>
+        <p:nvSpPr>
+          <p:cNvPr id="7" name="Foliennummernplatzhalter 6"/>
+          <p:cNvSpPr>
+            <a:spLocks noGrp="1"/>
+          </p:cNvSpPr>
+          <p:nvPr>
+            <p:ph type="sldNum" sz="quarter" idx="12"/>
+          </p:nvPr>
+        </p:nvSpPr>
+        <p:spPr/>
+        <p:txBody>
+          <a:bodyPr/>
+          <a:lstStyle/>
+          <a:p>
+            <a:fld id="{D28BEBC9-775D-4085-B138-BED27E854DA8}" type="slidenum">
+              <a:rPr lang="en-GB" smtClean="0"/>
+              <a:pPr/>
+              <a:t>15</a:t>
+            </a:fld>
+            <a:endParaRPr lang="en-GB"/>
+          </a:p>
+        </p:txBody>
+      </p:sp>
+    </p:spTree>
+    <p:extLst>
+      <p:ext uri="{BB962C8B-B14F-4D97-AF65-F5344CB8AC3E}">
+        <p14:creationId xmlns:p14="http://schemas.microsoft.com/office/powerpoint/2010/main" val="1154515448"/>
+      </p:ext>
+    </p:extLst>
+  </p:cSld>
+  <p:clrMapOvr>
+    <a:masterClrMapping/>
+  </p:clrMapOvr>
+</p:sld>
+</file>
+
 <file path=ppt/slides/slide2.xml><?xml version="1.0" encoding="utf-8"?>
 <p:sld xmlns:a="http://schemas.openxmlformats.org/drawingml/2006/main" xmlns:r="http://schemas.openxmlformats.org/officeDocument/2006/relationships" xmlns:p="http://schemas.openxmlformats.org/presentationml/2006/main">
   <p:cSld>
@@ -4429,7 +6513,7 @@
           <a:p>
             <a:r>
               <a:rPr lang="de-DE" dirty="0"/>
-              <a:t>Überschrift Folie</a:t>
+              <a:t>Agenda</a:t>
             </a:r>
             <a:endParaRPr lang="en-GB" dirty="0"/>
           </a:p>
@@ -4452,15 +6536,91 @@
           </a:bodyPr>
           <a:lstStyle/>
           <a:p>
-            <a:pPr>
-              <a:buFont typeface="Wingdings" panose="05000000000000000000" pitchFamily="2" charset="2"/>
-              <a:buChar char="§"/>
+            <a:pPr marL="342900" indent="-342900">
+              <a:buAutoNum type="arabicParenR"/>
             </a:pPr>
             <a:r>
               <a:rPr lang="de-DE" dirty="0"/>
-              <a:t>Text</a:t>
-            </a:r>
-            <a:endParaRPr lang="en-GB" sz="1400" dirty="0"/>
+              <a:t>Was ist ein Genetischer Algorithmus?</a:t>
+            </a:r>
+          </a:p>
+          <a:p>
+            <a:pPr marL="342900" indent="-342900">
+              <a:buAutoNum type="arabicParenR"/>
+            </a:pPr>
+            <a:r>
+              <a:rPr lang="de-DE" dirty="0"/>
+              <a:t>Klassifizierung von Crossover-Operationen</a:t>
+            </a:r>
+          </a:p>
+          <a:p>
+            <a:pPr marL="342900" indent="-342900">
+              <a:buAutoNum type="arabicParenR"/>
+            </a:pPr>
+            <a:r>
+              <a:rPr lang="de-DE" dirty="0"/>
+              <a:t>Elementare Crossover-Operationen</a:t>
+            </a:r>
+          </a:p>
+          <a:p>
+            <a:pPr marL="342900" indent="-342900">
+              <a:buAutoNum type="arabicParenR"/>
+            </a:pPr>
+            <a:r>
+              <a:rPr lang="de-DE" dirty="0"/>
+              <a:t>Eindimensionale Repräsentationen</a:t>
+            </a:r>
+          </a:p>
+          <a:p>
+            <a:pPr lvl="1"/>
+            <a:r>
+              <a:rPr lang="de-DE" sz="1600" dirty="0"/>
+              <a:t>Grundlegende Datentypen</a:t>
+            </a:r>
+          </a:p>
+          <a:p>
+            <a:pPr lvl="1"/>
+            <a:r>
+              <a:rPr lang="de-DE" sz="1600" dirty="0"/>
+              <a:t>Vorstellung von zwei Crossover-Operationen im Detail</a:t>
+            </a:r>
+          </a:p>
+          <a:p>
+            <a:pPr marL="342900" indent="-342900">
+              <a:buAutoNum type="arabicParenR"/>
+            </a:pPr>
+            <a:r>
+              <a:rPr lang="de-DE" dirty="0"/>
+              <a:t>Mehrdimensionale Repräsentationen</a:t>
+            </a:r>
+          </a:p>
+          <a:p>
+            <a:pPr marL="342900" indent="-342900">
+              <a:buAutoNum type="arabicParenR"/>
+            </a:pPr>
+            <a:r>
+              <a:rPr lang="de-DE" dirty="0"/>
+              <a:t>Anwendungsspezifische Codierungen</a:t>
+            </a:r>
+          </a:p>
+          <a:p>
+            <a:pPr marL="342900" indent="-342900">
+              <a:buAutoNum type="arabicParenR"/>
+            </a:pPr>
+            <a:r>
+              <a:rPr lang="de-DE" dirty="0"/>
+              <a:t>Universelle Crossover-Operationen</a:t>
+            </a:r>
+          </a:p>
+          <a:p>
+            <a:pPr marL="342900" indent="-342900">
+              <a:buAutoNum type="arabicParenR"/>
+            </a:pPr>
+            <a:r>
+              <a:rPr lang="de-DE" dirty="0"/>
+              <a:t>Worauf kommt es bei der Auswahl an?</a:t>
+            </a:r>
+            <a:endParaRPr lang="en-GB" dirty="0"/>
           </a:p>
         </p:txBody>
       </p:sp>
@@ -4507,7 +6667,7 @@
               <a:pPr/>
               <a:t>2</a:t>
             </a:fld>
-            <a:endParaRPr lang="en-GB"/>
+            <a:endParaRPr lang="en-GB" dirty="0"/>
           </a:p>
         </p:txBody>
       </p:sp>
@@ -4515,6 +6675,1216 @@
     <p:extLst>
       <p:ext uri="{BB962C8B-B14F-4D97-AF65-F5344CB8AC3E}">
         <p14:creationId xmlns:p14="http://schemas.microsoft.com/office/powerpoint/2010/main" val="397740033"/>
+      </p:ext>
+    </p:extLst>
+  </p:cSld>
+  <p:clrMapOvr>
+    <a:masterClrMapping/>
+  </p:clrMapOvr>
+</p:sld>
+</file>
+
+<file path=ppt/slides/slide3.xml><?xml version="1.0" encoding="utf-8"?>
+<p:sld xmlns:a="http://schemas.openxmlformats.org/drawingml/2006/main" xmlns:r="http://schemas.openxmlformats.org/officeDocument/2006/relationships" xmlns:p="http://schemas.openxmlformats.org/presentationml/2006/main">
+  <p:cSld>
+    <p:spTree>
+      <p:nvGrpSpPr>
+        <p:cNvPr id="1" name=""/>
+        <p:cNvGrpSpPr/>
+        <p:nvPr/>
+      </p:nvGrpSpPr>
+      <p:grpSpPr>
+        <a:xfrm>
+          <a:off x="0" y="0"/>
+          <a:ext cx="0" cy="0"/>
+          <a:chOff x="0" y="0"/>
+          <a:chExt cx="0" cy="0"/>
+        </a:xfrm>
+      </p:grpSpPr>
+      <p:sp>
+        <p:nvSpPr>
+          <p:cNvPr id="2" name="Titel 1"/>
+          <p:cNvSpPr>
+            <a:spLocks noGrp="1"/>
+          </p:cNvSpPr>
+          <p:nvPr>
+            <p:ph type="title"/>
+          </p:nvPr>
+        </p:nvSpPr>
+        <p:spPr/>
+        <p:txBody>
+          <a:bodyPr/>
+          <a:lstStyle/>
+          <a:p>
+            <a:r>
+              <a:rPr lang="de-DE" dirty="0"/>
+              <a:t>Was ist ein Genetischer Algorithmus?</a:t>
+            </a:r>
+            <a:endParaRPr lang="en-GB" dirty="0"/>
+          </a:p>
+        </p:txBody>
+      </p:sp>
+      <p:sp>
+        <p:nvSpPr>
+          <p:cNvPr id="6" name="Datumsplatzhalter 5"/>
+          <p:cNvSpPr>
+            <a:spLocks noGrp="1"/>
+          </p:cNvSpPr>
+          <p:nvPr>
+            <p:ph type="dt" sz="half" idx="10"/>
+          </p:nvPr>
+        </p:nvSpPr>
+        <p:spPr/>
+        <p:txBody>
+          <a:bodyPr/>
+          <a:lstStyle/>
+          <a:p>
+            <a:fld id="{7A101A87-D014-4826-A19A-EE438A1F464F}" type="datetime1">
+              <a:rPr lang="de-DE" smtClean="0"/>
+              <a:t>06.07.2017</a:t>
+            </a:fld>
+            <a:endParaRPr lang="en-GB" dirty="0"/>
+          </a:p>
+        </p:txBody>
+      </p:sp>
+      <p:sp>
+        <p:nvSpPr>
+          <p:cNvPr id="7" name="Foliennummernplatzhalter 6"/>
+          <p:cNvSpPr>
+            <a:spLocks noGrp="1"/>
+          </p:cNvSpPr>
+          <p:nvPr>
+            <p:ph type="sldNum" sz="quarter" idx="12"/>
+          </p:nvPr>
+        </p:nvSpPr>
+        <p:spPr/>
+        <p:txBody>
+          <a:bodyPr/>
+          <a:lstStyle/>
+          <a:p>
+            <a:fld id="{D28BEBC9-775D-4085-B138-BED27E854DA8}" type="slidenum">
+              <a:rPr lang="en-GB" smtClean="0"/>
+              <a:pPr/>
+              <a:t>3</a:t>
+            </a:fld>
+            <a:endParaRPr lang="en-GB" dirty="0"/>
+          </a:p>
+        </p:txBody>
+      </p:sp>
+      <p:sp>
+        <p:nvSpPr>
+          <p:cNvPr id="8" name="Inhaltsplatzhalter 7">
+            <a:extLst>
+              <a:ext uri="{FF2B5EF4-FFF2-40B4-BE49-F238E27FC236}">
+                <a16:creationId xmlns:a16="http://schemas.microsoft.com/office/drawing/2014/main" id="{A1F052FC-98F2-4947-B9AF-C990F2F246B5}"/>
+              </a:ext>
+            </a:extLst>
+          </p:cNvPr>
+          <p:cNvSpPr>
+            <a:spLocks noGrp="1"/>
+          </p:cNvSpPr>
+          <p:nvPr>
+            <p:ph idx="1"/>
+          </p:nvPr>
+        </p:nvSpPr>
+        <p:spPr/>
+        <p:txBody>
+          <a:bodyPr/>
+          <a:lstStyle/>
+          <a:p>
+            <a:r>
+              <a:rPr lang="de-DE" dirty="0"/>
+              <a:t>Basiert auf Evolution</a:t>
+            </a:r>
+          </a:p>
+          <a:p>
+            <a:r>
+              <a:rPr lang="de-DE" dirty="0"/>
+              <a:t>Erstellt basierend auf Ausgangspopulation neue Kinderelemente</a:t>
+            </a:r>
+          </a:p>
+          <a:p>
+            <a:r>
+              <a:rPr lang="de-DE" dirty="0"/>
+              <a:t>Ob Element gut ist, entscheidet sich über Fitness-Funktion</a:t>
+            </a:r>
+          </a:p>
+          <a:p>
+            <a:r>
+              <a:rPr lang="de-DE" dirty="0"/>
+              <a:t>Crossover-Operation beeinflusst maßgeblich die Qualität und Effizienz</a:t>
+            </a:r>
+          </a:p>
+        </p:txBody>
+      </p:sp>
+      <p:pic>
+        <p:nvPicPr>
+          <p:cNvPr id="10" name="Inhaltsplatzhalter 4">
+            <a:extLst>
+              <a:ext uri="{FF2B5EF4-FFF2-40B4-BE49-F238E27FC236}">
+                <a16:creationId xmlns:a16="http://schemas.microsoft.com/office/drawing/2014/main" id="{8D14095C-855B-4A47-A1ED-EF6782227B7A}"/>
+              </a:ext>
+            </a:extLst>
+          </p:cNvPr>
+          <p:cNvPicPr>
+            <a:picLocks noChangeAspect="1"/>
+          </p:cNvPicPr>
+          <p:nvPr/>
+        </p:nvPicPr>
+        <p:blipFill>
+          <a:blip r:embed="rId3">
+            <a:extLst>
+              <a:ext uri="{28A0092B-C50C-407E-A947-70E740481C1C}">
+                <a14:useLocalDpi xmlns:a14="http://schemas.microsoft.com/office/drawing/2010/main" val="0"/>
+              </a:ext>
+            </a:extLst>
+          </a:blip>
+          <a:stretch>
+            <a:fillRect/>
+          </a:stretch>
+        </p:blipFill>
+        <p:spPr>
+          <a:xfrm>
+            <a:off x="2095500" y="3509963"/>
+            <a:ext cx="4953000" cy="2667000"/>
+          </a:xfrm>
+          <a:prstGeom prst="rect">
+            <a:avLst/>
+          </a:prstGeom>
+        </p:spPr>
+      </p:pic>
+    </p:spTree>
+    <p:extLst>
+      <p:ext uri="{BB962C8B-B14F-4D97-AF65-F5344CB8AC3E}">
+        <p14:creationId xmlns:p14="http://schemas.microsoft.com/office/powerpoint/2010/main" val="712050683"/>
+      </p:ext>
+    </p:extLst>
+  </p:cSld>
+  <p:clrMapOvr>
+    <a:masterClrMapping/>
+  </p:clrMapOvr>
+</p:sld>
+</file>
+
+<file path=ppt/slides/slide4.xml><?xml version="1.0" encoding="utf-8"?>
+<p:sld xmlns:a="http://schemas.openxmlformats.org/drawingml/2006/main" xmlns:r="http://schemas.openxmlformats.org/officeDocument/2006/relationships" xmlns:p="http://schemas.openxmlformats.org/presentationml/2006/main">
+  <p:cSld>
+    <p:spTree>
+      <p:nvGrpSpPr>
+        <p:cNvPr id="1" name=""/>
+        <p:cNvGrpSpPr/>
+        <p:nvPr/>
+      </p:nvGrpSpPr>
+      <p:grpSpPr>
+        <a:xfrm>
+          <a:off x="0" y="0"/>
+          <a:ext cx="0" cy="0"/>
+          <a:chOff x="0" y="0"/>
+          <a:chExt cx="0" cy="0"/>
+        </a:xfrm>
+      </p:grpSpPr>
+      <p:sp>
+        <p:nvSpPr>
+          <p:cNvPr id="2" name="Titel 1"/>
+          <p:cNvSpPr>
+            <a:spLocks noGrp="1"/>
+          </p:cNvSpPr>
+          <p:nvPr>
+            <p:ph type="title"/>
+          </p:nvPr>
+        </p:nvSpPr>
+        <p:spPr/>
+        <p:txBody>
+          <a:bodyPr/>
+          <a:lstStyle/>
+          <a:p>
+            <a:r>
+              <a:rPr lang="de-DE" dirty="0"/>
+              <a:t>Klassifizierung von Crossover-Operationen</a:t>
+            </a:r>
+            <a:endParaRPr lang="en-GB" dirty="0"/>
+          </a:p>
+        </p:txBody>
+      </p:sp>
+      <p:sp>
+        <p:nvSpPr>
+          <p:cNvPr id="3" name="Inhaltsplatzhalter 2"/>
+          <p:cNvSpPr>
+            <a:spLocks noGrp="1"/>
+          </p:cNvSpPr>
+          <p:nvPr>
+            <p:ph idx="1"/>
+          </p:nvPr>
+        </p:nvSpPr>
+        <p:spPr/>
+        <p:txBody>
+          <a:bodyPr>
+            <a:noAutofit/>
+          </a:bodyPr>
+          <a:lstStyle/>
+          <a:p>
+            <a:pPr>
+              <a:buFont typeface="Wingdings" panose="05000000000000000000" pitchFamily="2" charset="2"/>
+              <a:buChar char="§"/>
+            </a:pPr>
+            <a:r>
+              <a:rPr lang="de-DE" dirty="0"/>
+              <a:t>Lassen sich basierend auf ihren Eigenschaften in Kategorien einteilen:</a:t>
+            </a:r>
+          </a:p>
+          <a:p>
+            <a:pPr>
+              <a:buFont typeface="Wingdings" panose="05000000000000000000" pitchFamily="2" charset="2"/>
+              <a:buChar char="§"/>
+            </a:pPr>
+            <a:endParaRPr lang="de-DE" dirty="0"/>
+          </a:p>
+          <a:p>
+            <a:pPr>
+              <a:buFont typeface="Wingdings" panose="05000000000000000000" pitchFamily="2" charset="2"/>
+              <a:buChar char="§"/>
+            </a:pPr>
+            <a:endParaRPr lang="en-GB" sz="1400" dirty="0"/>
+          </a:p>
+        </p:txBody>
+      </p:sp>
+      <p:sp>
+        <p:nvSpPr>
+          <p:cNvPr id="6" name="Datumsplatzhalter 5"/>
+          <p:cNvSpPr>
+            <a:spLocks noGrp="1"/>
+          </p:cNvSpPr>
+          <p:nvPr>
+            <p:ph type="dt" sz="half" idx="10"/>
+          </p:nvPr>
+        </p:nvSpPr>
+        <p:spPr/>
+        <p:txBody>
+          <a:bodyPr/>
+          <a:lstStyle/>
+          <a:p>
+            <a:fld id="{7A101A87-D014-4826-A19A-EE438A1F464F}" type="datetime1">
+              <a:rPr lang="de-DE" smtClean="0"/>
+              <a:t>06.07.2017</a:t>
+            </a:fld>
+            <a:endParaRPr lang="en-GB" dirty="0"/>
+          </a:p>
+        </p:txBody>
+      </p:sp>
+      <p:sp>
+        <p:nvSpPr>
+          <p:cNvPr id="7" name="Foliennummernplatzhalter 6"/>
+          <p:cNvSpPr>
+            <a:spLocks noGrp="1"/>
+          </p:cNvSpPr>
+          <p:nvPr>
+            <p:ph type="sldNum" sz="quarter" idx="12"/>
+          </p:nvPr>
+        </p:nvSpPr>
+        <p:spPr/>
+        <p:txBody>
+          <a:bodyPr/>
+          <a:lstStyle/>
+          <a:p>
+            <a:fld id="{D28BEBC9-775D-4085-B138-BED27E854DA8}" type="slidenum">
+              <a:rPr lang="en-GB" smtClean="0"/>
+              <a:pPr/>
+              <a:t>4</a:t>
+            </a:fld>
+            <a:endParaRPr lang="en-GB" dirty="0"/>
+          </a:p>
+        </p:txBody>
+      </p:sp>
+      <p:pic>
+        <p:nvPicPr>
+          <p:cNvPr id="5" name="Grafik 4">
+            <a:extLst>
+              <a:ext uri="{FF2B5EF4-FFF2-40B4-BE49-F238E27FC236}">
+                <a16:creationId xmlns:a16="http://schemas.microsoft.com/office/drawing/2014/main" id="{0054786A-211E-44A8-98B2-9367B8252CD8}"/>
+              </a:ext>
+            </a:extLst>
+          </p:cNvPr>
+          <p:cNvPicPr>
+            <a:picLocks noChangeAspect="1"/>
+          </p:cNvPicPr>
+          <p:nvPr/>
+        </p:nvPicPr>
+        <p:blipFill>
+          <a:blip r:embed="rId3">
+            <a:extLst>
+              <a:ext uri="{28A0092B-C50C-407E-A947-70E740481C1C}">
+                <a14:useLocalDpi xmlns:a14="http://schemas.microsoft.com/office/drawing/2010/main" val="0"/>
+              </a:ext>
+            </a:extLst>
+          </a:blip>
+          <a:stretch>
+            <a:fillRect/>
+          </a:stretch>
+        </p:blipFill>
+        <p:spPr>
+          <a:xfrm>
+            <a:off x="1721796" y="2372840"/>
+            <a:ext cx="5706184" cy="3804123"/>
+          </a:xfrm>
+          <a:prstGeom prst="rect">
+            <a:avLst/>
+          </a:prstGeom>
+        </p:spPr>
+      </p:pic>
+    </p:spTree>
+    <p:extLst>
+      <p:ext uri="{BB962C8B-B14F-4D97-AF65-F5344CB8AC3E}">
+        <p14:creationId xmlns:p14="http://schemas.microsoft.com/office/powerpoint/2010/main" val="3628412826"/>
+      </p:ext>
+    </p:extLst>
+  </p:cSld>
+  <p:clrMapOvr>
+    <a:masterClrMapping/>
+  </p:clrMapOvr>
+</p:sld>
+</file>
+
+<file path=ppt/slides/slide5.xml><?xml version="1.0" encoding="utf-8"?>
+<p:sld xmlns:a="http://schemas.openxmlformats.org/drawingml/2006/main" xmlns:r="http://schemas.openxmlformats.org/officeDocument/2006/relationships" xmlns:p="http://schemas.openxmlformats.org/presentationml/2006/main">
+  <p:cSld>
+    <p:spTree>
+      <p:nvGrpSpPr>
+        <p:cNvPr id="1" name=""/>
+        <p:cNvGrpSpPr/>
+        <p:nvPr/>
+      </p:nvGrpSpPr>
+      <p:grpSpPr>
+        <a:xfrm>
+          <a:off x="0" y="0"/>
+          <a:ext cx="0" cy="0"/>
+          <a:chOff x="0" y="0"/>
+          <a:chExt cx="0" cy="0"/>
+        </a:xfrm>
+      </p:grpSpPr>
+      <p:sp>
+        <p:nvSpPr>
+          <p:cNvPr id="2" name="Titel 1"/>
+          <p:cNvSpPr>
+            <a:spLocks noGrp="1"/>
+          </p:cNvSpPr>
+          <p:nvPr>
+            <p:ph type="title"/>
+          </p:nvPr>
+        </p:nvSpPr>
+        <p:spPr/>
+        <p:txBody>
+          <a:bodyPr/>
+          <a:lstStyle/>
+          <a:p>
+            <a:r>
+              <a:rPr lang="de-DE" dirty="0"/>
+              <a:t>Elementare Crossover-Operationen</a:t>
+            </a:r>
+            <a:endParaRPr lang="en-GB" dirty="0"/>
+          </a:p>
+        </p:txBody>
+      </p:sp>
+      <p:sp>
+        <p:nvSpPr>
+          <p:cNvPr id="3" name="Inhaltsplatzhalter 2"/>
+          <p:cNvSpPr>
+            <a:spLocks noGrp="1"/>
+          </p:cNvSpPr>
+          <p:nvPr>
+            <p:ph idx="1"/>
+          </p:nvPr>
+        </p:nvSpPr>
+        <p:spPr/>
+        <p:txBody>
+          <a:bodyPr>
+            <a:noAutofit/>
+          </a:bodyPr>
+          <a:lstStyle/>
+          <a:p>
+            <a:pPr>
+              <a:buFont typeface="Wingdings" panose="05000000000000000000" pitchFamily="2" charset="2"/>
+              <a:buChar char="§"/>
+            </a:pPr>
+            <a:r>
+              <a:rPr lang="de-DE" dirty="0"/>
+              <a:t>Dienen als Basis für andere Crossover-Operatoren</a:t>
+            </a:r>
+          </a:p>
+          <a:p>
+            <a:pPr>
+              <a:buFont typeface="Wingdings" panose="05000000000000000000" pitchFamily="2" charset="2"/>
+              <a:buChar char="§"/>
+            </a:pPr>
+            <a:r>
+              <a:rPr lang="de-DE" dirty="0"/>
+              <a:t>Eignen sich prinzipiell für alle Anwendungsfälle</a:t>
+            </a:r>
+          </a:p>
+          <a:p>
+            <a:pPr>
+              <a:buFont typeface="Wingdings" panose="05000000000000000000" pitchFamily="2" charset="2"/>
+              <a:buChar char="§"/>
+            </a:pPr>
+            <a:r>
+              <a:rPr lang="de-DE" dirty="0"/>
+              <a:t>N-Point-Crossover (1-Point/2-Point-Crossover):</a:t>
+            </a:r>
+            <a:br>
+              <a:rPr lang="de-DE" dirty="0"/>
+            </a:br>
+            <a:r>
+              <a:rPr lang="de-DE" dirty="0"/>
+              <a:t>Teilt Chromosomen an n Punkten auf und fügt sie als Kinder neu zusammen</a:t>
+            </a:r>
+          </a:p>
+          <a:p>
+            <a:pPr>
+              <a:buFont typeface="Wingdings" panose="05000000000000000000" pitchFamily="2" charset="2"/>
+              <a:buChar char="§"/>
+            </a:pPr>
+            <a:r>
+              <a:rPr lang="de-DE" dirty="0"/>
+              <a:t>Segmented Crossover:</a:t>
+            </a:r>
+            <a:br>
+              <a:rPr lang="de-DE" dirty="0"/>
+            </a:br>
+            <a:r>
+              <a:rPr lang="de-DE" dirty="0"/>
+              <a:t>Teilt Chromosomen in eine bestimmte Anzahl Segmente</a:t>
+            </a:r>
+          </a:p>
+          <a:p>
+            <a:pPr>
+              <a:buFont typeface="Wingdings" panose="05000000000000000000" pitchFamily="2" charset="2"/>
+              <a:buChar char="§"/>
+            </a:pPr>
+            <a:r>
+              <a:rPr lang="de-DE" dirty="0"/>
+              <a:t>Uniform Crossover:</a:t>
+            </a:r>
+            <a:br>
+              <a:rPr lang="de-DE" dirty="0"/>
+            </a:br>
+            <a:r>
+              <a:rPr lang="de-DE" dirty="0"/>
+              <a:t>Für jedes Gen wird zufällig ausgewählt, an welches Kind es vererbt wird</a:t>
+            </a:r>
+          </a:p>
+          <a:p>
+            <a:pPr>
+              <a:buFont typeface="Wingdings" panose="05000000000000000000" pitchFamily="2" charset="2"/>
+              <a:buChar char="§"/>
+            </a:pPr>
+            <a:r>
+              <a:rPr lang="de-DE" dirty="0"/>
+              <a:t>BILD</a:t>
+            </a:r>
+          </a:p>
+        </p:txBody>
+      </p:sp>
+      <p:sp>
+        <p:nvSpPr>
+          <p:cNvPr id="6" name="Datumsplatzhalter 5"/>
+          <p:cNvSpPr>
+            <a:spLocks noGrp="1"/>
+          </p:cNvSpPr>
+          <p:nvPr>
+            <p:ph type="dt" sz="half" idx="10"/>
+          </p:nvPr>
+        </p:nvSpPr>
+        <p:spPr/>
+        <p:txBody>
+          <a:bodyPr/>
+          <a:lstStyle/>
+          <a:p>
+            <a:fld id="{7A101A87-D014-4826-A19A-EE438A1F464F}" type="datetime1">
+              <a:rPr lang="de-DE" smtClean="0"/>
+              <a:t>06.07.2017</a:t>
+            </a:fld>
+            <a:endParaRPr lang="en-GB" dirty="0"/>
+          </a:p>
+        </p:txBody>
+      </p:sp>
+      <p:sp>
+        <p:nvSpPr>
+          <p:cNvPr id="7" name="Foliennummernplatzhalter 6"/>
+          <p:cNvSpPr>
+            <a:spLocks noGrp="1"/>
+          </p:cNvSpPr>
+          <p:nvPr>
+            <p:ph type="sldNum" sz="quarter" idx="12"/>
+          </p:nvPr>
+        </p:nvSpPr>
+        <p:spPr/>
+        <p:txBody>
+          <a:bodyPr/>
+          <a:lstStyle/>
+          <a:p>
+            <a:fld id="{D28BEBC9-775D-4085-B138-BED27E854DA8}" type="slidenum">
+              <a:rPr lang="en-GB" smtClean="0"/>
+              <a:pPr/>
+              <a:t>5</a:t>
+            </a:fld>
+            <a:endParaRPr lang="en-GB"/>
+          </a:p>
+        </p:txBody>
+      </p:sp>
+    </p:spTree>
+    <p:extLst>
+      <p:ext uri="{BB962C8B-B14F-4D97-AF65-F5344CB8AC3E}">
+        <p14:creationId xmlns:p14="http://schemas.microsoft.com/office/powerpoint/2010/main" val="1490728244"/>
+      </p:ext>
+    </p:extLst>
+  </p:cSld>
+  <p:clrMapOvr>
+    <a:masterClrMapping/>
+  </p:clrMapOvr>
+</p:sld>
+</file>
+
+<file path=ppt/slides/slide6.xml><?xml version="1.0" encoding="utf-8"?>
+<p:sld xmlns:a="http://schemas.openxmlformats.org/drawingml/2006/main" xmlns:r="http://schemas.openxmlformats.org/officeDocument/2006/relationships" xmlns:p="http://schemas.openxmlformats.org/presentationml/2006/main">
+  <p:cSld>
+    <p:spTree>
+      <p:nvGrpSpPr>
+        <p:cNvPr id="1" name=""/>
+        <p:cNvGrpSpPr/>
+        <p:nvPr/>
+      </p:nvGrpSpPr>
+      <p:grpSpPr>
+        <a:xfrm>
+          <a:off x="0" y="0"/>
+          <a:ext cx="0" cy="0"/>
+          <a:chOff x="0" y="0"/>
+          <a:chExt cx="0" cy="0"/>
+        </a:xfrm>
+      </p:grpSpPr>
+      <p:sp>
+        <p:nvSpPr>
+          <p:cNvPr id="2" name="Titel 1"/>
+          <p:cNvSpPr>
+            <a:spLocks noGrp="1"/>
+          </p:cNvSpPr>
+          <p:nvPr>
+            <p:ph type="title"/>
+          </p:nvPr>
+        </p:nvSpPr>
+        <p:spPr/>
+        <p:txBody>
+          <a:bodyPr/>
+          <a:lstStyle/>
+          <a:p>
+            <a:r>
+              <a:rPr lang="de-DE" dirty="0"/>
+              <a:t>Eindimensionale Repräsentationen:</a:t>
+            </a:r>
+            <a:br>
+              <a:rPr lang="de-DE" dirty="0"/>
+            </a:br>
+            <a:r>
+              <a:rPr lang="de-DE" dirty="0"/>
+              <a:t>Binäre Daten</a:t>
+            </a:r>
+            <a:endParaRPr lang="en-GB" dirty="0"/>
+          </a:p>
+        </p:txBody>
+      </p:sp>
+      <p:sp>
+        <p:nvSpPr>
+          <p:cNvPr id="3" name="Inhaltsplatzhalter 2"/>
+          <p:cNvSpPr>
+            <a:spLocks noGrp="1"/>
+          </p:cNvSpPr>
+          <p:nvPr>
+            <p:ph idx="1"/>
+          </p:nvPr>
+        </p:nvSpPr>
+        <p:spPr/>
+        <p:txBody>
+          <a:bodyPr>
+            <a:noAutofit/>
+          </a:bodyPr>
+          <a:lstStyle/>
+          <a:p>
+            <a:pPr>
+              <a:buFont typeface="Wingdings" panose="05000000000000000000" pitchFamily="2" charset="2"/>
+              <a:buChar char="§"/>
+            </a:pPr>
+            <a:r>
+              <a:rPr lang="de-DE" dirty="0"/>
+              <a:t>Prinzipiell für jede Anwendung geeignet</a:t>
+            </a:r>
+          </a:p>
+          <a:p>
+            <a:pPr>
+              <a:buFont typeface="Wingdings" panose="05000000000000000000" pitchFamily="2" charset="2"/>
+              <a:buChar char="§"/>
+            </a:pPr>
+            <a:r>
+              <a:rPr lang="de-DE" dirty="0"/>
+              <a:t>Daten sind als Binärwerte gespeichert</a:t>
+            </a:r>
+          </a:p>
+          <a:p>
+            <a:pPr>
+              <a:buFont typeface="Wingdings" panose="05000000000000000000" pitchFamily="2" charset="2"/>
+              <a:buChar char="§"/>
+            </a:pPr>
+            <a:r>
+              <a:rPr lang="de-DE" dirty="0"/>
+              <a:t>GA sind sehr schnell und effizient</a:t>
+            </a:r>
+          </a:p>
+          <a:p>
+            <a:pPr>
+              <a:buFont typeface="Wingdings" panose="05000000000000000000" pitchFamily="2" charset="2"/>
+              <a:buChar char="§"/>
+            </a:pPr>
+            <a:r>
+              <a:rPr lang="de-DE" dirty="0"/>
+              <a:t>Eignet sich auch für Ganzzahlige Werte!</a:t>
+            </a:r>
+          </a:p>
+          <a:p>
+            <a:pPr>
+              <a:buFont typeface="Wingdings" panose="05000000000000000000" pitchFamily="2" charset="2"/>
+              <a:buChar char="§"/>
+            </a:pPr>
+            <a:r>
+              <a:rPr lang="de-DE" dirty="0"/>
+              <a:t>Mögliche Anwendungsfälle:</a:t>
+            </a:r>
+          </a:p>
+          <a:p>
+            <a:pPr lvl="1">
+              <a:buFont typeface="Wingdings" panose="05000000000000000000" pitchFamily="2" charset="2"/>
+              <a:buChar char="§"/>
+            </a:pPr>
+            <a:r>
+              <a:rPr lang="de-DE" dirty="0"/>
+              <a:t>Classification Problem</a:t>
+            </a:r>
+          </a:p>
+          <a:p>
+            <a:pPr lvl="1">
+              <a:buFont typeface="Wingdings" panose="05000000000000000000" pitchFamily="2" charset="2"/>
+              <a:buChar char="§"/>
+            </a:pPr>
+            <a:r>
+              <a:rPr lang="de-DE" dirty="0"/>
+              <a:t>Multimodal Spin </a:t>
+            </a:r>
+            <a:r>
+              <a:rPr lang="de-DE" dirty="0" err="1"/>
+              <a:t>Lattice</a:t>
+            </a:r>
+            <a:r>
+              <a:rPr lang="de-DE" dirty="0"/>
+              <a:t> Problem</a:t>
+            </a:r>
+          </a:p>
+          <a:p>
+            <a:pPr>
+              <a:buFont typeface="Wingdings" panose="05000000000000000000" pitchFamily="2" charset="2"/>
+              <a:buChar char="§"/>
+            </a:pPr>
+            <a:r>
+              <a:rPr lang="de-DE" dirty="0"/>
+              <a:t>Passende Crossover-Operationen:</a:t>
+            </a:r>
+          </a:p>
+          <a:p>
+            <a:pPr lvl="1">
+              <a:buFont typeface="Wingdings" panose="05000000000000000000" pitchFamily="2" charset="2"/>
+              <a:buChar char="§"/>
+            </a:pPr>
+            <a:r>
+              <a:rPr lang="de-DE" dirty="0"/>
+              <a:t>Self-Crossover</a:t>
+            </a:r>
+          </a:p>
+          <a:p>
+            <a:pPr lvl="1">
+              <a:buFont typeface="Wingdings" panose="05000000000000000000" pitchFamily="2" charset="2"/>
+              <a:buChar char="§"/>
+            </a:pPr>
+            <a:r>
+              <a:rPr lang="en-GB" dirty="0"/>
+              <a:t>Supplementary Crossover</a:t>
+            </a:r>
+          </a:p>
+          <a:p>
+            <a:pPr lvl="1">
+              <a:buFont typeface="Wingdings" panose="05000000000000000000" pitchFamily="2" charset="2"/>
+              <a:buChar char="§"/>
+            </a:pPr>
+            <a:r>
+              <a:rPr lang="en-GB" dirty="0"/>
+              <a:t>Generalized crossover</a:t>
+            </a:r>
+          </a:p>
+        </p:txBody>
+      </p:sp>
+      <p:sp>
+        <p:nvSpPr>
+          <p:cNvPr id="6" name="Datumsplatzhalter 5"/>
+          <p:cNvSpPr>
+            <a:spLocks noGrp="1"/>
+          </p:cNvSpPr>
+          <p:nvPr>
+            <p:ph type="dt" sz="half" idx="10"/>
+          </p:nvPr>
+        </p:nvSpPr>
+        <p:spPr/>
+        <p:txBody>
+          <a:bodyPr/>
+          <a:lstStyle/>
+          <a:p>
+            <a:fld id="{7A101A87-D014-4826-A19A-EE438A1F464F}" type="datetime1">
+              <a:rPr lang="de-DE" smtClean="0"/>
+              <a:t>06.07.2017</a:t>
+            </a:fld>
+            <a:endParaRPr lang="en-GB" dirty="0"/>
+          </a:p>
+        </p:txBody>
+      </p:sp>
+      <p:sp>
+        <p:nvSpPr>
+          <p:cNvPr id="7" name="Foliennummernplatzhalter 6"/>
+          <p:cNvSpPr>
+            <a:spLocks noGrp="1"/>
+          </p:cNvSpPr>
+          <p:nvPr>
+            <p:ph type="sldNum" sz="quarter" idx="12"/>
+          </p:nvPr>
+        </p:nvSpPr>
+        <p:spPr/>
+        <p:txBody>
+          <a:bodyPr/>
+          <a:lstStyle/>
+          <a:p>
+            <a:fld id="{D28BEBC9-775D-4085-B138-BED27E854DA8}" type="slidenum">
+              <a:rPr lang="en-GB" smtClean="0"/>
+              <a:pPr/>
+              <a:t>6</a:t>
+            </a:fld>
+            <a:endParaRPr lang="en-GB"/>
+          </a:p>
+        </p:txBody>
+      </p:sp>
+    </p:spTree>
+    <p:extLst>
+      <p:ext uri="{BB962C8B-B14F-4D97-AF65-F5344CB8AC3E}">
+        <p14:creationId xmlns:p14="http://schemas.microsoft.com/office/powerpoint/2010/main" val="3473468902"/>
+      </p:ext>
+    </p:extLst>
+  </p:cSld>
+  <p:clrMapOvr>
+    <a:masterClrMapping/>
+  </p:clrMapOvr>
+</p:sld>
+</file>
+
+<file path=ppt/slides/slide7.xml><?xml version="1.0" encoding="utf-8"?>
+<p:sld xmlns:a="http://schemas.openxmlformats.org/drawingml/2006/main" xmlns:r="http://schemas.openxmlformats.org/officeDocument/2006/relationships" xmlns:p="http://schemas.openxmlformats.org/presentationml/2006/main">
+  <p:cSld>
+    <p:spTree>
+      <p:nvGrpSpPr>
+        <p:cNvPr id="1" name=""/>
+        <p:cNvGrpSpPr/>
+        <p:nvPr/>
+      </p:nvGrpSpPr>
+      <p:grpSpPr>
+        <a:xfrm>
+          <a:off x="0" y="0"/>
+          <a:ext cx="0" cy="0"/>
+          <a:chOff x="0" y="0"/>
+          <a:chExt cx="0" cy="0"/>
+        </a:xfrm>
+      </p:grpSpPr>
+      <p:sp>
+        <p:nvSpPr>
+          <p:cNvPr id="2" name="Titel 1"/>
+          <p:cNvSpPr>
+            <a:spLocks noGrp="1"/>
+          </p:cNvSpPr>
+          <p:nvPr>
+            <p:ph type="title"/>
+          </p:nvPr>
+        </p:nvSpPr>
+        <p:spPr/>
+        <p:txBody>
+          <a:bodyPr/>
+          <a:lstStyle/>
+          <a:p>
+            <a:r>
+              <a:rPr lang="de-DE" dirty="0"/>
+              <a:t>Eindimensionale Repräsentationen:</a:t>
+            </a:r>
+            <a:br>
+              <a:rPr lang="de-DE" dirty="0"/>
+            </a:br>
+            <a:r>
+              <a:rPr lang="de-DE" dirty="0"/>
+              <a:t>Permutationen</a:t>
+            </a:r>
+            <a:endParaRPr lang="en-GB" dirty="0"/>
+          </a:p>
+        </p:txBody>
+      </p:sp>
+      <p:sp>
+        <p:nvSpPr>
+          <p:cNvPr id="3" name="Inhaltsplatzhalter 2"/>
+          <p:cNvSpPr>
+            <a:spLocks noGrp="1"/>
+          </p:cNvSpPr>
+          <p:nvPr>
+            <p:ph idx="1"/>
+          </p:nvPr>
+        </p:nvSpPr>
+        <p:spPr/>
+        <p:txBody>
+          <a:bodyPr>
+            <a:noAutofit/>
+          </a:bodyPr>
+          <a:lstStyle/>
+          <a:p>
+            <a:pPr>
+              <a:buFont typeface="Wingdings" panose="05000000000000000000" pitchFamily="2" charset="2"/>
+              <a:buChar char="§"/>
+            </a:pPr>
+            <a:r>
+              <a:rPr lang="de-DE" dirty="0"/>
+              <a:t>Text</a:t>
+            </a:r>
+            <a:endParaRPr lang="en-GB" sz="1400" dirty="0"/>
+          </a:p>
+        </p:txBody>
+      </p:sp>
+      <p:sp>
+        <p:nvSpPr>
+          <p:cNvPr id="6" name="Datumsplatzhalter 5"/>
+          <p:cNvSpPr>
+            <a:spLocks noGrp="1"/>
+          </p:cNvSpPr>
+          <p:nvPr>
+            <p:ph type="dt" sz="half" idx="10"/>
+          </p:nvPr>
+        </p:nvSpPr>
+        <p:spPr/>
+        <p:txBody>
+          <a:bodyPr/>
+          <a:lstStyle/>
+          <a:p>
+            <a:fld id="{7A101A87-D014-4826-A19A-EE438A1F464F}" type="datetime1">
+              <a:rPr lang="de-DE" smtClean="0"/>
+              <a:t>06.07.2017</a:t>
+            </a:fld>
+            <a:endParaRPr lang="en-GB" dirty="0"/>
+          </a:p>
+        </p:txBody>
+      </p:sp>
+      <p:sp>
+        <p:nvSpPr>
+          <p:cNvPr id="7" name="Foliennummernplatzhalter 6"/>
+          <p:cNvSpPr>
+            <a:spLocks noGrp="1"/>
+          </p:cNvSpPr>
+          <p:nvPr>
+            <p:ph type="sldNum" sz="quarter" idx="12"/>
+          </p:nvPr>
+        </p:nvSpPr>
+        <p:spPr/>
+        <p:txBody>
+          <a:bodyPr/>
+          <a:lstStyle/>
+          <a:p>
+            <a:fld id="{D28BEBC9-775D-4085-B138-BED27E854DA8}" type="slidenum">
+              <a:rPr lang="en-GB" smtClean="0"/>
+              <a:pPr/>
+              <a:t>7</a:t>
+            </a:fld>
+            <a:endParaRPr lang="en-GB"/>
+          </a:p>
+        </p:txBody>
+      </p:sp>
+    </p:spTree>
+    <p:extLst>
+      <p:ext uri="{BB962C8B-B14F-4D97-AF65-F5344CB8AC3E}">
+        <p14:creationId xmlns:p14="http://schemas.microsoft.com/office/powerpoint/2010/main" val="3358700523"/>
+      </p:ext>
+    </p:extLst>
+  </p:cSld>
+  <p:clrMapOvr>
+    <a:masterClrMapping/>
+  </p:clrMapOvr>
+</p:sld>
+</file>
+
+<file path=ppt/slides/slide8.xml><?xml version="1.0" encoding="utf-8"?>
+<p:sld xmlns:a="http://schemas.openxmlformats.org/drawingml/2006/main" xmlns:r="http://schemas.openxmlformats.org/officeDocument/2006/relationships" xmlns:p="http://schemas.openxmlformats.org/presentationml/2006/main">
+  <p:cSld>
+    <p:spTree>
+      <p:nvGrpSpPr>
+        <p:cNvPr id="1" name=""/>
+        <p:cNvGrpSpPr/>
+        <p:nvPr/>
+      </p:nvGrpSpPr>
+      <p:grpSpPr>
+        <a:xfrm>
+          <a:off x="0" y="0"/>
+          <a:ext cx="0" cy="0"/>
+          <a:chOff x="0" y="0"/>
+          <a:chExt cx="0" cy="0"/>
+        </a:xfrm>
+      </p:grpSpPr>
+      <p:sp>
+        <p:nvSpPr>
+          <p:cNvPr id="2" name="Titel 1"/>
+          <p:cNvSpPr>
+            <a:spLocks noGrp="1"/>
+          </p:cNvSpPr>
+          <p:nvPr>
+            <p:ph type="title"/>
+          </p:nvPr>
+        </p:nvSpPr>
+        <p:spPr/>
+        <p:txBody>
+          <a:bodyPr/>
+          <a:lstStyle/>
+          <a:p>
+            <a:r>
+              <a:rPr lang="de-DE" dirty="0"/>
+              <a:t>Eindimensionale Repräsentationen:</a:t>
+            </a:r>
+            <a:br>
+              <a:rPr lang="de-DE" dirty="0"/>
+            </a:br>
+            <a:r>
+              <a:rPr lang="de-DE" dirty="0"/>
+              <a:t>Fließkommawerte</a:t>
+            </a:r>
+            <a:endParaRPr lang="en-GB" dirty="0"/>
+          </a:p>
+        </p:txBody>
+      </p:sp>
+      <p:sp>
+        <p:nvSpPr>
+          <p:cNvPr id="3" name="Inhaltsplatzhalter 2"/>
+          <p:cNvSpPr>
+            <a:spLocks noGrp="1"/>
+          </p:cNvSpPr>
+          <p:nvPr>
+            <p:ph idx="1"/>
+          </p:nvPr>
+        </p:nvSpPr>
+        <p:spPr/>
+        <p:txBody>
+          <a:bodyPr>
+            <a:noAutofit/>
+          </a:bodyPr>
+          <a:lstStyle/>
+          <a:p>
+            <a:pPr>
+              <a:buFont typeface="Wingdings" panose="05000000000000000000" pitchFamily="2" charset="2"/>
+              <a:buChar char="§"/>
+            </a:pPr>
+            <a:r>
+              <a:rPr lang="de-DE" dirty="0"/>
+              <a:t>Text</a:t>
+            </a:r>
+            <a:endParaRPr lang="en-GB" sz="1400" dirty="0"/>
+          </a:p>
+        </p:txBody>
+      </p:sp>
+      <p:sp>
+        <p:nvSpPr>
+          <p:cNvPr id="6" name="Datumsplatzhalter 5"/>
+          <p:cNvSpPr>
+            <a:spLocks noGrp="1"/>
+          </p:cNvSpPr>
+          <p:nvPr>
+            <p:ph type="dt" sz="half" idx="10"/>
+          </p:nvPr>
+        </p:nvSpPr>
+        <p:spPr/>
+        <p:txBody>
+          <a:bodyPr/>
+          <a:lstStyle/>
+          <a:p>
+            <a:fld id="{7A101A87-D014-4826-A19A-EE438A1F464F}" type="datetime1">
+              <a:rPr lang="de-DE" smtClean="0"/>
+              <a:t>06.07.2017</a:t>
+            </a:fld>
+            <a:endParaRPr lang="en-GB" dirty="0"/>
+          </a:p>
+        </p:txBody>
+      </p:sp>
+      <p:sp>
+        <p:nvSpPr>
+          <p:cNvPr id="7" name="Foliennummernplatzhalter 6"/>
+          <p:cNvSpPr>
+            <a:spLocks noGrp="1"/>
+          </p:cNvSpPr>
+          <p:nvPr>
+            <p:ph type="sldNum" sz="quarter" idx="12"/>
+          </p:nvPr>
+        </p:nvSpPr>
+        <p:spPr/>
+        <p:txBody>
+          <a:bodyPr/>
+          <a:lstStyle/>
+          <a:p>
+            <a:fld id="{D28BEBC9-775D-4085-B138-BED27E854DA8}" type="slidenum">
+              <a:rPr lang="en-GB" smtClean="0"/>
+              <a:pPr/>
+              <a:t>8</a:t>
+            </a:fld>
+            <a:endParaRPr lang="en-GB"/>
+          </a:p>
+        </p:txBody>
+      </p:sp>
+    </p:spTree>
+    <p:extLst>
+      <p:ext uri="{BB962C8B-B14F-4D97-AF65-F5344CB8AC3E}">
+        <p14:creationId xmlns:p14="http://schemas.microsoft.com/office/powerpoint/2010/main" val="3789726562"/>
+      </p:ext>
+    </p:extLst>
+  </p:cSld>
+  <p:clrMapOvr>
+    <a:masterClrMapping/>
+  </p:clrMapOvr>
+</p:sld>
+</file>
+
+<file path=ppt/slides/slide9.xml><?xml version="1.0" encoding="utf-8"?>
+<p:sld xmlns:a="http://schemas.openxmlformats.org/drawingml/2006/main" xmlns:r="http://schemas.openxmlformats.org/officeDocument/2006/relationships" xmlns:p="http://schemas.openxmlformats.org/presentationml/2006/main">
+  <p:cSld>
+    <p:spTree>
+      <p:nvGrpSpPr>
+        <p:cNvPr id="1" name=""/>
+        <p:cNvGrpSpPr/>
+        <p:nvPr/>
+      </p:nvGrpSpPr>
+      <p:grpSpPr>
+        <a:xfrm>
+          <a:off x="0" y="0"/>
+          <a:ext cx="0" cy="0"/>
+          <a:chOff x="0" y="0"/>
+          <a:chExt cx="0" cy="0"/>
+        </a:xfrm>
+      </p:grpSpPr>
+      <p:sp>
+        <p:nvSpPr>
+          <p:cNvPr id="2" name="Titel 1"/>
+          <p:cNvSpPr>
+            <a:spLocks noGrp="1"/>
+          </p:cNvSpPr>
+          <p:nvPr>
+            <p:ph type="title"/>
+          </p:nvPr>
+        </p:nvSpPr>
+        <p:spPr/>
+        <p:txBody>
+          <a:bodyPr/>
+          <a:lstStyle/>
+          <a:p>
+            <a:r>
+              <a:rPr lang="de-DE" dirty="0"/>
+              <a:t>Eindimensionale Repräsentationen:</a:t>
+            </a:r>
+            <a:br>
+              <a:rPr lang="de-DE" dirty="0"/>
+            </a:br>
+            <a:r>
+              <a:rPr lang="de-DE" dirty="0"/>
+              <a:t>Zeichenketten</a:t>
+            </a:r>
+            <a:endParaRPr lang="en-GB" dirty="0"/>
+          </a:p>
+        </p:txBody>
+      </p:sp>
+      <p:sp>
+        <p:nvSpPr>
+          <p:cNvPr id="3" name="Inhaltsplatzhalter 2"/>
+          <p:cNvSpPr>
+            <a:spLocks noGrp="1"/>
+          </p:cNvSpPr>
+          <p:nvPr>
+            <p:ph idx="1"/>
+          </p:nvPr>
+        </p:nvSpPr>
+        <p:spPr/>
+        <p:txBody>
+          <a:bodyPr>
+            <a:noAutofit/>
+          </a:bodyPr>
+          <a:lstStyle/>
+          <a:p>
+            <a:pPr>
+              <a:buFont typeface="Wingdings" panose="05000000000000000000" pitchFamily="2" charset="2"/>
+              <a:buChar char="§"/>
+            </a:pPr>
+            <a:r>
+              <a:rPr lang="de-DE" dirty="0"/>
+              <a:t>Text</a:t>
+            </a:r>
+            <a:endParaRPr lang="en-GB" sz="1400" dirty="0"/>
+          </a:p>
+        </p:txBody>
+      </p:sp>
+      <p:sp>
+        <p:nvSpPr>
+          <p:cNvPr id="6" name="Datumsplatzhalter 5"/>
+          <p:cNvSpPr>
+            <a:spLocks noGrp="1"/>
+          </p:cNvSpPr>
+          <p:nvPr>
+            <p:ph type="dt" sz="half" idx="10"/>
+          </p:nvPr>
+        </p:nvSpPr>
+        <p:spPr/>
+        <p:txBody>
+          <a:bodyPr/>
+          <a:lstStyle/>
+          <a:p>
+            <a:fld id="{7A101A87-D014-4826-A19A-EE438A1F464F}" type="datetime1">
+              <a:rPr lang="de-DE" smtClean="0"/>
+              <a:t>06.07.2017</a:t>
+            </a:fld>
+            <a:endParaRPr lang="en-GB" dirty="0"/>
+          </a:p>
+        </p:txBody>
+      </p:sp>
+      <p:sp>
+        <p:nvSpPr>
+          <p:cNvPr id="7" name="Foliennummernplatzhalter 6"/>
+          <p:cNvSpPr>
+            <a:spLocks noGrp="1"/>
+          </p:cNvSpPr>
+          <p:nvPr>
+            <p:ph type="sldNum" sz="quarter" idx="12"/>
+          </p:nvPr>
+        </p:nvSpPr>
+        <p:spPr/>
+        <p:txBody>
+          <a:bodyPr/>
+          <a:lstStyle/>
+          <a:p>
+            <a:fld id="{D28BEBC9-775D-4085-B138-BED27E854DA8}" type="slidenum">
+              <a:rPr lang="en-GB" smtClean="0"/>
+              <a:pPr/>
+              <a:t>9</a:t>
+            </a:fld>
+            <a:endParaRPr lang="en-GB"/>
+          </a:p>
+        </p:txBody>
+      </p:sp>
+    </p:spTree>
+    <p:extLst>
+      <p:ext uri="{BB962C8B-B14F-4D97-AF65-F5344CB8AC3E}">
+        <p14:creationId xmlns:p14="http://schemas.microsoft.com/office/powerpoint/2010/main" val="4096609432"/>
       </p:ext>
     </p:extLst>
   </p:cSld>

</xml_diff>

<commit_message>
added 1d rep to pptx
</commit_message>
<xml_diff>
--- a/Vortragsfolien.pptx
+++ b/Vortragsfolien.pptx
@@ -5,10 +5,10 @@
     <p:sldMasterId id="2147483696" r:id="rId1"/>
   </p:sldMasterIdLst>
   <p:notesMasterIdLst>
-    <p:notesMasterId r:id="rId17"/>
+    <p:notesMasterId r:id="rId18"/>
   </p:notesMasterIdLst>
   <p:handoutMasterIdLst>
-    <p:handoutMasterId r:id="rId18"/>
+    <p:handoutMasterId r:id="rId19"/>
   </p:handoutMasterIdLst>
   <p:sldIdLst>
     <p:sldId id="256" r:id="rId2"/>
@@ -18,14 +18,15 @@
     <p:sldId id="274" r:id="rId6"/>
     <p:sldId id="265" r:id="rId7"/>
     <p:sldId id="270" r:id="rId8"/>
-    <p:sldId id="271" r:id="rId9"/>
-    <p:sldId id="272" r:id="rId10"/>
-    <p:sldId id="266" r:id="rId11"/>
-    <p:sldId id="267" r:id="rId12"/>
-    <p:sldId id="268" r:id="rId13"/>
-    <p:sldId id="269" r:id="rId14"/>
-    <p:sldId id="273" r:id="rId15"/>
-    <p:sldId id="275" r:id="rId16"/>
+    <p:sldId id="276" r:id="rId9"/>
+    <p:sldId id="271" r:id="rId10"/>
+    <p:sldId id="277" r:id="rId11"/>
+    <p:sldId id="278" r:id="rId12"/>
+    <p:sldId id="279" r:id="rId13"/>
+    <p:sldId id="280" r:id="rId14"/>
+    <p:sldId id="281" r:id="rId15"/>
+    <p:sldId id="269" r:id="rId16"/>
+    <p:sldId id="273" r:id="rId17"/>
   </p:sldIdLst>
   <p:sldSz cx="9144000" cy="6858000" type="screen4x3"/>
   <p:notesSz cx="6797675" cy="9926638"/>
@@ -221,7 +222,7 @@
           <a:p>
             <a:fld id="{715A281C-4A89-48CD-A669-9FDFF37F42B7}" type="datetimeFigureOut">
               <a:rPr lang="en-GB" smtClean="0"/>
-              <a:t>06/07/2017</a:t>
+              <a:t>10/07/2017</a:t>
             </a:fld>
             <a:endParaRPr lang="en-GB"/>
           </a:p>
@@ -386,7 +387,7 @@
           <a:p>
             <a:fld id="{0DA8FC89-82F1-4511-B204-39F19FAF212E}" type="datetimeFigureOut">
               <a:rPr lang="en-GB" smtClean="0"/>
-              <a:t>06/07/2017</a:t>
+              <a:t>10/07/2017</a:t>
             </a:fld>
             <a:endParaRPr lang="en-GB"/>
           </a:p>
@@ -782,7 +783,259 @@
           <a:bodyPr/>
           <a:lstStyle/>
           <a:p>
-            <a:endParaRPr lang="en-GB"/>
+            <a:r>
+              <a:rPr lang="de-DE" sz="1200" b="1" i="0" kern="1200" dirty="0" err="1">
+                <a:solidFill>
+                  <a:schemeClr val="tx1"/>
+                </a:solidFill>
+                <a:effectLst/>
+                <a:latin typeface="+mn-lt"/>
+                <a:ea typeface="+mn-ea"/>
+                <a:cs typeface="+mn-cs"/>
+              </a:rPr>
+              <a:t>Taguchi</a:t>
+            </a:r>
+            <a:r>
+              <a:rPr lang="de-DE" sz="1200" b="1" i="0" kern="1200" dirty="0">
+                <a:solidFill>
+                  <a:schemeClr val="tx1"/>
+                </a:solidFill>
+                <a:effectLst/>
+                <a:latin typeface="+mn-lt"/>
+                <a:ea typeface="+mn-ea"/>
+                <a:cs typeface="+mn-cs"/>
+              </a:rPr>
+              <a:t> Crossover (TC) </a:t>
+            </a:r>
+            <a:r>
+              <a:rPr lang="de-DE" sz="1200" b="0" i="0" kern="1200" dirty="0">
+                <a:solidFill>
+                  <a:schemeClr val="tx1"/>
+                </a:solidFill>
+                <a:effectLst/>
+                <a:latin typeface="+mn-lt"/>
+                <a:ea typeface="+mn-ea"/>
+                <a:cs typeface="+mn-cs"/>
+              </a:rPr>
+              <a:t>Nutzt statistische Daten innerhalb einer Matrix um das beste Ergebnis zu finden.</a:t>
+            </a:r>
+            <a:br>
+              <a:rPr lang="de-DE" sz="1200" b="0" i="0" kern="1200" dirty="0">
+                <a:solidFill>
+                  <a:schemeClr val="tx1"/>
+                </a:solidFill>
+                <a:effectLst/>
+                <a:latin typeface="+mn-lt"/>
+                <a:ea typeface="+mn-ea"/>
+                <a:cs typeface="+mn-cs"/>
+              </a:rPr>
+            </a:br>
+            <a:r>
+              <a:rPr lang="de-DE" sz="1200" b="1" i="0" kern="1200" dirty="0">
+                <a:solidFill>
+                  <a:schemeClr val="tx1"/>
+                </a:solidFill>
+                <a:effectLst/>
+                <a:latin typeface="+mn-lt"/>
+                <a:ea typeface="+mn-ea"/>
+                <a:cs typeface="+mn-cs"/>
+              </a:rPr>
+              <a:t>Average Crossover </a:t>
+            </a:r>
+            <a:r>
+              <a:rPr lang="de-DE" sz="1200" b="0" i="0" kern="1200" dirty="0">
+                <a:solidFill>
+                  <a:schemeClr val="tx1"/>
+                </a:solidFill>
+                <a:effectLst/>
+                <a:latin typeface="+mn-lt"/>
+                <a:ea typeface="+mn-ea"/>
+                <a:cs typeface="+mn-cs"/>
+              </a:rPr>
+              <a:t>Modifizierter </a:t>
+            </a:r>
+            <a:r>
+              <a:rPr lang="de-DE" sz="1200" b="0" i="1" kern="1200" dirty="0" err="1">
+                <a:solidFill>
+                  <a:schemeClr val="tx1"/>
+                </a:solidFill>
+                <a:effectLst/>
+                <a:latin typeface="+mn-lt"/>
+                <a:ea typeface="+mn-ea"/>
+                <a:cs typeface="+mn-cs"/>
+              </a:rPr>
+              <a:t>One</a:t>
+            </a:r>
+            <a:r>
+              <a:rPr lang="de-DE" sz="1200" b="0" i="1" kern="1200" dirty="0">
+                <a:solidFill>
+                  <a:schemeClr val="tx1"/>
+                </a:solidFill>
+                <a:effectLst/>
+                <a:latin typeface="+mn-lt"/>
+                <a:ea typeface="+mn-ea"/>
+                <a:cs typeface="+mn-cs"/>
+              </a:rPr>
+              <a:t>-Point-Crossover</a:t>
+            </a:r>
+            <a:r>
+              <a:rPr lang="de-DE" sz="1200" b="0" i="0" kern="1200" dirty="0">
+                <a:solidFill>
+                  <a:schemeClr val="tx1"/>
+                </a:solidFill>
+                <a:effectLst/>
+                <a:latin typeface="+mn-lt"/>
+                <a:ea typeface="+mn-ea"/>
+                <a:cs typeface="+mn-cs"/>
+              </a:rPr>
+              <a:t>, bei dem die Durchschnittswerte zwischen beiden Eltern anstatt den Elternwerten der einzelnen</a:t>
+            </a:r>
+            <a:br>
+              <a:rPr lang="de-DE" sz="1200" b="0" i="0" kern="1200" dirty="0">
+                <a:solidFill>
+                  <a:schemeClr val="tx1"/>
+                </a:solidFill>
+                <a:effectLst/>
+                <a:latin typeface="+mn-lt"/>
+                <a:ea typeface="+mn-ea"/>
+                <a:cs typeface="+mn-cs"/>
+              </a:rPr>
+            </a:br>
+            <a:r>
+              <a:rPr lang="de-DE" sz="1200" b="0" i="0" kern="1200" dirty="0">
+                <a:solidFill>
+                  <a:schemeClr val="tx1"/>
+                </a:solidFill>
+                <a:effectLst/>
+                <a:latin typeface="+mn-lt"/>
+                <a:ea typeface="+mn-ea"/>
+                <a:cs typeface="+mn-cs"/>
+              </a:rPr>
+              <a:t>Gene genutzt werden. [19]</a:t>
+            </a:r>
+            <a:br>
+              <a:rPr lang="de-DE" sz="1200" b="0" i="0" kern="1200" dirty="0">
+                <a:solidFill>
+                  <a:schemeClr val="tx1"/>
+                </a:solidFill>
+                <a:effectLst/>
+                <a:latin typeface="+mn-lt"/>
+                <a:ea typeface="+mn-ea"/>
+                <a:cs typeface="+mn-cs"/>
+              </a:rPr>
+            </a:br>
+            <a:r>
+              <a:rPr lang="de-DE" sz="1200" b="1" i="0" kern="1200" dirty="0" err="1">
+                <a:solidFill>
+                  <a:schemeClr val="tx1"/>
+                </a:solidFill>
+                <a:effectLst/>
+                <a:latin typeface="+mn-lt"/>
+                <a:ea typeface="+mn-ea"/>
+                <a:cs typeface="+mn-cs"/>
+              </a:rPr>
+              <a:t>Fuzzy</a:t>
+            </a:r>
+            <a:r>
+              <a:rPr lang="de-DE" sz="1200" b="1" i="0" kern="1200" dirty="0">
+                <a:solidFill>
+                  <a:schemeClr val="tx1"/>
+                </a:solidFill>
+                <a:effectLst/>
+                <a:latin typeface="+mn-lt"/>
+                <a:ea typeface="+mn-ea"/>
+                <a:cs typeface="+mn-cs"/>
+              </a:rPr>
+              <a:t> </a:t>
+            </a:r>
+            <a:r>
+              <a:rPr lang="de-DE" sz="1200" b="1" i="0" kern="1200" dirty="0" err="1">
+                <a:solidFill>
+                  <a:schemeClr val="tx1"/>
+                </a:solidFill>
+                <a:effectLst/>
+                <a:latin typeface="+mn-lt"/>
+                <a:ea typeface="+mn-ea"/>
+                <a:cs typeface="+mn-cs"/>
+              </a:rPr>
+              <a:t>Arithmetic</a:t>
+            </a:r>
+            <a:r>
+              <a:rPr lang="de-DE" sz="1200" b="1" i="0" kern="1200" dirty="0">
+                <a:solidFill>
+                  <a:schemeClr val="tx1"/>
+                </a:solidFill>
+                <a:effectLst/>
+                <a:latin typeface="+mn-lt"/>
+                <a:ea typeface="+mn-ea"/>
+                <a:cs typeface="+mn-cs"/>
+              </a:rPr>
+              <a:t> </a:t>
+            </a:r>
+            <a:r>
+              <a:rPr lang="de-DE" sz="1200" b="1" i="0" kern="1200" dirty="0" err="1">
+                <a:solidFill>
+                  <a:schemeClr val="tx1"/>
+                </a:solidFill>
+                <a:effectLst/>
+                <a:latin typeface="+mn-lt"/>
+                <a:ea typeface="+mn-ea"/>
+                <a:cs typeface="+mn-cs"/>
+              </a:rPr>
+              <a:t>Weighted</a:t>
+            </a:r>
+            <a:r>
+              <a:rPr lang="de-DE" sz="1200" b="1" i="0" kern="1200" dirty="0">
+                <a:solidFill>
+                  <a:schemeClr val="tx1"/>
+                </a:solidFill>
+                <a:effectLst/>
+                <a:latin typeface="+mn-lt"/>
+                <a:ea typeface="+mn-ea"/>
+                <a:cs typeface="+mn-cs"/>
+              </a:rPr>
+              <a:t> Mean: </a:t>
+            </a:r>
+            <a:r>
+              <a:rPr lang="de-DE" sz="1200" b="0" i="0" kern="1200" dirty="0">
+                <a:solidFill>
+                  <a:schemeClr val="tx1"/>
+                </a:solidFill>
+                <a:effectLst/>
+                <a:latin typeface="+mn-lt"/>
+                <a:ea typeface="+mn-ea"/>
+                <a:cs typeface="+mn-cs"/>
+              </a:rPr>
+              <a:t>Berechnet mithilfe der </a:t>
+            </a:r>
+            <a:r>
+              <a:rPr lang="de-DE" sz="1200" b="0" i="0" kern="1200" dirty="0" err="1">
+                <a:solidFill>
+                  <a:schemeClr val="tx1"/>
+                </a:solidFill>
+                <a:effectLst/>
+                <a:latin typeface="+mn-lt"/>
+                <a:ea typeface="+mn-ea"/>
+                <a:cs typeface="+mn-cs"/>
+              </a:rPr>
+              <a:t>Fuzzy</a:t>
+            </a:r>
+            <a:r>
+              <a:rPr lang="de-DE" sz="1200" b="0" i="0" kern="1200" dirty="0">
+                <a:solidFill>
+                  <a:schemeClr val="tx1"/>
+                </a:solidFill>
+                <a:effectLst/>
+                <a:latin typeface="+mn-lt"/>
+                <a:ea typeface="+mn-ea"/>
+                <a:cs typeface="+mn-cs"/>
+              </a:rPr>
+              <a:t>-Arithmetik die Werte der Kinder.</a:t>
+            </a:r>
+            <a:br>
+              <a:rPr lang="de-DE" dirty="0"/>
+            </a:br>
+            <a:endParaRPr lang="en-GB" dirty="0"/>
           </a:p>
         </p:txBody>
       </p:sp>
@@ -812,7 +1065,7 @@
     </p:spTree>
     <p:extLst>
       <p:ext uri="{BB962C8B-B14F-4D97-AF65-F5344CB8AC3E}">
-        <p14:creationId xmlns:p14="http://schemas.microsoft.com/office/powerpoint/2010/main" val="1832947796"/>
+        <p14:creationId xmlns:p14="http://schemas.microsoft.com/office/powerpoint/2010/main" val="4091611145"/>
       </p:ext>
     </p:extLst>
   </p:cSld>
@@ -866,7 +1119,72 @@
           <a:bodyPr/>
           <a:lstStyle/>
           <a:p>
-            <a:endParaRPr lang="en-GB"/>
+            <a:r>
+              <a:rPr lang="de-DE" sz="1200" b="0" i="0" kern="1200" dirty="0">
+                <a:solidFill>
+                  <a:schemeClr val="tx1"/>
+                </a:solidFill>
+                <a:effectLst/>
+                <a:latin typeface="+mn-lt"/>
+                <a:ea typeface="+mn-ea"/>
+                <a:cs typeface="+mn-cs"/>
+              </a:rPr>
+              <a:t>Biologie: Gene werden mit Buchstaben gekennzeichnet</a:t>
+            </a:r>
+          </a:p>
+          <a:p>
+            <a:r>
+              <a:rPr lang="de-DE" sz="1200" b="0" i="0" kern="1200" dirty="0">
+                <a:solidFill>
+                  <a:schemeClr val="tx1"/>
+                </a:solidFill>
+                <a:effectLst/>
+                <a:latin typeface="+mn-lt"/>
+                <a:ea typeface="+mn-ea"/>
+                <a:cs typeface="+mn-cs"/>
+              </a:rPr>
+              <a:t>Längenunterscheidung basierend auf Länge der Eltern</a:t>
+            </a:r>
+          </a:p>
+          <a:p>
+            <a:endParaRPr lang="de-DE" sz="1200" b="0" i="0" kern="1200" dirty="0">
+              <a:solidFill>
+                <a:schemeClr val="tx1"/>
+              </a:solidFill>
+              <a:effectLst/>
+              <a:latin typeface="+mn-lt"/>
+              <a:ea typeface="+mn-ea"/>
+              <a:cs typeface="+mn-cs"/>
+            </a:endParaRPr>
+          </a:p>
+          <a:p>
+            <a:r>
+              <a:rPr lang="de-DE" sz="1200" b="0" i="0" kern="1200" dirty="0">
+                <a:solidFill>
+                  <a:schemeClr val="tx1"/>
+                </a:solidFill>
+                <a:effectLst/>
+                <a:latin typeface="+mn-lt"/>
+                <a:ea typeface="+mn-ea"/>
+                <a:cs typeface="+mn-cs"/>
+              </a:rPr>
+              <a:t>C1/C2 Crossover: Ermittelt Struktur und trennt unterschiedliche Strukturen</a:t>
+            </a:r>
+          </a:p>
+          <a:p>
+            <a:r>
+              <a:rPr lang="de-DE" sz="1200" b="0" i="0" kern="1200" dirty="0">
+                <a:solidFill>
+                  <a:schemeClr val="tx1"/>
+                </a:solidFill>
+                <a:effectLst/>
+                <a:latin typeface="+mn-lt"/>
+                <a:ea typeface="+mn-ea"/>
+                <a:cs typeface="+mn-cs"/>
+              </a:rPr>
+              <a:t>Inside Crossover: Kinder sind länger als kurzer Elternteil bzw. kürzer als langer Elternteil</a:t>
+            </a:r>
+            <a:endParaRPr lang="en-GB" b="0" dirty="0"/>
           </a:p>
         </p:txBody>
       </p:sp>
@@ -896,7 +1214,7 @@
     </p:spTree>
     <p:extLst>
       <p:ext uri="{BB962C8B-B14F-4D97-AF65-F5344CB8AC3E}">
-        <p14:creationId xmlns:p14="http://schemas.microsoft.com/office/powerpoint/2010/main" val="4262897057"/>
+        <p14:creationId xmlns:p14="http://schemas.microsoft.com/office/powerpoint/2010/main" val="3771717597"/>
       </p:ext>
     </p:extLst>
   </p:cSld>
@@ -950,7 +1268,7 @@
           <a:bodyPr/>
           <a:lstStyle/>
           <a:p>
-            <a:endParaRPr lang="en-GB"/>
+            <a:endParaRPr lang="en-GB" b="0" dirty="0"/>
           </a:p>
         </p:txBody>
       </p:sp>
@@ -980,7 +1298,7 @@
     </p:spTree>
     <p:extLst>
       <p:ext uri="{BB962C8B-B14F-4D97-AF65-F5344CB8AC3E}">
-        <p14:creationId xmlns:p14="http://schemas.microsoft.com/office/powerpoint/2010/main" val="492304999"/>
+        <p14:creationId xmlns:p14="http://schemas.microsoft.com/office/powerpoint/2010/main" val="3220851959"/>
       </p:ext>
     </p:extLst>
   </p:cSld>
@@ -1034,7 +1352,7 @@
           <a:bodyPr/>
           <a:lstStyle/>
           <a:p>
-            <a:endParaRPr lang="en-GB"/>
+            <a:endParaRPr lang="en-GB" b="0" dirty="0"/>
           </a:p>
         </p:txBody>
       </p:sp>
@@ -1064,7 +1382,7 @@
     </p:spTree>
     <p:extLst>
       <p:ext uri="{BB962C8B-B14F-4D97-AF65-F5344CB8AC3E}">
-        <p14:creationId xmlns:p14="http://schemas.microsoft.com/office/powerpoint/2010/main" val="502191871"/>
+        <p14:creationId xmlns:p14="http://schemas.microsoft.com/office/powerpoint/2010/main" val="221283970"/>
       </p:ext>
     </p:extLst>
   </p:cSld>
@@ -1118,7 +1436,7 @@
           <a:bodyPr/>
           <a:lstStyle/>
           <a:p>
-            <a:endParaRPr lang="en-GB"/>
+            <a:endParaRPr lang="en-GB" b="0" dirty="0"/>
           </a:p>
         </p:txBody>
       </p:sp>
@@ -1148,7 +1466,7 @@
     </p:spTree>
     <p:extLst>
       <p:ext uri="{BB962C8B-B14F-4D97-AF65-F5344CB8AC3E}">
-        <p14:creationId xmlns:p14="http://schemas.microsoft.com/office/powerpoint/2010/main" val="3279664561"/>
+        <p14:creationId xmlns:p14="http://schemas.microsoft.com/office/powerpoint/2010/main" val="627892248"/>
       </p:ext>
     </p:extLst>
   </p:cSld>
@@ -1232,7 +1550,91 @@
     </p:spTree>
     <p:extLst>
       <p:ext uri="{BB962C8B-B14F-4D97-AF65-F5344CB8AC3E}">
-        <p14:creationId xmlns:p14="http://schemas.microsoft.com/office/powerpoint/2010/main" val="4129358632"/>
+        <p14:creationId xmlns:p14="http://schemas.microsoft.com/office/powerpoint/2010/main" val="502191871"/>
+      </p:ext>
+    </p:extLst>
+  </p:cSld>
+  <p:clrMapOvr>
+    <a:masterClrMapping/>
+  </p:clrMapOvr>
+</p:notes>
+</file>
+
+<file path=ppt/notesSlides/notesSlide16.xml><?xml version="1.0" encoding="utf-8"?>
+<p:notes xmlns:a="http://schemas.openxmlformats.org/drawingml/2006/main" xmlns:r="http://schemas.openxmlformats.org/officeDocument/2006/relationships" xmlns:p="http://schemas.openxmlformats.org/presentationml/2006/main">
+  <p:cSld>
+    <p:spTree>
+      <p:nvGrpSpPr>
+        <p:cNvPr id="1" name=""/>
+        <p:cNvGrpSpPr/>
+        <p:nvPr/>
+      </p:nvGrpSpPr>
+      <p:grpSpPr>
+        <a:xfrm>
+          <a:off x="0" y="0"/>
+          <a:ext cx="0" cy="0"/>
+          <a:chOff x="0" y="0"/>
+          <a:chExt cx="0" cy="0"/>
+        </a:xfrm>
+      </p:grpSpPr>
+      <p:sp>
+        <p:nvSpPr>
+          <p:cNvPr id="2" name="Folienbildplatzhalter 1"/>
+          <p:cNvSpPr>
+            <a:spLocks noGrp="1" noRot="1" noChangeAspect="1"/>
+          </p:cNvSpPr>
+          <p:nvPr>
+            <p:ph type="sldImg"/>
+          </p:nvPr>
+        </p:nvSpPr>
+        <p:spPr/>
+      </p:sp>
+      <p:sp>
+        <p:nvSpPr>
+          <p:cNvPr id="3" name="Notizenplatzhalter 2"/>
+          <p:cNvSpPr>
+            <a:spLocks noGrp="1"/>
+          </p:cNvSpPr>
+          <p:nvPr>
+            <p:ph type="body" idx="1"/>
+          </p:nvPr>
+        </p:nvSpPr>
+        <p:spPr/>
+        <p:txBody>
+          <a:bodyPr/>
+          <a:lstStyle/>
+          <a:p>
+            <a:endParaRPr lang="en-GB"/>
+          </a:p>
+        </p:txBody>
+      </p:sp>
+      <p:sp>
+        <p:nvSpPr>
+          <p:cNvPr id="4" name="Foliennummernplatzhalter 3"/>
+          <p:cNvSpPr>
+            <a:spLocks noGrp="1"/>
+          </p:cNvSpPr>
+          <p:nvPr>
+            <p:ph type="sldNum" sz="quarter" idx="10"/>
+          </p:nvPr>
+        </p:nvSpPr>
+        <p:spPr/>
+        <p:txBody>
+          <a:bodyPr/>
+          <a:lstStyle/>
+          <a:p>
+            <a:fld id="{0250CB43-5682-4E83-A1E5-9760697AEC77}" type="slidenum">
+              <a:rPr lang="en-GB" smtClean="0"/>
+              <a:t>16</a:t>
+            </a:fld>
+            <a:endParaRPr lang="en-GB"/>
+          </a:p>
+        </p:txBody>
+      </p:sp>
+    </p:spTree>
+    <p:extLst>
+      <p:ext uri="{BB962C8B-B14F-4D97-AF65-F5344CB8AC3E}">
+        <p14:creationId xmlns:p14="http://schemas.microsoft.com/office/powerpoint/2010/main" val="3279664561"/>
       </p:ext>
     </p:extLst>
   </p:cSld>
@@ -1623,22 +2025,12 @@
           <a:lstStyle/>
           <a:p>
             <a:r>
-              <a:rPr lang="de-DE" dirty="0"/>
-              <a:t>Classification Problem: Lösung soll in verschiedene Kategorien klassifiziert werden.</a:t>
-            </a:r>
-          </a:p>
-          <a:p>
-            <a:r>
-              <a:rPr lang="de-DE" dirty="0"/>
-              <a:t>Multimodal Spin </a:t>
-            </a:r>
-            <a:r>
-              <a:rPr lang="de-DE" dirty="0" err="1"/>
-              <a:t>Lattice</a:t>
-            </a:r>
-            <a:r>
-              <a:rPr lang="de-DE" dirty="0"/>
-              <a:t> Problem: Suchen eines minimalen Energiezustandes für 450 Spins mit je vier Zuständen auf einem 2D-Gitter.</a:t>
+              <a:rPr lang="de-DE" b="1" dirty="0"/>
+              <a:t>Classification Problem</a:t>
+            </a:r>
+            <a:r>
+              <a:rPr lang="de-DE" dirty="0"/>
+              <a:t>: Lösung soll in verschiedene Kategorien klassifiziert werden.</a:t>
             </a:r>
           </a:p>
           <a:p>
@@ -1646,8 +2038,12 @@
           </a:p>
           <a:p>
             <a:r>
+              <a:rPr lang="en-GB" b="1" dirty="0"/>
+              <a:t>Self-Crossover</a:t>
+            </a:r>
+            <a:r>
               <a:rPr lang="en-GB" dirty="0"/>
-              <a:t>Self-Crossover: </a:t>
+              <a:t>: </a:t>
             </a:r>
             <a:r>
               <a:rPr lang="en-GB" dirty="0" err="1"/>
@@ -1684,8 +2080,12 @@
           </a:p>
           <a:p>
             <a:r>
+              <a:rPr lang="en-GB" b="1" dirty="0"/>
+              <a:t>Supplementary Crossover</a:t>
+            </a:r>
+            <a:r>
               <a:rPr lang="en-GB" dirty="0"/>
-              <a:t>Supplementary Crossover: </a:t>
+              <a:t>: </a:t>
             </a:r>
             <a:r>
               <a:rPr lang="en-GB" dirty="0" err="1"/>
@@ -1730,8 +2130,12 @@
           </a:p>
           <a:p>
             <a:r>
+              <a:rPr lang="en-GB" b="1" dirty="0"/>
+              <a:t>Generalized crossover</a:t>
+            </a:r>
+            <a:r>
               <a:rPr lang="en-GB" dirty="0"/>
-              <a:t>Generalized crossover: </a:t>
+              <a:t>: </a:t>
             </a:r>
             <a:r>
               <a:rPr lang="en-GB" dirty="0" err="1"/>
@@ -1912,7 +2316,193 @@
           <a:bodyPr/>
           <a:lstStyle/>
           <a:p>
-            <a:endParaRPr lang="en-GB"/>
+            <a:r>
+              <a:rPr lang="de-DE" sz="1200" b="1" i="0" kern="1200" dirty="0" err="1">
+                <a:solidFill>
+                  <a:schemeClr val="tx1"/>
+                </a:solidFill>
+                <a:effectLst/>
+                <a:latin typeface="+mn-lt"/>
+                <a:ea typeface="+mn-ea"/>
+                <a:cs typeface="+mn-cs"/>
+              </a:rPr>
+              <a:t>Traveling</a:t>
+            </a:r>
+            <a:r>
+              <a:rPr lang="de-DE" sz="1200" b="1" i="0" kern="1200" dirty="0">
+                <a:solidFill>
+                  <a:schemeClr val="tx1"/>
+                </a:solidFill>
+                <a:effectLst/>
+                <a:latin typeface="+mn-lt"/>
+                <a:ea typeface="+mn-ea"/>
+                <a:cs typeface="+mn-cs"/>
+              </a:rPr>
+              <a:t> </a:t>
+            </a:r>
+            <a:r>
+              <a:rPr lang="de-DE" sz="1200" b="1" i="0" kern="1200" dirty="0" err="1">
+                <a:solidFill>
+                  <a:schemeClr val="tx1"/>
+                </a:solidFill>
+                <a:effectLst/>
+                <a:latin typeface="+mn-lt"/>
+                <a:ea typeface="+mn-ea"/>
+                <a:cs typeface="+mn-cs"/>
+              </a:rPr>
+              <a:t>Salesman</a:t>
+            </a:r>
+            <a:r>
+              <a:rPr lang="de-DE" sz="1200" b="1" i="0" kern="1200" dirty="0">
+                <a:solidFill>
+                  <a:schemeClr val="tx1"/>
+                </a:solidFill>
+                <a:effectLst/>
+                <a:latin typeface="+mn-lt"/>
+                <a:ea typeface="+mn-ea"/>
+                <a:cs typeface="+mn-cs"/>
+              </a:rPr>
+              <a:t> Problem (TSP): </a:t>
+            </a:r>
+            <a:r>
+              <a:rPr lang="de-DE" sz="1200" b="0" i="0" kern="1200" dirty="0">
+                <a:solidFill>
+                  <a:schemeClr val="tx1"/>
+                </a:solidFill>
+                <a:effectLst/>
+                <a:latin typeface="+mn-lt"/>
+                <a:ea typeface="+mn-ea"/>
+                <a:cs typeface="+mn-cs"/>
+              </a:rPr>
+              <a:t>Mehrere Orte müssen mit einer möglichst kurzen Strecke miteinander verbunden werden</a:t>
+            </a:r>
+          </a:p>
+          <a:p>
+            <a:endParaRPr lang="de-DE" sz="1200" b="0" i="0" kern="1200" dirty="0">
+              <a:solidFill>
+                <a:schemeClr val="tx1"/>
+              </a:solidFill>
+              <a:effectLst/>
+              <a:latin typeface="+mn-lt"/>
+              <a:ea typeface="+mn-ea"/>
+              <a:cs typeface="+mn-cs"/>
+            </a:endParaRPr>
+          </a:p>
+          <a:p>
+            <a:r>
+              <a:rPr lang="de-DE" sz="1200" b="0" i="0" kern="1200" dirty="0">
+                <a:solidFill>
+                  <a:schemeClr val="tx1"/>
+                </a:solidFill>
+                <a:effectLst/>
+                <a:latin typeface="+mn-lt"/>
+                <a:ea typeface="+mn-ea"/>
+                <a:cs typeface="+mn-cs"/>
+              </a:rPr>
+              <a:t>Positionsbasiert: Basierend auf Positionen, </a:t>
+            </a:r>
+            <a:r>
+              <a:rPr lang="de-DE" sz="1200" b="1" i="0" kern="1200" dirty="0">
+                <a:solidFill>
+                  <a:schemeClr val="tx1"/>
+                </a:solidFill>
+                <a:effectLst/>
+                <a:latin typeface="+mn-lt"/>
+                <a:ea typeface="+mn-ea"/>
+                <a:cs typeface="+mn-cs"/>
+              </a:rPr>
+              <a:t>Position </a:t>
+            </a:r>
+            <a:r>
+              <a:rPr lang="de-DE" sz="1200" b="1" i="0" kern="1200" dirty="0" err="1">
+                <a:solidFill>
+                  <a:schemeClr val="tx1"/>
+                </a:solidFill>
+                <a:effectLst/>
+                <a:latin typeface="+mn-lt"/>
+                <a:ea typeface="+mn-ea"/>
+                <a:cs typeface="+mn-cs"/>
+              </a:rPr>
+              <a:t>Based</a:t>
+            </a:r>
+            <a:r>
+              <a:rPr lang="de-DE" sz="1200" b="1" i="0" kern="1200" dirty="0">
+                <a:solidFill>
+                  <a:schemeClr val="tx1"/>
+                </a:solidFill>
+                <a:effectLst/>
+                <a:latin typeface="+mn-lt"/>
+                <a:ea typeface="+mn-ea"/>
+                <a:cs typeface="+mn-cs"/>
+              </a:rPr>
+              <a:t> Crossover (POS): </a:t>
+            </a:r>
+            <a:r>
+              <a:rPr lang="de-DE" sz="1200" b="0" i="0" kern="1200" dirty="0">
+                <a:solidFill>
+                  <a:schemeClr val="tx1"/>
+                </a:solidFill>
+                <a:effectLst/>
+                <a:latin typeface="+mn-lt"/>
+                <a:ea typeface="+mn-ea"/>
+                <a:cs typeface="+mn-cs"/>
+              </a:rPr>
+              <a:t>Wählt einige zufällige Positionen im ersten Elternteil aus und verschiebt die ausgewählten Werte zu den korrespondierenden Positionen im anderen Elternteil.</a:t>
+            </a:r>
+            <a:br>
+              <a:rPr lang="de-DE" dirty="0"/>
+            </a:br>
+            <a:r>
+              <a:rPr lang="de-DE" dirty="0"/>
+              <a:t>Kantenbasiert: Basiert auf </a:t>
+            </a:r>
+            <a:r>
+              <a:rPr lang="de-DE" dirty="0" err="1"/>
+              <a:t>Graphenkanten</a:t>
+            </a:r>
+            <a:r>
+              <a:rPr lang="de-DE" dirty="0"/>
+              <a:t>, </a:t>
+            </a:r>
+            <a:r>
+              <a:rPr lang="de-DE" sz="1200" b="1" i="0" kern="1200" dirty="0">
+                <a:solidFill>
+                  <a:schemeClr val="tx1"/>
+                </a:solidFill>
+                <a:effectLst/>
+                <a:latin typeface="+mn-lt"/>
+                <a:ea typeface="+mn-ea"/>
+                <a:cs typeface="+mn-cs"/>
+              </a:rPr>
+              <a:t>Edge Crossover </a:t>
+            </a:r>
+            <a:r>
+              <a:rPr lang="de-DE" sz="1200" b="0" i="0" kern="1200" dirty="0">
+                <a:solidFill>
+                  <a:schemeClr val="tx1"/>
+                </a:solidFill>
+                <a:effectLst/>
+                <a:latin typeface="+mn-lt"/>
+                <a:ea typeface="+mn-ea"/>
+                <a:cs typeface="+mn-cs"/>
+              </a:rPr>
+              <a:t>Wählt einen Knoten mit der geringsten Kantenzahl aus und fügt ihn zum neuen Kind hinzu und löscht ihn aus den anderen Kantenlisten.</a:t>
+            </a:r>
+          </a:p>
+          <a:p>
+            <a:r>
+              <a:rPr lang="de-DE" sz="1200" b="0" i="0" kern="1200" dirty="0">
+                <a:solidFill>
+                  <a:schemeClr val="tx1"/>
+                </a:solidFill>
+                <a:effectLst/>
+                <a:latin typeface="+mn-lt"/>
+                <a:ea typeface="+mn-ea"/>
+                <a:cs typeface="+mn-cs"/>
+              </a:rPr>
+              <a:t>Folgenbasiert: Beeinflussen Reihenfolge der Gene, haben weitere Unterkategorien -&gt; Vorstellen</a:t>
+            </a:r>
+            <a:endParaRPr lang="en-GB" dirty="0"/>
           </a:p>
         </p:txBody>
       </p:sp>
@@ -1996,7 +2586,7 @@
           <a:bodyPr/>
           <a:lstStyle/>
           <a:p>
-            <a:endParaRPr lang="en-GB"/>
+            <a:endParaRPr lang="en-GB" dirty="0"/>
           </a:p>
         </p:txBody>
       </p:sp>
@@ -2026,7 +2616,7 @@
     </p:spTree>
     <p:extLst>
       <p:ext uri="{BB962C8B-B14F-4D97-AF65-F5344CB8AC3E}">
-        <p14:creationId xmlns:p14="http://schemas.microsoft.com/office/powerpoint/2010/main" val="658910433"/>
+        <p14:creationId xmlns:p14="http://schemas.microsoft.com/office/powerpoint/2010/main" val="1993729112"/>
       </p:ext>
     </p:extLst>
   </p:cSld>
@@ -2080,7 +2670,259 @@
           <a:bodyPr/>
           <a:lstStyle/>
           <a:p>
-            <a:endParaRPr lang="en-GB"/>
+            <a:r>
+              <a:rPr lang="de-DE" sz="1200" b="1" i="0" kern="1200" dirty="0" err="1">
+                <a:solidFill>
+                  <a:schemeClr val="tx1"/>
+                </a:solidFill>
+                <a:effectLst/>
+                <a:latin typeface="+mn-lt"/>
+                <a:ea typeface="+mn-ea"/>
+                <a:cs typeface="+mn-cs"/>
+              </a:rPr>
+              <a:t>Taguchi</a:t>
+            </a:r>
+            <a:r>
+              <a:rPr lang="de-DE" sz="1200" b="1" i="0" kern="1200" dirty="0">
+                <a:solidFill>
+                  <a:schemeClr val="tx1"/>
+                </a:solidFill>
+                <a:effectLst/>
+                <a:latin typeface="+mn-lt"/>
+                <a:ea typeface="+mn-ea"/>
+                <a:cs typeface="+mn-cs"/>
+              </a:rPr>
+              <a:t> Crossover (TC) </a:t>
+            </a:r>
+            <a:r>
+              <a:rPr lang="de-DE" sz="1200" b="0" i="0" kern="1200" dirty="0">
+                <a:solidFill>
+                  <a:schemeClr val="tx1"/>
+                </a:solidFill>
+                <a:effectLst/>
+                <a:latin typeface="+mn-lt"/>
+                <a:ea typeface="+mn-ea"/>
+                <a:cs typeface="+mn-cs"/>
+              </a:rPr>
+              <a:t>Nutzt statistische Daten innerhalb einer Matrix um das beste Ergebnis zu finden.</a:t>
+            </a:r>
+            <a:br>
+              <a:rPr lang="de-DE" sz="1200" b="0" i="0" kern="1200" dirty="0">
+                <a:solidFill>
+                  <a:schemeClr val="tx1"/>
+                </a:solidFill>
+                <a:effectLst/>
+                <a:latin typeface="+mn-lt"/>
+                <a:ea typeface="+mn-ea"/>
+                <a:cs typeface="+mn-cs"/>
+              </a:rPr>
+            </a:br>
+            <a:r>
+              <a:rPr lang="de-DE" sz="1200" b="1" i="0" kern="1200" dirty="0">
+                <a:solidFill>
+                  <a:schemeClr val="tx1"/>
+                </a:solidFill>
+                <a:effectLst/>
+                <a:latin typeface="+mn-lt"/>
+                <a:ea typeface="+mn-ea"/>
+                <a:cs typeface="+mn-cs"/>
+              </a:rPr>
+              <a:t>Average Crossover </a:t>
+            </a:r>
+            <a:r>
+              <a:rPr lang="de-DE" sz="1200" b="0" i="0" kern="1200" dirty="0">
+                <a:solidFill>
+                  <a:schemeClr val="tx1"/>
+                </a:solidFill>
+                <a:effectLst/>
+                <a:latin typeface="+mn-lt"/>
+                <a:ea typeface="+mn-ea"/>
+                <a:cs typeface="+mn-cs"/>
+              </a:rPr>
+              <a:t>Modifizierter </a:t>
+            </a:r>
+            <a:r>
+              <a:rPr lang="de-DE" sz="1200" b="0" i="1" kern="1200" dirty="0" err="1">
+                <a:solidFill>
+                  <a:schemeClr val="tx1"/>
+                </a:solidFill>
+                <a:effectLst/>
+                <a:latin typeface="+mn-lt"/>
+                <a:ea typeface="+mn-ea"/>
+                <a:cs typeface="+mn-cs"/>
+              </a:rPr>
+              <a:t>One</a:t>
+            </a:r>
+            <a:r>
+              <a:rPr lang="de-DE" sz="1200" b="0" i="1" kern="1200" dirty="0">
+                <a:solidFill>
+                  <a:schemeClr val="tx1"/>
+                </a:solidFill>
+                <a:effectLst/>
+                <a:latin typeface="+mn-lt"/>
+                <a:ea typeface="+mn-ea"/>
+                <a:cs typeface="+mn-cs"/>
+              </a:rPr>
+              <a:t>-Point-Crossover</a:t>
+            </a:r>
+            <a:r>
+              <a:rPr lang="de-DE" sz="1200" b="0" i="0" kern="1200" dirty="0">
+                <a:solidFill>
+                  <a:schemeClr val="tx1"/>
+                </a:solidFill>
+                <a:effectLst/>
+                <a:latin typeface="+mn-lt"/>
+                <a:ea typeface="+mn-ea"/>
+                <a:cs typeface="+mn-cs"/>
+              </a:rPr>
+              <a:t>, bei dem die Durchschnittswerte zwischen beiden Eltern anstatt den Elternwerten der einzelnen</a:t>
+            </a:r>
+            <a:br>
+              <a:rPr lang="de-DE" sz="1200" b="0" i="0" kern="1200" dirty="0">
+                <a:solidFill>
+                  <a:schemeClr val="tx1"/>
+                </a:solidFill>
+                <a:effectLst/>
+                <a:latin typeface="+mn-lt"/>
+                <a:ea typeface="+mn-ea"/>
+                <a:cs typeface="+mn-cs"/>
+              </a:rPr>
+            </a:br>
+            <a:r>
+              <a:rPr lang="de-DE" sz="1200" b="0" i="0" kern="1200" dirty="0">
+                <a:solidFill>
+                  <a:schemeClr val="tx1"/>
+                </a:solidFill>
+                <a:effectLst/>
+                <a:latin typeface="+mn-lt"/>
+                <a:ea typeface="+mn-ea"/>
+                <a:cs typeface="+mn-cs"/>
+              </a:rPr>
+              <a:t>Gene genutzt werden. [19]</a:t>
+            </a:r>
+            <a:br>
+              <a:rPr lang="de-DE" sz="1200" b="0" i="0" kern="1200" dirty="0">
+                <a:solidFill>
+                  <a:schemeClr val="tx1"/>
+                </a:solidFill>
+                <a:effectLst/>
+                <a:latin typeface="+mn-lt"/>
+                <a:ea typeface="+mn-ea"/>
+                <a:cs typeface="+mn-cs"/>
+              </a:rPr>
+            </a:br>
+            <a:r>
+              <a:rPr lang="de-DE" sz="1200" b="1" i="0" kern="1200" dirty="0" err="1">
+                <a:solidFill>
+                  <a:schemeClr val="tx1"/>
+                </a:solidFill>
+                <a:effectLst/>
+                <a:latin typeface="+mn-lt"/>
+                <a:ea typeface="+mn-ea"/>
+                <a:cs typeface="+mn-cs"/>
+              </a:rPr>
+              <a:t>Fuzzy</a:t>
+            </a:r>
+            <a:r>
+              <a:rPr lang="de-DE" sz="1200" b="1" i="0" kern="1200" dirty="0">
+                <a:solidFill>
+                  <a:schemeClr val="tx1"/>
+                </a:solidFill>
+                <a:effectLst/>
+                <a:latin typeface="+mn-lt"/>
+                <a:ea typeface="+mn-ea"/>
+                <a:cs typeface="+mn-cs"/>
+              </a:rPr>
+              <a:t> </a:t>
+            </a:r>
+            <a:r>
+              <a:rPr lang="de-DE" sz="1200" b="1" i="0" kern="1200" dirty="0" err="1">
+                <a:solidFill>
+                  <a:schemeClr val="tx1"/>
+                </a:solidFill>
+                <a:effectLst/>
+                <a:latin typeface="+mn-lt"/>
+                <a:ea typeface="+mn-ea"/>
+                <a:cs typeface="+mn-cs"/>
+              </a:rPr>
+              <a:t>Arithmetic</a:t>
+            </a:r>
+            <a:r>
+              <a:rPr lang="de-DE" sz="1200" b="1" i="0" kern="1200" dirty="0">
+                <a:solidFill>
+                  <a:schemeClr val="tx1"/>
+                </a:solidFill>
+                <a:effectLst/>
+                <a:latin typeface="+mn-lt"/>
+                <a:ea typeface="+mn-ea"/>
+                <a:cs typeface="+mn-cs"/>
+              </a:rPr>
+              <a:t> </a:t>
+            </a:r>
+            <a:r>
+              <a:rPr lang="de-DE" sz="1200" b="1" i="0" kern="1200" dirty="0" err="1">
+                <a:solidFill>
+                  <a:schemeClr val="tx1"/>
+                </a:solidFill>
+                <a:effectLst/>
+                <a:latin typeface="+mn-lt"/>
+                <a:ea typeface="+mn-ea"/>
+                <a:cs typeface="+mn-cs"/>
+              </a:rPr>
+              <a:t>Weighted</a:t>
+            </a:r>
+            <a:r>
+              <a:rPr lang="de-DE" sz="1200" b="1" i="0" kern="1200" dirty="0">
+                <a:solidFill>
+                  <a:schemeClr val="tx1"/>
+                </a:solidFill>
+                <a:effectLst/>
+                <a:latin typeface="+mn-lt"/>
+                <a:ea typeface="+mn-ea"/>
+                <a:cs typeface="+mn-cs"/>
+              </a:rPr>
+              <a:t> Mean: </a:t>
+            </a:r>
+            <a:r>
+              <a:rPr lang="de-DE" sz="1200" b="0" i="0" kern="1200" dirty="0">
+                <a:solidFill>
+                  <a:schemeClr val="tx1"/>
+                </a:solidFill>
+                <a:effectLst/>
+                <a:latin typeface="+mn-lt"/>
+                <a:ea typeface="+mn-ea"/>
+                <a:cs typeface="+mn-cs"/>
+              </a:rPr>
+              <a:t>Berechnet mithilfe der </a:t>
+            </a:r>
+            <a:r>
+              <a:rPr lang="de-DE" sz="1200" b="0" i="0" kern="1200" dirty="0" err="1">
+                <a:solidFill>
+                  <a:schemeClr val="tx1"/>
+                </a:solidFill>
+                <a:effectLst/>
+                <a:latin typeface="+mn-lt"/>
+                <a:ea typeface="+mn-ea"/>
+                <a:cs typeface="+mn-cs"/>
+              </a:rPr>
+              <a:t>Fuzzy</a:t>
+            </a:r>
+            <a:r>
+              <a:rPr lang="de-DE" sz="1200" b="0" i="0" kern="1200" dirty="0">
+                <a:solidFill>
+                  <a:schemeClr val="tx1"/>
+                </a:solidFill>
+                <a:effectLst/>
+                <a:latin typeface="+mn-lt"/>
+                <a:ea typeface="+mn-ea"/>
+                <a:cs typeface="+mn-cs"/>
+              </a:rPr>
+              <a:t>-Arithmetik die Werte der Kinder.</a:t>
+            </a:r>
+            <a:br>
+              <a:rPr lang="de-DE" dirty="0"/>
+            </a:br>
+            <a:endParaRPr lang="en-GB" dirty="0"/>
           </a:p>
         </p:txBody>
       </p:sp>
@@ -2110,7 +2952,7 @@
     </p:spTree>
     <p:extLst>
       <p:ext uri="{BB962C8B-B14F-4D97-AF65-F5344CB8AC3E}">
-        <p14:creationId xmlns:p14="http://schemas.microsoft.com/office/powerpoint/2010/main" val="1725312994"/>
+        <p14:creationId xmlns:p14="http://schemas.microsoft.com/office/powerpoint/2010/main" val="658910433"/>
       </p:ext>
     </p:extLst>
   </p:cSld>
@@ -2529,7 +3371,7 @@
           <a:p>
             <a:fld id="{D0ED01E6-03D8-4FEF-A86A-FBF90D1DD342}" type="datetime1">
               <a:rPr lang="de-DE" smtClean="0"/>
-              <a:t>06.07.2017</a:t>
+              <a:t>10.07.2017</a:t>
             </a:fld>
             <a:endParaRPr lang="en-GB"/>
           </a:p>
@@ -2709,7 +3551,7 @@
           <a:p>
             <a:fld id="{871E47B7-FBD6-41B0-9D01-F6ECF1A4F5CC}" type="datetime1">
               <a:rPr lang="de-DE" smtClean="0"/>
-              <a:t>06.07.2017</a:t>
+              <a:t>10.07.2017</a:t>
             </a:fld>
             <a:endParaRPr lang="en-GB"/>
           </a:p>
@@ -3149,7 +3991,7 @@
           <a:p>
             <a:fld id="{9575385B-867E-403C-90F0-311C74870C67}" type="datetime1">
               <a:rPr lang="de-DE" smtClean="0"/>
-              <a:t>06.07.2017</a:t>
+              <a:t>10.07.2017</a:t>
             </a:fld>
             <a:endParaRPr lang="en-GB" dirty="0"/>
           </a:p>
@@ -3351,7 +4193,7 @@
           <a:p>
             <a:fld id="{3D0C857D-ED0B-416E-8E57-8CB429D7D202}" type="datetime1">
               <a:rPr lang="de-DE" smtClean="0"/>
-              <a:t>06.07.2017</a:t>
+              <a:t>10.07.2017</a:t>
             </a:fld>
             <a:endParaRPr lang="en-GB" dirty="0"/>
           </a:p>
@@ -3583,7 +4425,7 @@
           <a:p>
             <a:fld id="{0A428C60-F24B-4A54-A024-EDEEF42A46DD}" type="datetime1">
               <a:rPr lang="de-DE" smtClean="0"/>
-              <a:t>06.07.2017</a:t>
+              <a:t>10.07.2017</a:t>
             </a:fld>
             <a:endParaRPr lang="en-GB"/>
           </a:p>
@@ -3950,7 +4792,7 @@
           <a:p>
             <a:fld id="{AE51ACAA-A931-4E7A-A9D5-DB87553BA628}" type="datetime1">
               <a:rPr lang="de-DE" smtClean="0"/>
-              <a:t>06.07.2017</a:t>
+              <a:t>10.07.2017</a:t>
             </a:fld>
             <a:endParaRPr lang="en-GB"/>
           </a:p>
@@ -4068,7 +4910,7 @@
           <a:p>
             <a:fld id="{8367B9C6-B354-4A30-B2F2-087D87C6297F}" type="datetime1">
               <a:rPr lang="de-DE" smtClean="0"/>
-              <a:t>06.07.2017</a:t>
+              <a:t>10.07.2017</a:t>
             </a:fld>
             <a:endParaRPr lang="en-GB"/>
           </a:p>
@@ -4163,7 +5005,7 @@
           <a:p>
             <a:fld id="{E9345B01-5F9A-4C9C-B418-1082039ADBCE}" type="datetime1">
               <a:rPr lang="de-DE" smtClean="0"/>
-              <a:t>06.07.2017</a:t>
+              <a:t>10.07.2017</a:t>
             </a:fld>
             <a:endParaRPr lang="en-GB"/>
           </a:p>
@@ -4440,7 +5282,7 @@
           <a:p>
             <a:fld id="{C2E9B0FC-A26B-4A2B-9B63-9A6A945111D4}" type="datetime1">
               <a:rPr lang="de-DE" smtClean="0"/>
-              <a:t>06.07.2017</a:t>
+              <a:t>10.07.2017</a:t>
             </a:fld>
             <a:endParaRPr lang="en-GB"/>
           </a:p>
@@ -4697,7 +5539,7 @@
           <a:p>
             <a:fld id="{96AED3BB-9861-4EE4-9DD3-E2CBC26E331B}" type="datetime1">
               <a:rPr lang="de-DE" smtClean="0"/>
-              <a:t>06.07.2017</a:t>
+              <a:t>10.07.2017</a:t>
             </a:fld>
             <a:endParaRPr lang="en-GB"/>
           </a:p>
@@ -4908,7 +5750,7 @@
           <a:p>
             <a:fld id="{5B65F119-50B7-47E5-809C-372BD9900A65}" type="datetime1">
               <a:rPr lang="de-DE" smtClean="0"/>
-              <a:t>06.07.2017</a:t>
+              <a:t>10.07.2017</a:t>
             </a:fld>
             <a:endParaRPr lang="en-GB" dirty="0"/>
           </a:p>
@@ -5628,20 +6470,12 @@
             </a:r>
           </a:p>
           <a:p>
-            <a:r>
-              <a:rPr lang="de-DE" sz="1600" dirty="0">
-                <a:solidFill>
-                  <a:schemeClr val="tx1">
-                    <a:lumMod val="65000"/>
-                    <a:lumOff val="35000"/>
-                  </a:schemeClr>
-                </a:solidFill>
-              </a:rPr>
-              <a:t>20./21.07.2017</a:t>
-            </a:r>
-          </a:p>
-          <a:p>
-            <a:endParaRPr lang="en-GB" sz="1800" dirty="0">
+            <a:fld id="{7A101A87-D014-4826-A19A-EE438A1F464F}" type="datetime1">
+              <a:rPr lang="de-DE" sz="1600"/>
+              <a:pPr/>
+              <a:t>10.07.2017</a:t>
+            </a:fld>
+            <a:endParaRPr lang="en-GB" sz="1600" dirty="0">
               <a:solidFill>
                 <a:schemeClr val="tx1">
                   <a:lumMod val="65000"/>
@@ -5743,7 +6577,14 @@
           <a:p>
             <a:r>
               <a:rPr lang="de-DE" dirty="0"/>
-              <a:t>Mehrdimensionale Repräsentationen</a:t>
+              <a:t>Eindimensionale Repräsentationen:</a:t>
+            </a:r>
+            <a:br>
+              <a:rPr lang="de-DE" dirty="0"/>
+            </a:br>
+            <a:r>
+              <a:rPr lang="de-DE" dirty="0"/>
+              <a:t>Fließkommawerte – Average Crossover</a:t>
             </a:r>
             <a:endParaRPr lang="en-GB" dirty="0"/>
           </a:p>
@@ -5770,11 +6611,7 @@
               <a:buFont typeface="Wingdings" panose="05000000000000000000" pitchFamily="2" charset="2"/>
               <a:buChar char="§"/>
             </a:pPr>
-            <a:r>
-              <a:rPr lang="de-DE" dirty="0"/>
-              <a:t>Text</a:t>
-            </a:r>
-            <a:endParaRPr lang="en-GB" sz="1400" dirty="0"/>
+            <a:endParaRPr lang="de-DE" dirty="0"/>
           </a:p>
         </p:txBody>
       </p:sp>
@@ -5795,7 +6632,7 @@
           <a:p>
             <a:fld id="{7A101A87-D014-4826-A19A-EE438A1F464F}" type="datetime1">
               <a:rPr lang="de-DE" smtClean="0"/>
-              <a:t>06.07.2017</a:t>
+              <a:t>10.07.2017</a:t>
             </a:fld>
             <a:endParaRPr lang="en-GB" dirty="0"/>
           </a:p>
@@ -5828,7 +6665,7 @@
     </p:spTree>
     <p:extLst>
       <p:ext uri="{BB962C8B-B14F-4D97-AF65-F5344CB8AC3E}">
-        <p14:creationId xmlns:p14="http://schemas.microsoft.com/office/powerpoint/2010/main" val="1876670147"/>
+        <p14:creationId xmlns:p14="http://schemas.microsoft.com/office/powerpoint/2010/main" val="1880897130"/>
       </p:ext>
     </p:extLst>
   </p:cSld>
@@ -5872,7 +6709,14 @@
           <a:p>
             <a:r>
               <a:rPr lang="de-DE" dirty="0"/>
-              <a:t>Anwendungsspezifische Codierungen</a:t>
+              <a:t>Eindimensionale Repräsentationen:</a:t>
+            </a:r>
+            <a:br>
+              <a:rPr lang="de-DE" dirty="0"/>
+            </a:br>
+            <a:r>
+              <a:rPr lang="de-DE" dirty="0"/>
+              <a:t>Zeichenketten</a:t>
             </a:r>
             <a:endParaRPr lang="en-GB" dirty="0"/>
           </a:p>
@@ -5901,9 +6745,68 @@
             </a:pPr>
             <a:r>
               <a:rPr lang="de-DE" dirty="0"/>
-              <a:t>Text</a:t>
-            </a:r>
-            <a:endParaRPr lang="en-GB" sz="1400" dirty="0"/>
+              <a:t>Codierung der Daten als Zeichenketten</a:t>
+            </a:r>
+          </a:p>
+          <a:p>
+            <a:pPr>
+              <a:buFont typeface="Wingdings" panose="05000000000000000000" pitchFamily="2" charset="2"/>
+              <a:buChar char="§"/>
+            </a:pPr>
+            <a:r>
+              <a:rPr lang="de-DE" dirty="0"/>
+              <a:t>Typischer Anwendungsfall: Biologie</a:t>
+            </a:r>
+          </a:p>
+          <a:p>
+            <a:pPr>
+              <a:buFont typeface="Wingdings" panose="05000000000000000000" pitchFamily="2" charset="2"/>
+              <a:buChar char="§"/>
+            </a:pPr>
+            <a:r>
+              <a:rPr lang="de-DE" dirty="0"/>
+              <a:t>Unterscheidung zwischen</a:t>
+            </a:r>
+          </a:p>
+          <a:p>
+            <a:pPr lvl="1">
+              <a:buFont typeface="Wingdings" panose="05000000000000000000" pitchFamily="2" charset="2"/>
+              <a:buChar char="§"/>
+            </a:pPr>
+            <a:r>
+              <a:rPr lang="de-DE" dirty="0"/>
+              <a:t>Festen Längen</a:t>
+            </a:r>
+          </a:p>
+          <a:p>
+            <a:pPr lvl="1">
+              <a:buFont typeface="Wingdings" panose="05000000000000000000" pitchFamily="2" charset="2"/>
+              <a:buChar char="§"/>
+            </a:pPr>
+            <a:r>
+              <a:rPr lang="de-DE" dirty="0"/>
+              <a:t>Variablen Längen</a:t>
+            </a:r>
+          </a:p>
+          <a:p>
+            <a:pPr>
+              <a:buFont typeface="Wingdings" panose="05000000000000000000" pitchFamily="2" charset="2"/>
+              <a:buChar char="§"/>
+            </a:pPr>
+            <a:r>
+              <a:rPr lang="de-DE" dirty="0"/>
+              <a:t>COs für feste Längen z. B. C1/C2 Crossover</a:t>
+            </a:r>
+          </a:p>
+          <a:p>
+            <a:pPr>
+              <a:buFont typeface="Wingdings" panose="05000000000000000000" pitchFamily="2" charset="2"/>
+              <a:buChar char="§"/>
+            </a:pPr>
+            <a:r>
+              <a:rPr lang="de-DE" dirty="0"/>
+              <a:t>COs für variable Längen z. B. Inside Crossover</a:t>
+            </a:r>
           </a:p>
         </p:txBody>
       </p:sp>
@@ -5924,7 +6827,7 @@
           <a:p>
             <a:fld id="{7A101A87-D014-4826-A19A-EE438A1F464F}" type="datetime1">
               <a:rPr lang="de-DE" smtClean="0"/>
-              <a:t>06.07.2017</a:t>
+              <a:t>10.07.2017</a:t>
             </a:fld>
             <a:endParaRPr lang="en-GB" dirty="0"/>
           </a:p>
@@ -5957,7 +6860,7 @@
     </p:spTree>
     <p:extLst>
       <p:ext uri="{BB962C8B-B14F-4D97-AF65-F5344CB8AC3E}">
-        <p14:creationId xmlns:p14="http://schemas.microsoft.com/office/powerpoint/2010/main" val="344538528"/>
+        <p14:creationId xmlns:p14="http://schemas.microsoft.com/office/powerpoint/2010/main" val="2702032420"/>
       </p:ext>
     </p:extLst>
   </p:cSld>
@@ -6001,7 +6904,7 @@
           <a:p>
             <a:r>
               <a:rPr lang="de-DE" dirty="0"/>
-              <a:t>Universelle Crossover-Operationen</a:t>
+              <a:t>Mehrdimensionale Repräsentationen</a:t>
             </a:r>
             <a:endParaRPr lang="en-GB" dirty="0"/>
           </a:p>
@@ -6028,11 +6931,7 @@
               <a:buFont typeface="Wingdings" panose="05000000000000000000" pitchFamily="2" charset="2"/>
               <a:buChar char="§"/>
             </a:pPr>
-            <a:r>
-              <a:rPr lang="de-DE" dirty="0"/>
-              <a:t>Text</a:t>
-            </a:r>
-            <a:endParaRPr lang="en-GB" sz="1400" dirty="0"/>
+            <a:endParaRPr lang="de-DE" dirty="0"/>
           </a:p>
         </p:txBody>
       </p:sp>
@@ -6053,7 +6952,7 @@
           <a:p>
             <a:fld id="{7A101A87-D014-4826-A19A-EE438A1F464F}" type="datetime1">
               <a:rPr lang="de-DE" smtClean="0"/>
-              <a:t>06.07.2017</a:t>
+              <a:t>10.07.2017</a:t>
             </a:fld>
             <a:endParaRPr lang="en-GB" dirty="0"/>
           </a:p>
@@ -6086,7 +6985,7 @@
     </p:spTree>
     <p:extLst>
       <p:ext uri="{BB962C8B-B14F-4D97-AF65-F5344CB8AC3E}">
-        <p14:creationId xmlns:p14="http://schemas.microsoft.com/office/powerpoint/2010/main" val="1971648870"/>
+        <p14:creationId xmlns:p14="http://schemas.microsoft.com/office/powerpoint/2010/main" val="4160765930"/>
       </p:ext>
     </p:extLst>
   </p:cSld>
@@ -6130,7 +7029,7 @@
           <a:p>
             <a:r>
               <a:rPr lang="de-DE" dirty="0"/>
-              <a:t>Worauf kommt es bei der Auswahl an?</a:t>
+              <a:t>Anwendungsspezifische Codierungen</a:t>
             </a:r>
             <a:endParaRPr lang="en-GB" dirty="0"/>
           </a:p>
@@ -6157,11 +7056,7 @@
               <a:buFont typeface="Wingdings" panose="05000000000000000000" pitchFamily="2" charset="2"/>
               <a:buChar char="§"/>
             </a:pPr>
-            <a:r>
-              <a:rPr lang="de-DE" dirty="0"/>
-              <a:t>Vor allem eins: Effizienz des Genetischen Algorithmus</a:t>
-            </a:r>
-            <a:endParaRPr lang="en-GB" sz="1400" dirty="0"/>
+            <a:endParaRPr lang="de-DE" dirty="0"/>
           </a:p>
         </p:txBody>
       </p:sp>
@@ -6182,7 +7077,7 @@
           <a:p>
             <a:fld id="{7A101A87-D014-4826-A19A-EE438A1F464F}" type="datetime1">
               <a:rPr lang="de-DE" smtClean="0"/>
-              <a:t>06.07.2017</a:t>
+              <a:t>10.07.2017</a:t>
             </a:fld>
             <a:endParaRPr lang="en-GB" dirty="0"/>
           </a:p>
@@ -6215,7 +7110,7 @@
     </p:spTree>
     <p:extLst>
       <p:ext uri="{BB962C8B-B14F-4D97-AF65-F5344CB8AC3E}">
-        <p14:creationId xmlns:p14="http://schemas.microsoft.com/office/powerpoint/2010/main" val="3994059908"/>
+        <p14:creationId xmlns:p14="http://schemas.microsoft.com/office/powerpoint/2010/main" val="2066995797"/>
       </p:ext>
     </p:extLst>
   </p:cSld>
@@ -6259,7 +7154,7 @@
           <a:p>
             <a:r>
               <a:rPr lang="de-DE" dirty="0"/>
-              <a:t>Noch fragen?</a:t>
+              <a:t>Universelle Crossover-Operationen</a:t>
             </a:r>
             <a:endParaRPr lang="en-GB" dirty="0"/>
           </a:p>
@@ -6286,7 +7181,7 @@
               <a:buFont typeface="Wingdings" panose="05000000000000000000" pitchFamily="2" charset="2"/>
               <a:buChar char="§"/>
             </a:pPr>
-            <a:endParaRPr lang="en-GB" sz="1400" dirty="0"/>
+            <a:endParaRPr lang="de-DE" dirty="0"/>
           </a:p>
         </p:txBody>
       </p:sp>
@@ -6307,7 +7202,7 @@
           <a:p>
             <a:fld id="{7A101A87-D014-4826-A19A-EE438A1F464F}" type="datetime1">
               <a:rPr lang="de-DE" smtClean="0"/>
-              <a:t>06.07.2017</a:t>
+              <a:t>10.07.2017</a:t>
             </a:fld>
             <a:endParaRPr lang="en-GB" dirty="0"/>
           </a:p>
@@ -6340,7 +7235,7 @@
     </p:spTree>
     <p:extLst>
       <p:ext uri="{BB962C8B-B14F-4D97-AF65-F5344CB8AC3E}">
-        <p14:creationId xmlns:p14="http://schemas.microsoft.com/office/powerpoint/2010/main" val="1755377436"/>
+        <p14:creationId xmlns:p14="http://schemas.microsoft.com/office/powerpoint/2010/main" val="45071392"/>
       </p:ext>
     </p:extLst>
   </p:cSld>
@@ -6384,7 +7279,7 @@
           <a:p>
             <a:r>
               <a:rPr lang="de-DE" dirty="0"/>
-              <a:t>Überschrift Folie</a:t>
+              <a:t>Worauf kommt es bei der Auswahl an?</a:t>
             </a:r>
             <a:endParaRPr lang="en-GB" dirty="0"/>
           </a:p>
@@ -6413,7 +7308,7 @@
             </a:pPr>
             <a:r>
               <a:rPr lang="de-DE" dirty="0"/>
-              <a:t>Text</a:t>
+              <a:t>Vor allem eins: Effizienz des Genetischen Algorithmus</a:t>
             </a:r>
             <a:endParaRPr lang="en-GB" sz="1400" dirty="0"/>
           </a:p>
@@ -6436,7 +7331,7 @@
           <a:p>
             <a:fld id="{7A101A87-D014-4826-A19A-EE438A1F464F}" type="datetime1">
               <a:rPr lang="de-DE" smtClean="0"/>
-              <a:t>06.07.2017</a:t>
+              <a:t>10.07.2017</a:t>
             </a:fld>
             <a:endParaRPr lang="en-GB" dirty="0"/>
           </a:p>
@@ -6469,7 +7364,145 @@
     </p:spTree>
     <p:extLst>
       <p:ext uri="{BB962C8B-B14F-4D97-AF65-F5344CB8AC3E}">
-        <p14:creationId xmlns:p14="http://schemas.microsoft.com/office/powerpoint/2010/main" val="1154515448"/>
+        <p14:creationId xmlns:p14="http://schemas.microsoft.com/office/powerpoint/2010/main" val="3994059908"/>
+      </p:ext>
+    </p:extLst>
+  </p:cSld>
+  <p:clrMapOvr>
+    <a:masterClrMapping/>
+  </p:clrMapOvr>
+</p:sld>
+</file>
+
+<file path=ppt/slides/slide16.xml><?xml version="1.0" encoding="utf-8"?>
+<p:sld xmlns:a="http://schemas.openxmlformats.org/drawingml/2006/main" xmlns:r="http://schemas.openxmlformats.org/officeDocument/2006/relationships" xmlns:p="http://schemas.openxmlformats.org/presentationml/2006/main">
+  <p:cSld>
+    <p:spTree>
+      <p:nvGrpSpPr>
+        <p:cNvPr id="1" name=""/>
+        <p:cNvGrpSpPr/>
+        <p:nvPr/>
+      </p:nvGrpSpPr>
+      <p:grpSpPr>
+        <a:xfrm>
+          <a:off x="0" y="0"/>
+          <a:ext cx="0" cy="0"/>
+          <a:chOff x="0" y="0"/>
+          <a:chExt cx="0" cy="0"/>
+        </a:xfrm>
+      </p:grpSpPr>
+      <p:sp>
+        <p:nvSpPr>
+          <p:cNvPr id="2" name="Titel 1"/>
+          <p:cNvSpPr>
+            <a:spLocks noGrp="1"/>
+          </p:cNvSpPr>
+          <p:nvPr>
+            <p:ph type="ctrTitle"/>
+          </p:nvPr>
+        </p:nvSpPr>
+        <p:spPr/>
+        <p:txBody>
+          <a:bodyPr/>
+          <a:lstStyle/>
+          <a:p>
+            <a:r>
+              <a:rPr lang="de-DE" dirty="0"/>
+              <a:t>Noch fragen?</a:t>
+            </a:r>
+            <a:endParaRPr lang="en-GB" dirty="0"/>
+          </a:p>
+        </p:txBody>
+      </p:sp>
+      <p:sp>
+        <p:nvSpPr>
+          <p:cNvPr id="4" name="Untertitel 3">
+            <a:extLst>
+              <a:ext uri="{FF2B5EF4-FFF2-40B4-BE49-F238E27FC236}">
+                <a16:creationId xmlns:a16="http://schemas.microsoft.com/office/drawing/2014/main" id="{F169FAF9-7C5A-4D25-90E4-785EF6D2656A}"/>
+              </a:ext>
+            </a:extLst>
+          </p:cNvPr>
+          <p:cNvSpPr>
+            <a:spLocks noGrp="1"/>
+          </p:cNvSpPr>
+          <p:nvPr>
+            <p:ph type="subTitle" idx="1"/>
+          </p:nvPr>
+        </p:nvSpPr>
+        <p:spPr/>
+        <p:txBody>
+          <a:bodyPr/>
+          <a:lstStyle/>
+          <a:p>
+            <a:r>
+              <a:rPr lang="de-DE" dirty="0"/>
+              <a:t>Danke für Ihre Aufmerksamkeit!</a:t>
+            </a:r>
+          </a:p>
+        </p:txBody>
+      </p:sp>
+      <p:sp>
+        <p:nvSpPr>
+          <p:cNvPr id="6" name="Datumsplatzhalter 5"/>
+          <p:cNvSpPr>
+            <a:spLocks noGrp="1"/>
+          </p:cNvSpPr>
+          <p:nvPr>
+            <p:ph type="dt" sz="half" idx="4294967295"/>
+          </p:nvPr>
+        </p:nvSpPr>
+        <p:spPr>
+          <a:xfrm>
+            <a:off x="0" y="6356350"/>
+            <a:ext cx="2057400" cy="365125"/>
+          </a:xfrm>
+        </p:spPr>
+        <p:txBody>
+          <a:bodyPr/>
+          <a:lstStyle/>
+          <a:p>
+            <a:fld id="{7A101A87-D014-4826-A19A-EE438A1F464F}" type="datetime1">
+              <a:rPr lang="de-DE" smtClean="0"/>
+              <a:t>10.07.2017</a:t>
+            </a:fld>
+            <a:endParaRPr lang="en-GB" dirty="0"/>
+          </a:p>
+        </p:txBody>
+      </p:sp>
+      <p:sp>
+        <p:nvSpPr>
+          <p:cNvPr id="7" name="Foliennummernplatzhalter 6"/>
+          <p:cNvSpPr>
+            <a:spLocks noGrp="1"/>
+          </p:cNvSpPr>
+          <p:nvPr>
+            <p:ph type="sldNum" sz="quarter" idx="4294967295"/>
+          </p:nvPr>
+        </p:nvSpPr>
+        <p:spPr>
+          <a:xfrm>
+            <a:off x="7086600" y="6353175"/>
+            <a:ext cx="2057400" cy="365125"/>
+          </a:xfrm>
+        </p:spPr>
+        <p:txBody>
+          <a:bodyPr/>
+          <a:lstStyle/>
+          <a:p>
+            <a:fld id="{D28BEBC9-775D-4085-B138-BED27E854DA8}" type="slidenum">
+              <a:rPr lang="en-GB" smtClean="0"/>
+              <a:pPr/>
+              <a:t>16</a:t>
+            </a:fld>
+            <a:endParaRPr lang="en-GB"/>
+          </a:p>
+        </p:txBody>
+      </p:sp>
+    </p:spTree>
+    <p:extLst>
+      <p:ext uri="{BB962C8B-B14F-4D97-AF65-F5344CB8AC3E}">
+        <p14:creationId xmlns:p14="http://schemas.microsoft.com/office/powerpoint/2010/main" val="1755377436"/>
       </p:ext>
     </p:extLst>
   </p:cSld>
@@ -6541,7 +7574,7 @@
             </a:pPr>
             <a:r>
               <a:rPr lang="de-DE" dirty="0"/>
-              <a:t>Was ist ein Genetischer Algorithmus?</a:t>
+              <a:t>Was ist ein Genetischer Algorithmus (GA)?</a:t>
             </a:r>
           </a:p>
           <a:p>
@@ -6550,7 +7583,7 @@
             </a:pPr>
             <a:r>
               <a:rPr lang="de-DE" dirty="0"/>
-              <a:t>Klassifizierung von Crossover-Operationen</a:t>
+              <a:t>Klassifizierung von Crossover-Operationen (COs)</a:t>
             </a:r>
           </a:p>
           <a:p>
@@ -6641,7 +7674,7 @@
           <a:p>
             <a:fld id="{7A101A87-D014-4826-A19A-EE438A1F464F}" type="datetime1">
               <a:rPr lang="de-DE" smtClean="0"/>
-              <a:t>06.07.2017</a:t>
+              <a:t>10.07.2017</a:t>
             </a:fld>
             <a:endParaRPr lang="en-GB" dirty="0"/>
           </a:p>
@@ -6718,7 +7751,7 @@
           <a:p>
             <a:r>
               <a:rPr lang="de-DE" dirty="0"/>
-              <a:t>Was ist ein Genetischer Algorithmus?</a:t>
+              <a:t>Was ist ein Genetischer Algorithmus (GA)?</a:t>
             </a:r>
             <a:endParaRPr lang="en-GB" dirty="0"/>
           </a:p>
@@ -6741,7 +7774,7 @@
           <a:p>
             <a:fld id="{7A101A87-D014-4826-A19A-EE438A1F464F}" type="datetime1">
               <a:rPr lang="de-DE" smtClean="0"/>
-              <a:t>06.07.2017</a:t>
+              <a:t>10.07.2017</a:t>
             </a:fld>
             <a:endParaRPr lang="en-GB" dirty="0"/>
           </a:p>
@@ -6900,7 +7933,7 @@
           <a:p>
             <a:r>
               <a:rPr lang="de-DE" dirty="0"/>
-              <a:t>Klassifizierung von Crossover-Operationen</a:t>
+              <a:t>Klassifizierung von Crossover-Operationen (COs)</a:t>
             </a:r>
             <a:endParaRPr lang="en-GB" dirty="0"/>
           </a:p>
@@ -6965,7 +7998,7 @@
           <a:p>
             <a:fld id="{7A101A87-D014-4826-A19A-EE438A1F464F}" type="datetime1">
               <a:rPr lang="de-DE" smtClean="0"/>
-              <a:t>06.07.2017</a:t>
+              <a:t>10.07.2017</a:t>
             </a:fld>
             <a:endParaRPr lang="en-GB" dirty="0"/>
           </a:p>
@@ -7107,7 +8140,7 @@
             </a:pPr>
             <a:r>
               <a:rPr lang="de-DE" dirty="0"/>
-              <a:t>Dienen als Basis für andere Crossover-Operatoren</a:t>
+              <a:t>Dienen als Basis für andere COs</a:t>
             </a:r>
           </a:p>
           <a:p>
@@ -7176,9 +8209,52 @@
               <a:buFont typeface="Wingdings" panose="05000000000000000000" pitchFamily="2" charset="2"/>
               <a:buChar char="§"/>
             </a:pPr>
-            <a:r>
-              <a:rPr lang="de-DE" dirty="0"/>
-              <a:t>BILD</a:t>
+            <a:endParaRPr lang="de-DE" dirty="0"/>
+          </a:p>
+          <a:p>
+            <a:pPr>
+              <a:buFont typeface="Wingdings" panose="05000000000000000000" pitchFamily="2" charset="2"/>
+              <a:buChar char="§"/>
+            </a:pPr>
+            <a:endParaRPr lang="de-DE" dirty="0"/>
+          </a:p>
+          <a:p>
+            <a:pPr>
+              <a:buFont typeface="Wingdings" panose="05000000000000000000" pitchFamily="2" charset="2"/>
+              <a:buChar char="§"/>
+            </a:pPr>
+            <a:endParaRPr lang="de-DE" dirty="0"/>
+          </a:p>
+          <a:p>
+            <a:pPr>
+              <a:buFont typeface="Wingdings" panose="05000000000000000000" pitchFamily="2" charset="2"/>
+              <a:buChar char="§"/>
+            </a:pPr>
+            <a:endParaRPr lang="de-DE" dirty="0"/>
+          </a:p>
+          <a:p>
+            <a:pPr>
+              <a:buFont typeface="Wingdings" panose="05000000000000000000" pitchFamily="2" charset="2"/>
+              <a:buChar char="§"/>
+            </a:pPr>
+            <a:r>
+              <a:rPr lang="de-DE" sz="1100" dirty="0"/>
+              <a:t>Bild: Hähner, Müller-</a:t>
+            </a:r>
+            <a:r>
+              <a:rPr lang="de-DE" sz="1100" dirty="0" err="1"/>
+              <a:t>Schloer</a:t>
+            </a:r>
+            <a:r>
+              <a:rPr lang="de-DE" sz="1100" dirty="0"/>
+              <a:t>,</a:t>
+            </a:r>
+            <a:br>
+              <a:rPr lang="de-DE" sz="1100" dirty="0"/>
+            </a:br>
+            <a:r>
+              <a:rPr lang="de-DE" sz="1100" dirty="0"/>
+              <a:t>OC2-Folien</a:t>
             </a:r>
           </a:p>
         </p:txBody>
@@ -7200,7 +8276,7 @@
           <a:p>
             <a:fld id="{7A101A87-D014-4826-A19A-EE438A1F464F}" type="datetime1">
               <a:rPr lang="de-DE" smtClean="0"/>
-              <a:t>06.07.2017</a:t>
+              <a:t>10.07.2017</a:t>
             </a:fld>
             <a:endParaRPr lang="en-GB" dirty="0"/>
           </a:p>
@@ -7230,6 +8306,42 @@
           </a:p>
         </p:txBody>
       </p:sp>
+      <p:pic>
+        <p:nvPicPr>
+          <p:cNvPr id="5" name="Grafik 4" descr="Bildschirmausschnitt">
+            <a:extLst>
+              <a:ext uri="{FF2B5EF4-FFF2-40B4-BE49-F238E27FC236}">
+                <a16:creationId xmlns:a16="http://schemas.microsoft.com/office/drawing/2014/main" id="{EB2B00D5-B671-4C53-AD53-721581E0771D}"/>
+              </a:ext>
+            </a:extLst>
+          </p:cNvPr>
+          <p:cNvPicPr>
+            <a:picLocks noChangeAspect="1"/>
+          </p:cNvPicPr>
+          <p:nvPr/>
+        </p:nvPicPr>
+        <p:blipFill>
+          <a:blip r:embed="rId3">
+            <a:extLst>
+              <a:ext uri="{28A0092B-C50C-407E-A947-70E740481C1C}">
+                <a14:useLocalDpi xmlns:a14="http://schemas.microsoft.com/office/drawing/2010/main" val="0"/>
+              </a:ext>
+            </a:extLst>
+          </a:blip>
+          <a:stretch>
+            <a:fillRect/>
+          </a:stretch>
+        </p:blipFill>
+        <p:spPr>
+          <a:xfrm>
+            <a:off x="2818892" y="4385733"/>
+            <a:ext cx="5101808" cy="1791230"/>
+          </a:xfrm>
+          <a:prstGeom prst="rect">
+            <a:avLst/>
+          </a:prstGeom>
+        </p:spPr>
+      </p:pic>
     </p:spTree>
     <p:extLst>
       <p:ext uri="{BB962C8B-B14F-4D97-AF65-F5344CB8AC3E}">
@@ -7353,7 +8465,17 @@
             </a:pPr>
             <a:r>
               <a:rPr lang="de-DE" dirty="0"/>
-              <a:t>Mögliche Anwendungsfälle:</a:t>
+              <a:t>Möglicher Anwendungsfall: Classification Problem</a:t>
+            </a:r>
+          </a:p>
+          <a:p>
+            <a:pPr>
+              <a:buFont typeface="Wingdings" panose="05000000000000000000" pitchFamily="2" charset="2"/>
+              <a:buChar char="§"/>
+            </a:pPr>
+            <a:r>
+              <a:rPr lang="de-DE" dirty="0"/>
+              <a:t>Passende Crossover-Operationen:</a:t>
             </a:r>
           </a:p>
           <a:p>
@@ -7363,7 +8485,7 @@
             </a:pPr>
             <a:r>
               <a:rPr lang="de-DE" dirty="0"/>
-              <a:t>Classification Problem</a:t>
+              <a:t>Self-Crossover</a:t>
             </a:r>
           </a:p>
           <a:p>
@@ -7372,26 +8494,8 @@
               <a:buChar char="§"/>
             </a:pPr>
             <a:r>
-              <a:rPr lang="de-DE" dirty="0"/>
-              <a:t>Multimodal Spin </a:t>
-            </a:r>
-            <a:r>
-              <a:rPr lang="de-DE" dirty="0" err="1"/>
-              <a:t>Lattice</a:t>
-            </a:r>
-            <a:r>
-              <a:rPr lang="de-DE" dirty="0"/>
-              <a:t> Problem</a:t>
-            </a:r>
-          </a:p>
-          <a:p>
-            <a:pPr>
-              <a:buFont typeface="Wingdings" panose="05000000000000000000" pitchFamily="2" charset="2"/>
-              <a:buChar char="§"/>
-            </a:pPr>
-            <a:r>
-              <a:rPr lang="de-DE" dirty="0"/>
-              <a:t>Passende Crossover-Operationen:</a:t>
+              <a:rPr lang="en-GB" dirty="0"/>
+              <a:t>Supplementary Crossover</a:t>
             </a:r>
           </a:p>
           <a:p>
@@ -7400,26 +8504,6 @@
               <a:buChar char="§"/>
             </a:pPr>
             <a:r>
-              <a:rPr lang="de-DE" dirty="0"/>
-              <a:t>Self-Crossover</a:t>
-            </a:r>
-          </a:p>
-          <a:p>
-            <a:pPr lvl="1">
-              <a:buFont typeface="Wingdings" panose="05000000000000000000" pitchFamily="2" charset="2"/>
-              <a:buChar char="§"/>
-            </a:pPr>
-            <a:r>
-              <a:rPr lang="en-GB" dirty="0"/>
-              <a:t>Supplementary Crossover</a:t>
-            </a:r>
-          </a:p>
-          <a:p>
-            <a:pPr lvl="1">
-              <a:buFont typeface="Wingdings" panose="05000000000000000000" pitchFamily="2" charset="2"/>
-              <a:buChar char="§"/>
-            </a:pPr>
-            <a:r>
               <a:rPr lang="en-GB" dirty="0"/>
               <a:t>Generalized crossover</a:t>
             </a:r>
@@ -7443,7 +8527,7 @@
           <a:p>
             <a:fld id="{7A101A87-D014-4826-A19A-EE438A1F464F}" type="datetime1">
               <a:rPr lang="de-DE" smtClean="0"/>
-              <a:t>06.07.2017</a:t>
+              <a:t>10.07.2017</a:t>
             </a:fld>
             <a:endParaRPr lang="en-GB" dirty="0"/>
           </a:p>
@@ -7556,9 +8640,116 @@
             </a:pPr>
             <a:r>
               <a:rPr lang="de-DE" dirty="0"/>
-              <a:t>Text</a:t>
-            </a:r>
-            <a:endParaRPr lang="en-GB" sz="1400" dirty="0"/>
+              <a:t>Ketten von ganzzahligen Werten</a:t>
+            </a:r>
+          </a:p>
+          <a:p>
+            <a:pPr>
+              <a:buFont typeface="Wingdings" panose="05000000000000000000" pitchFamily="2" charset="2"/>
+              <a:buChar char="§"/>
+            </a:pPr>
+            <a:r>
+              <a:rPr lang="de-DE" dirty="0"/>
+              <a:t>CO muss berücksichtigen, dass es mehrere Einzelwerte sind</a:t>
+            </a:r>
+          </a:p>
+          <a:p>
+            <a:pPr>
+              <a:buFont typeface="Wingdings" panose="05000000000000000000" pitchFamily="2" charset="2"/>
+              <a:buChar char="§"/>
+            </a:pPr>
+            <a:r>
+              <a:rPr lang="de-DE" dirty="0"/>
+              <a:t>Mögliche Anwendungsfall: </a:t>
+            </a:r>
+            <a:r>
+              <a:rPr lang="en-GB" dirty="0"/>
+              <a:t>Traveling Salesman Problem</a:t>
+            </a:r>
+          </a:p>
+          <a:p>
+            <a:pPr>
+              <a:buFont typeface="Wingdings" panose="05000000000000000000" pitchFamily="2" charset="2"/>
+              <a:buChar char="§"/>
+            </a:pPr>
+            <a:r>
+              <a:rPr lang="en-GB" dirty="0"/>
+              <a:t>COs </a:t>
+            </a:r>
+            <a:r>
+              <a:rPr lang="en-GB" dirty="0" err="1"/>
+              <a:t>lassen</a:t>
+            </a:r>
+            <a:r>
+              <a:rPr lang="en-GB" dirty="0"/>
+              <a:t> </a:t>
+            </a:r>
+            <a:r>
+              <a:rPr lang="en-GB" dirty="0" err="1"/>
+              <a:t>sich</a:t>
+            </a:r>
+            <a:r>
+              <a:rPr lang="en-GB" dirty="0"/>
+              <a:t> in </a:t>
+            </a:r>
+            <a:r>
+              <a:rPr lang="en-GB" dirty="0" err="1"/>
+              <a:t>Unterkategorien</a:t>
+            </a:r>
+            <a:r>
+              <a:rPr lang="en-GB" dirty="0"/>
+              <a:t> </a:t>
+            </a:r>
+            <a:r>
+              <a:rPr lang="en-GB" dirty="0" err="1"/>
+              <a:t>einteilen</a:t>
+            </a:r>
+            <a:r>
+              <a:rPr lang="en-GB" dirty="0"/>
+              <a:t>, z. B.:</a:t>
+            </a:r>
+          </a:p>
+          <a:p>
+            <a:pPr lvl="1">
+              <a:buFont typeface="Wingdings" panose="05000000000000000000" pitchFamily="2" charset="2"/>
+              <a:buChar char="§"/>
+            </a:pPr>
+            <a:r>
+              <a:rPr lang="en-GB" dirty="0" err="1"/>
+              <a:t>Positionsbasierte</a:t>
+            </a:r>
+            <a:r>
+              <a:rPr lang="en-GB" dirty="0"/>
+              <a:t> COs, z. B. Position Based Crossover </a:t>
+            </a:r>
+          </a:p>
+          <a:p>
+            <a:pPr lvl="1">
+              <a:buFont typeface="Wingdings" panose="05000000000000000000" pitchFamily="2" charset="2"/>
+              <a:buChar char="§"/>
+            </a:pPr>
+            <a:r>
+              <a:rPr lang="en-GB" dirty="0" err="1"/>
+              <a:t>Kantenbasierte</a:t>
+            </a:r>
+            <a:r>
+              <a:rPr lang="en-GB" dirty="0"/>
+              <a:t> COs, z. B. Edge Crossover </a:t>
+            </a:r>
+          </a:p>
+          <a:p>
+            <a:pPr lvl="1">
+              <a:buFont typeface="Wingdings" panose="05000000000000000000" pitchFamily="2" charset="2"/>
+              <a:buChar char="§"/>
+            </a:pPr>
+            <a:r>
+              <a:rPr lang="en-GB" dirty="0" err="1"/>
+              <a:t>Folgenbasierte</a:t>
+            </a:r>
+            <a:r>
+              <a:rPr lang="en-GB" dirty="0"/>
+              <a:t> COs, z. B. Merging Crossover</a:t>
+            </a:r>
           </a:p>
         </p:txBody>
       </p:sp>
@@ -7579,7 +8770,7 @@
           <a:p>
             <a:fld id="{7A101A87-D014-4826-A19A-EE438A1F464F}" type="datetime1">
               <a:rPr lang="de-DE" smtClean="0"/>
-              <a:t>06.07.2017</a:t>
+              <a:t>10.07.2017</a:t>
             </a:fld>
             <a:endParaRPr lang="en-GB" dirty="0"/>
           </a:p>
@@ -7663,7 +8854,15 @@
             </a:br>
             <a:r>
               <a:rPr lang="de-DE" dirty="0"/>
-              <a:t>Fließkommawerte</a:t>
+              <a:t>Permutationen – </a:t>
+            </a:r>
+            <a:r>
+              <a:rPr lang="de-DE" dirty="0" err="1"/>
+              <a:t>Merging</a:t>
+            </a:r>
+            <a:r>
+              <a:rPr lang="de-DE" dirty="0"/>
+              <a:t> Crossover</a:t>
             </a:r>
             <a:endParaRPr lang="en-GB" dirty="0"/>
           </a:p>
@@ -7692,9 +8891,131 @@
             </a:pPr>
             <a:r>
               <a:rPr lang="de-DE" dirty="0"/>
-              <a:t>Text</a:t>
-            </a:r>
-            <a:endParaRPr lang="en-GB" sz="1400" dirty="0"/>
+              <a:t>Verschmelzende, folgenbasierte CO für Permutationen</a:t>
+            </a:r>
+          </a:p>
+          <a:p>
+            <a:pPr>
+              <a:buFont typeface="Wingdings" panose="05000000000000000000" pitchFamily="2" charset="2"/>
+              <a:buChar char="§"/>
+            </a:pPr>
+            <a:r>
+              <a:rPr lang="de-DE" dirty="0"/>
+              <a:t>Beide Elternteileile werden zunächst kombiniert</a:t>
+            </a:r>
+          </a:p>
+          <a:p>
+            <a:pPr>
+              <a:buFont typeface="Wingdings" panose="05000000000000000000" pitchFamily="2" charset="2"/>
+              <a:buChar char="§"/>
+            </a:pPr>
+            <a:r>
+              <a:rPr lang="de-DE" dirty="0"/>
+              <a:t>Zusammengefügte Liste wird anschließend geteilt</a:t>
+            </a:r>
+          </a:p>
+          <a:p>
+            <a:pPr>
+              <a:buFont typeface="Wingdings" panose="05000000000000000000" pitchFamily="2" charset="2"/>
+              <a:buChar char="§"/>
+            </a:pPr>
+            <a:r>
+              <a:rPr lang="de-DE" dirty="0"/>
+              <a:t>Erstmaliges Vorkommen eines Wertes</a:t>
+            </a:r>
+          </a:p>
+          <a:p>
+            <a:pPr marL="0" indent="0">
+              <a:buNone/>
+            </a:pPr>
+            <a:r>
+              <a:rPr lang="de-DE" dirty="0">
+                <a:sym typeface="Wingdings" panose="05000000000000000000" pitchFamily="2" charset="2"/>
+              </a:rPr>
+              <a:t>	</a:t>
+            </a:r>
+            <a:r>
+              <a:rPr lang="de-DE" dirty="0"/>
+              <a:t> Übertragung in 1. Kind</a:t>
+            </a:r>
+          </a:p>
+          <a:p>
+            <a:pPr>
+              <a:buFont typeface="Wingdings" panose="05000000000000000000" pitchFamily="2" charset="2"/>
+              <a:buChar char="§"/>
+            </a:pPr>
+            <a:r>
+              <a:rPr lang="de-DE" dirty="0"/>
+              <a:t>Zweites Vorkommen eines Wertes</a:t>
+            </a:r>
+          </a:p>
+          <a:p>
+            <a:pPr marL="0" indent="0">
+              <a:buNone/>
+            </a:pPr>
+            <a:r>
+              <a:rPr lang="de-DE" dirty="0">
+                <a:sym typeface="Wingdings" panose="05000000000000000000" pitchFamily="2" charset="2"/>
+              </a:rPr>
+              <a:t>	 </a:t>
+            </a:r>
+            <a:r>
+              <a:rPr lang="de-DE" dirty="0"/>
+              <a:t>Übertragung in 2. Kind</a:t>
+            </a:r>
+          </a:p>
+          <a:p>
+            <a:pPr>
+              <a:buFont typeface="Wingdings" panose="05000000000000000000" pitchFamily="2" charset="2"/>
+              <a:buChar char="§"/>
+            </a:pPr>
+            <a:endParaRPr lang="de-DE" dirty="0"/>
+          </a:p>
+          <a:p>
+            <a:pPr>
+              <a:buFont typeface="Wingdings" panose="05000000000000000000" pitchFamily="2" charset="2"/>
+              <a:buChar char="§"/>
+            </a:pPr>
+            <a:endParaRPr lang="de-DE" dirty="0"/>
+          </a:p>
+          <a:p>
+            <a:pPr>
+              <a:buFont typeface="Wingdings" panose="05000000000000000000" pitchFamily="2" charset="2"/>
+              <a:buChar char="§"/>
+            </a:pPr>
+            <a:endParaRPr lang="de-DE" dirty="0"/>
+          </a:p>
+          <a:p>
+            <a:pPr>
+              <a:buFont typeface="Wingdings" panose="05000000000000000000" pitchFamily="2" charset="2"/>
+              <a:buChar char="§"/>
+            </a:pPr>
+            <a:endParaRPr lang="de-DE" dirty="0"/>
+          </a:p>
+          <a:p>
+            <a:pPr>
+              <a:buFont typeface="Wingdings" panose="05000000000000000000" pitchFamily="2" charset="2"/>
+              <a:buChar char="§"/>
+            </a:pPr>
+            <a:r>
+              <a:rPr lang="de-DE" sz="1100" dirty="0"/>
+              <a:t>Bild: Mumford, </a:t>
+            </a:r>
+            <a:r>
+              <a:rPr lang="en-US" sz="1100" dirty="0"/>
+              <a:t>New Order-Based Crossovers</a:t>
+            </a:r>
+            <a:br>
+              <a:rPr lang="en-US" sz="1100" dirty="0"/>
+            </a:br>
+            <a:r>
+              <a:rPr lang="en-US" sz="1100" dirty="0"/>
+              <a:t>for the Graph Coloring Problem</a:t>
+            </a:r>
+            <a:r>
+              <a:rPr lang="de-DE" sz="1100" dirty="0"/>
+              <a:t>, 2006</a:t>
+            </a:r>
           </a:p>
         </p:txBody>
       </p:sp>
@@ -7715,7 +9036,7 @@
           <a:p>
             <a:fld id="{7A101A87-D014-4826-A19A-EE438A1F464F}" type="datetime1">
               <a:rPr lang="de-DE" smtClean="0"/>
-              <a:t>06.07.2017</a:t>
+              <a:t>10.07.2017</a:t>
             </a:fld>
             <a:endParaRPr lang="en-GB" dirty="0"/>
           </a:p>
@@ -7745,10 +9066,46 @@
           </a:p>
         </p:txBody>
       </p:sp>
+      <p:pic>
+        <p:nvPicPr>
+          <p:cNvPr id="5" name="Grafik 4" descr="Bildschirmausschnitt">
+            <a:extLst>
+              <a:ext uri="{FF2B5EF4-FFF2-40B4-BE49-F238E27FC236}">
+                <a16:creationId xmlns:a16="http://schemas.microsoft.com/office/drawing/2014/main" id="{16A8DA3A-63BF-4DCA-B0C7-569077E7DE4B}"/>
+              </a:ext>
+            </a:extLst>
+          </p:cNvPr>
+          <p:cNvPicPr>
+            <a:picLocks noChangeAspect="1"/>
+          </p:cNvPicPr>
+          <p:nvPr/>
+        </p:nvPicPr>
+        <p:blipFill>
+          <a:blip r:embed="rId3">
+            <a:extLst>
+              <a:ext uri="{28A0092B-C50C-407E-A947-70E740481C1C}">
+                <a14:useLocalDpi xmlns:a14="http://schemas.microsoft.com/office/drawing/2010/main" val="0"/>
+              </a:ext>
+            </a:extLst>
+          </a:blip>
+          <a:stretch>
+            <a:fillRect/>
+          </a:stretch>
+        </p:blipFill>
+        <p:spPr>
+          <a:xfrm>
+            <a:off x="4690533" y="3143366"/>
+            <a:ext cx="4258867" cy="3033598"/>
+          </a:xfrm>
+          <a:prstGeom prst="rect">
+            <a:avLst/>
+          </a:prstGeom>
+        </p:spPr>
+      </p:pic>
     </p:spTree>
     <p:extLst>
       <p:ext uri="{BB962C8B-B14F-4D97-AF65-F5344CB8AC3E}">
-        <p14:creationId xmlns:p14="http://schemas.microsoft.com/office/powerpoint/2010/main" val="3789726562"/>
+        <p14:creationId xmlns:p14="http://schemas.microsoft.com/office/powerpoint/2010/main" val="3203422368"/>
       </p:ext>
     </p:extLst>
   </p:cSld>
@@ -7799,7 +9156,7 @@
             </a:br>
             <a:r>
               <a:rPr lang="de-DE" dirty="0"/>
-              <a:t>Zeichenketten</a:t>
+              <a:t>Fließkommawerte</a:t>
             </a:r>
             <a:endParaRPr lang="en-GB" dirty="0"/>
           </a:p>
@@ -7828,9 +9185,114 @@
             </a:pPr>
             <a:r>
               <a:rPr lang="de-DE" dirty="0"/>
-              <a:t>Text</a:t>
-            </a:r>
-            <a:endParaRPr lang="en-GB" sz="1400" dirty="0"/>
+              <a:t>Daten als Fließkommawerte gespeichert</a:t>
+            </a:r>
+          </a:p>
+          <a:p>
+            <a:pPr>
+              <a:buFont typeface="Wingdings" panose="05000000000000000000" pitchFamily="2" charset="2"/>
+              <a:buChar char="§"/>
+            </a:pPr>
+            <a:r>
+              <a:rPr lang="de-DE" dirty="0"/>
+              <a:t>Bieten höhere Genauigkeit für kontinuierliche Suchräume</a:t>
+            </a:r>
+          </a:p>
+          <a:p>
+            <a:pPr>
+              <a:buFont typeface="Wingdings" panose="05000000000000000000" pitchFamily="2" charset="2"/>
+              <a:buChar char="§"/>
+            </a:pPr>
+            <a:r>
+              <a:rPr lang="de-DE" dirty="0"/>
+              <a:t>In solchen Suchräumen effizienter als Ganzzahlen oder Binärcodierung</a:t>
+            </a:r>
+          </a:p>
+          <a:p>
+            <a:pPr>
+              <a:buFont typeface="Wingdings" panose="05000000000000000000" pitchFamily="2" charset="2"/>
+              <a:buChar char="§"/>
+            </a:pPr>
+            <a:r>
+              <a:rPr lang="de-DE" dirty="0"/>
+              <a:t>Typischer Anwendungsfall: Elektrotechnische Anwendungen</a:t>
+            </a:r>
+          </a:p>
+          <a:p>
+            <a:pPr>
+              <a:buFont typeface="Wingdings" panose="05000000000000000000" pitchFamily="2" charset="2"/>
+              <a:buChar char="§"/>
+            </a:pPr>
+            <a:r>
+              <a:rPr lang="de-DE" dirty="0"/>
+              <a:t>COs lassen sich in verschiedene Kategorien teilen, z. B.:</a:t>
+            </a:r>
+          </a:p>
+          <a:p>
+            <a:pPr lvl="1">
+              <a:buFont typeface="Wingdings" panose="05000000000000000000" pitchFamily="2" charset="2"/>
+              <a:buChar char="§"/>
+            </a:pPr>
+            <a:r>
+              <a:rPr lang="de-DE" dirty="0"/>
+              <a:t>Statistik-basierte COs, z. B. </a:t>
+            </a:r>
+            <a:r>
+              <a:rPr lang="de-DE" dirty="0" err="1"/>
+              <a:t>Taguchi</a:t>
+            </a:r>
+            <a:r>
+              <a:rPr lang="de-DE" dirty="0"/>
+              <a:t> Crossover</a:t>
+            </a:r>
+          </a:p>
+          <a:p>
+            <a:pPr lvl="1">
+              <a:buFont typeface="Wingdings" panose="05000000000000000000" pitchFamily="2" charset="2"/>
+              <a:buChar char="§"/>
+            </a:pPr>
+            <a:r>
+              <a:rPr lang="de-DE" dirty="0" err="1"/>
+              <a:t>Fuzzy</a:t>
+            </a:r>
+            <a:r>
+              <a:rPr lang="de-DE" dirty="0"/>
+              <a:t>-basierte COs, z. B. </a:t>
+            </a:r>
+            <a:r>
+              <a:rPr lang="de-DE" dirty="0" err="1"/>
+              <a:t>Fuzzy</a:t>
+            </a:r>
+            <a:r>
+              <a:rPr lang="de-DE" dirty="0"/>
+              <a:t> </a:t>
+            </a:r>
+            <a:r>
+              <a:rPr lang="de-DE" dirty="0" err="1"/>
+              <a:t>Arithmetic</a:t>
+            </a:r>
+            <a:r>
+              <a:rPr lang="de-DE" dirty="0"/>
+              <a:t> </a:t>
+            </a:r>
+            <a:r>
+              <a:rPr lang="de-DE" dirty="0" err="1"/>
+              <a:t>Weighted</a:t>
+            </a:r>
+            <a:r>
+              <a:rPr lang="de-DE" dirty="0"/>
+              <a:t> Mean</a:t>
+            </a:r>
+          </a:p>
+          <a:p>
+            <a:pPr lvl="1">
+              <a:buFont typeface="Wingdings" panose="05000000000000000000" pitchFamily="2" charset="2"/>
+              <a:buChar char="§"/>
+            </a:pPr>
+            <a:r>
+              <a:rPr lang="de-DE" dirty="0"/>
+              <a:t>Durchschnitts-basierte COs, z. B. Average Crossover</a:t>
+            </a:r>
           </a:p>
         </p:txBody>
       </p:sp>
@@ -7851,7 +9313,7 @@
           <a:p>
             <a:fld id="{7A101A87-D014-4826-A19A-EE438A1F464F}" type="datetime1">
               <a:rPr lang="de-DE" smtClean="0"/>
-              <a:t>06.07.2017</a:t>
+              <a:t>10.07.2017</a:t>
             </a:fld>
             <a:endParaRPr lang="en-GB" dirty="0"/>
           </a:p>
@@ -7884,7 +9346,7 @@
     </p:spTree>
     <p:extLst>
       <p:ext uri="{BB962C8B-B14F-4D97-AF65-F5344CB8AC3E}">
-        <p14:creationId xmlns:p14="http://schemas.microsoft.com/office/powerpoint/2010/main" val="4096609432"/>
+        <p14:creationId xmlns:p14="http://schemas.microsoft.com/office/powerpoint/2010/main" val="3789726562"/>
       </p:ext>
     </p:extLst>
   </p:cSld>

</xml_diff>

<commit_message>
optimization and added fuzzy
</commit_message>
<xml_diff>
--- a/Vortragsfolien.pptx
+++ b/Vortragsfolien.pptx
@@ -5,10 +5,10 @@
     <p:sldMasterId id="2147483696" r:id="rId1"/>
   </p:sldMasterIdLst>
   <p:notesMasterIdLst>
-    <p:notesMasterId r:id="rId18"/>
+    <p:notesMasterId r:id="rId19"/>
   </p:notesMasterIdLst>
   <p:handoutMasterIdLst>
-    <p:handoutMasterId r:id="rId19"/>
+    <p:handoutMasterId r:id="rId20"/>
   </p:handoutMasterIdLst>
   <p:sldIdLst>
     <p:sldId id="256" r:id="rId2"/>
@@ -27,6 +27,7 @@
     <p:sldId id="279" r:id="rId15"/>
     <p:sldId id="280" r:id="rId16"/>
     <p:sldId id="281" r:id="rId17"/>
+    <p:sldId id="283" r:id="rId18"/>
   </p:sldIdLst>
   <p:sldSz cx="9144000" cy="6858000" type="screen4x3"/>
   <p:notesSz cx="6797675" cy="9926638"/>
@@ -222,7 +223,7 @@
           <a:p>
             <a:fld id="{715A281C-4A89-48CD-A669-9FDFF37F42B7}" type="datetimeFigureOut">
               <a:rPr lang="en-GB" smtClean="0"/>
-              <a:t>11/07/2017</a:t>
+              <a:t>12/07/2017</a:t>
             </a:fld>
             <a:endParaRPr lang="en-GB"/>
           </a:p>
@@ -387,7 +388,7 @@
           <a:p>
             <a:fld id="{0DA8FC89-82F1-4511-B204-39F19FAF212E}" type="datetimeFigureOut">
               <a:rPr lang="en-GB" smtClean="0"/>
-              <a:t>11/07/2017</a:t>
+              <a:t>12/07/2017</a:t>
             </a:fld>
             <a:endParaRPr lang="en-GB"/>
           </a:p>
@@ -920,6 +921,29 @@
             </a:r>
           </a:p>
           <a:p>
+            <a:endParaRPr lang="de-DE" sz="1200" b="0" i="0" kern="1200" dirty="0">
+              <a:solidFill>
+                <a:schemeClr val="tx1"/>
+              </a:solidFill>
+              <a:effectLst/>
+              <a:latin typeface="+mn-lt"/>
+              <a:ea typeface="+mn-ea"/>
+              <a:cs typeface="+mn-cs"/>
+            </a:endParaRPr>
+          </a:p>
+          <a:p>
+            <a:r>
+              <a:rPr lang="de-DE" sz="1200" b="1" i="0" kern="1200" dirty="0">
+                <a:solidFill>
+                  <a:schemeClr val="tx1"/>
+                </a:solidFill>
+                <a:effectLst/>
+                <a:latin typeface="+mn-lt"/>
+                <a:ea typeface="+mn-ea"/>
+                <a:cs typeface="+mn-cs"/>
+              </a:rPr>
+              <a:t>C1 Crossover </a:t>
+            </a:r>
             <a:r>
               <a:rPr lang="de-DE" sz="1200" b="0" i="0" kern="1200" dirty="0">
                 <a:solidFill>
@@ -930,22 +954,9 @@
                 <a:ea typeface="+mn-ea"/>
                 <a:cs typeface="+mn-cs"/>
               </a:rPr>
-              <a:t>Längenunterscheidung basierend auf Länge der Eltern</a:t>
-            </a:r>
-          </a:p>
-          <a:p>
-            <a:endParaRPr lang="de-DE" sz="1200" b="0" i="0" kern="1200" dirty="0">
-              <a:solidFill>
-                <a:schemeClr val="tx1"/>
-              </a:solidFill>
-              <a:effectLst/>
-              <a:latin typeface="+mn-lt"/>
-              <a:ea typeface="+mn-ea"/>
-              <a:cs typeface="+mn-cs"/>
-            </a:endParaRPr>
-          </a:p>
-          <a:p>
-            <a:r>
+              <a:t>Ermittelt Sekundärstruktur-Elemente und legt die Schnittpunkte auf unstrukturierte Regionen und trennt somit unterschiedliche Strukturtypen.</a:t>
+            </a:r>
+            <a:br>
               <a:rPr lang="de-DE" sz="1200" b="0" i="0" kern="1200" dirty="0">
                 <a:solidFill>
                   <a:schemeClr val="tx1"/>
@@ -955,10 +966,19 @@
                 <a:ea typeface="+mn-ea"/>
                 <a:cs typeface="+mn-cs"/>
               </a:rPr>
-              <a:t>C1/C2 Crossover: Ermittelt Struktur und trennt unterschiedliche Strukturen</a:t>
-            </a:r>
-          </a:p>
-          <a:p>
+            </a:br>
+            <a:r>
+              <a:rPr lang="de-DE" sz="1200" b="1" i="0" kern="1200" dirty="0">
+                <a:solidFill>
+                  <a:schemeClr val="tx1"/>
+                </a:solidFill>
+                <a:effectLst/>
+                <a:latin typeface="+mn-lt"/>
+                <a:ea typeface="+mn-ea"/>
+                <a:cs typeface="+mn-cs"/>
+              </a:rPr>
+              <a:t>C2 Crossover </a:t>
+            </a:r>
             <a:r>
               <a:rPr lang="de-DE" sz="1200" b="0" i="0" kern="1200" dirty="0">
                 <a:solidFill>
@@ -969,7 +989,38 @@
                 <a:ea typeface="+mn-ea"/>
                 <a:cs typeface="+mn-cs"/>
               </a:rPr>
-              <a:t>Inside Crossover: Kinder sind länger als kurzer Elternteil bzw. kürzer als langer Elternteil</a:t>
+              <a:t>Legt die Schnittpunkte basierend auf der Frequenz der angrenzenden Genompaare der Sekundärstruktur fest.</a:t>
+            </a:r>
+            <a:r>
+              <a:rPr lang="de-DE" dirty="0"/>
+              <a:t> </a:t>
+            </a:r>
+            <a:br>
+              <a:rPr lang="de-DE" dirty="0"/>
+            </a:br>
+            <a:r>
+              <a:rPr lang="de-DE" sz="1200" b="1" i="0" kern="1200" dirty="0">
+                <a:solidFill>
+                  <a:schemeClr val="tx1"/>
+                </a:solidFill>
+                <a:effectLst/>
+                <a:latin typeface="+mn-lt"/>
+                <a:ea typeface="+mn-ea"/>
+                <a:cs typeface="+mn-cs"/>
+              </a:rPr>
+              <a:t>Inside Crossover</a:t>
+            </a:r>
+            <a:r>
+              <a:rPr lang="de-DE" sz="1200" b="0" i="0" kern="1200" dirty="0">
+                <a:solidFill>
+                  <a:schemeClr val="tx1"/>
+                </a:solidFill>
+                <a:effectLst/>
+                <a:latin typeface="+mn-lt"/>
+                <a:ea typeface="+mn-ea"/>
+                <a:cs typeface="+mn-cs"/>
+              </a:rPr>
+              <a:t>: Kinder sind länger als kurzer Elternteil bzw. kürzer als langer Elternteil</a:t>
             </a:r>
             <a:endParaRPr lang="en-GB" b="0" dirty="0"/>
           </a:p>
@@ -2654,100 +2705,6 @@
                 <a:cs typeface="+mn-cs"/>
               </a:rPr>
               <a:t>Nutzt statistische Daten innerhalb einer Matrix um das beste Ergebnis zu finden.</a:t>
-            </a:r>
-            <a:br>
-              <a:rPr lang="de-DE" sz="1200" b="0" i="0" kern="1200" dirty="0">
-                <a:solidFill>
-                  <a:schemeClr val="tx1"/>
-                </a:solidFill>
-                <a:effectLst/>
-                <a:latin typeface="+mn-lt"/>
-                <a:ea typeface="+mn-ea"/>
-                <a:cs typeface="+mn-cs"/>
-              </a:rPr>
-            </a:br>
-            <a:r>
-              <a:rPr lang="de-DE" sz="1200" b="1" i="0" kern="1200" dirty="0">
-                <a:solidFill>
-                  <a:schemeClr val="tx1"/>
-                </a:solidFill>
-                <a:effectLst/>
-                <a:latin typeface="+mn-lt"/>
-                <a:ea typeface="+mn-ea"/>
-                <a:cs typeface="+mn-cs"/>
-              </a:rPr>
-              <a:t>Average Crossover </a:t>
-            </a:r>
-            <a:r>
-              <a:rPr lang="de-DE" sz="1200" b="0" i="0" kern="1200" dirty="0">
-                <a:solidFill>
-                  <a:schemeClr val="tx1"/>
-                </a:solidFill>
-                <a:effectLst/>
-                <a:latin typeface="+mn-lt"/>
-                <a:ea typeface="+mn-ea"/>
-                <a:cs typeface="+mn-cs"/>
-              </a:rPr>
-              <a:t>Modifizierter </a:t>
-            </a:r>
-            <a:r>
-              <a:rPr lang="de-DE" sz="1200" b="0" i="1" kern="1200" dirty="0" err="1">
-                <a:solidFill>
-                  <a:schemeClr val="tx1"/>
-                </a:solidFill>
-                <a:effectLst/>
-                <a:latin typeface="+mn-lt"/>
-                <a:ea typeface="+mn-ea"/>
-                <a:cs typeface="+mn-cs"/>
-              </a:rPr>
-              <a:t>One</a:t>
-            </a:r>
-            <a:r>
-              <a:rPr lang="de-DE" sz="1200" b="0" i="1" kern="1200" dirty="0">
-                <a:solidFill>
-                  <a:schemeClr val="tx1"/>
-                </a:solidFill>
-                <a:effectLst/>
-                <a:latin typeface="+mn-lt"/>
-                <a:ea typeface="+mn-ea"/>
-                <a:cs typeface="+mn-cs"/>
-              </a:rPr>
-              <a:t>-Point-Crossover</a:t>
-            </a:r>
-            <a:r>
-              <a:rPr lang="de-DE" sz="1200" b="0" i="0" kern="1200" dirty="0">
-                <a:solidFill>
-                  <a:schemeClr val="tx1"/>
-                </a:solidFill>
-                <a:effectLst/>
-                <a:latin typeface="+mn-lt"/>
-                <a:ea typeface="+mn-ea"/>
-                <a:cs typeface="+mn-cs"/>
-              </a:rPr>
-              <a:t>, bei dem die Durchschnittswerte zwischen beiden Eltern anstatt den Elternwerten der einzelnen</a:t>
-            </a:r>
-            <a:br>
-              <a:rPr lang="de-DE" sz="1200" b="0" i="0" kern="1200" dirty="0">
-                <a:solidFill>
-                  <a:schemeClr val="tx1"/>
-                </a:solidFill>
-                <a:effectLst/>
-                <a:latin typeface="+mn-lt"/>
-                <a:ea typeface="+mn-ea"/>
-                <a:cs typeface="+mn-cs"/>
-              </a:rPr>
-            </a:br>
-            <a:r>
-              <a:rPr lang="de-DE" sz="1200" b="0" i="0" kern="1200" dirty="0">
-                <a:solidFill>
-                  <a:schemeClr val="tx1"/>
-                </a:solidFill>
-                <a:effectLst/>
-                <a:latin typeface="+mn-lt"/>
-                <a:ea typeface="+mn-ea"/>
-                <a:cs typeface="+mn-cs"/>
-              </a:rPr>
-              <a:t>Gene genutzt werden. [19]</a:t>
             </a:r>
             <a:br>
               <a:rPr lang="de-DE" sz="1200" b="0" i="0" kern="1200" dirty="0">
@@ -3320,7 +3277,7 @@
           <a:p>
             <a:fld id="{D0ED01E6-03D8-4FEF-A86A-FBF90D1DD342}" type="datetime1">
               <a:rPr lang="de-DE" smtClean="0"/>
-              <a:t>11.07.2017</a:t>
+              <a:t>12.07.2017</a:t>
             </a:fld>
             <a:endParaRPr lang="en-GB"/>
           </a:p>
@@ -3500,7 +3457,7 @@
           <a:p>
             <a:fld id="{871E47B7-FBD6-41B0-9D01-F6ECF1A4F5CC}" type="datetime1">
               <a:rPr lang="de-DE" smtClean="0"/>
-              <a:t>11.07.2017</a:t>
+              <a:t>12.07.2017</a:t>
             </a:fld>
             <a:endParaRPr lang="en-GB"/>
           </a:p>
@@ -3940,7 +3897,7 @@
           <a:p>
             <a:fld id="{9575385B-867E-403C-90F0-311C74870C67}" type="datetime1">
               <a:rPr lang="de-DE" smtClean="0"/>
-              <a:t>11.07.2017</a:t>
+              <a:t>12.07.2017</a:t>
             </a:fld>
             <a:endParaRPr lang="en-GB" dirty="0"/>
           </a:p>
@@ -4142,7 +4099,7 @@
           <a:p>
             <a:fld id="{3D0C857D-ED0B-416E-8E57-8CB429D7D202}" type="datetime1">
               <a:rPr lang="de-DE" smtClean="0"/>
-              <a:t>11.07.2017</a:t>
+              <a:t>12.07.2017</a:t>
             </a:fld>
             <a:endParaRPr lang="en-GB" dirty="0"/>
           </a:p>
@@ -4374,7 +4331,7 @@
           <a:p>
             <a:fld id="{0A428C60-F24B-4A54-A024-EDEEF42A46DD}" type="datetime1">
               <a:rPr lang="de-DE" smtClean="0"/>
-              <a:t>11.07.2017</a:t>
+              <a:t>12.07.2017</a:t>
             </a:fld>
             <a:endParaRPr lang="en-GB"/>
           </a:p>
@@ -4741,7 +4698,7 @@
           <a:p>
             <a:fld id="{AE51ACAA-A931-4E7A-A9D5-DB87553BA628}" type="datetime1">
               <a:rPr lang="de-DE" smtClean="0"/>
-              <a:t>11.07.2017</a:t>
+              <a:t>12.07.2017</a:t>
             </a:fld>
             <a:endParaRPr lang="en-GB"/>
           </a:p>
@@ -4859,7 +4816,7 @@
           <a:p>
             <a:fld id="{8367B9C6-B354-4A30-B2F2-087D87C6297F}" type="datetime1">
               <a:rPr lang="de-DE" smtClean="0"/>
-              <a:t>11.07.2017</a:t>
+              <a:t>12.07.2017</a:t>
             </a:fld>
             <a:endParaRPr lang="en-GB"/>
           </a:p>
@@ -4954,7 +4911,7 @@
           <a:p>
             <a:fld id="{E9345B01-5F9A-4C9C-B418-1082039ADBCE}" type="datetime1">
               <a:rPr lang="de-DE" smtClean="0"/>
-              <a:t>11.07.2017</a:t>
+              <a:t>12.07.2017</a:t>
             </a:fld>
             <a:endParaRPr lang="en-GB"/>
           </a:p>
@@ -5231,7 +5188,7 @@
           <a:p>
             <a:fld id="{C2E9B0FC-A26B-4A2B-9B63-9A6A945111D4}" type="datetime1">
               <a:rPr lang="de-DE" smtClean="0"/>
-              <a:t>11.07.2017</a:t>
+              <a:t>12.07.2017</a:t>
             </a:fld>
             <a:endParaRPr lang="en-GB"/>
           </a:p>
@@ -5488,7 +5445,7 @@
           <a:p>
             <a:fld id="{96AED3BB-9861-4EE4-9DD3-E2CBC26E331B}" type="datetime1">
               <a:rPr lang="de-DE" smtClean="0"/>
-              <a:t>11.07.2017</a:t>
+              <a:t>12.07.2017</a:t>
             </a:fld>
             <a:endParaRPr lang="en-GB"/>
           </a:p>
@@ -5699,7 +5656,7 @@
           <a:p>
             <a:fld id="{5B65F119-50B7-47E5-809C-372BD9900A65}" type="datetime1">
               <a:rPr lang="de-DE" smtClean="0"/>
-              <a:t>11.07.2017</a:t>
+              <a:t>12.07.2017</a:t>
             </a:fld>
             <a:endParaRPr lang="en-GB" dirty="0"/>
           </a:p>
@@ -6422,7 +6379,7 @@
             <a:fld id="{7A101A87-D014-4826-A19A-EE438A1F464F}" type="datetime1">
               <a:rPr lang="de-DE" sz="1600"/>
               <a:pPr/>
-              <a:t>11.07.2017</a:t>
+              <a:t>12.07.2017</a:t>
             </a:fld>
             <a:endParaRPr lang="en-GB" sz="1600" dirty="0">
               <a:solidFill>
@@ -6642,12 +6599,33 @@
             <a:endParaRPr lang="de-DE" dirty="0"/>
           </a:p>
           <a:p>
+            <a:pPr>
+              <a:buFont typeface="Wingdings" panose="05000000000000000000" pitchFamily="2" charset="2"/>
+              <a:buChar char="§"/>
+            </a:pPr>
+            <a:endParaRPr lang="de-DE" sz="1200" dirty="0"/>
+          </a:p>
+          <a:p>
+            <a:pPr>
+              <a:buFont typeface="Wingdings" panose="05000000000000000000" pitchFamily="2" charset="2"/>
+              <a:buChar char="§"/>
+            </a:pPr>
+            <a:endParaRPr lang="de-DE" sz="1000" dirty="0"/>
+          </a:p>
+          <a:p>
+            <a:pPr>
+              <a:buFont typeface="Wingdings" panose="05000000000000000000" pitchFamily="2" charset="2"/>
+              <a:buChar char="§"/>
+            </a:pPr>
+            <a:endParaRPr lang="de-DE" sz="1000" dirty="0"/>
+          </a:p>
+          <a:p>
             <a:pPr marL="0" indent="0">
               <a:buNone/>
             </a:pPr>
             <a:r>
               <a:rPr lang="de-DE" sz="1000" dirty="0"/>
-              <a:t>Bild: Rahman &amp; </a:t>
+              <a:t>Grafik: Rahman &amp; </a:t>
             </a:r>
             <a:r>
               <a:rPr lang="de-DE" sz="1000" dirty="0" err="1"/>
@@ -6696,7 +6674,7 @@
           <a:p>
             <a:fld id="{7A101A87-D014-4826-A19A-EE438A1F464F}" type="datetime1">
               <a:rPr lang="de-DE" smtClean="0"/>
-              <a:t>11.07.2017</a:t>
+              <a:t>12.07.2017</a:t>
             </a:fld>
             <a:endParaRPr lang="en-GB" dirty="0"/>
           </a:p>
@@ -6902,12 +6880,90 @@
             </a:pPr>
             <a:r>
               <a:rPr lang="de-DE" dirty="0"/>
-              <a:t>COs für variable Längen z. B. </a:t>
+              <a:t>COs für variable Längen z. B.</a:t>
+            </a:r>
+          </a:p>
+          <a:p>
+            <a:pPr lvl="1">
+              <a:buFont typeface="Wingdings" panose="05000000000000000000" pitchFamily="2" charset="2"/>
+              <a:buChar char="§"/>
+            </a:pPr>
+            <a:r>
+              <a:rPr lang="de-DE" i="1" dirty="0" err="1"/>
+              <a:t>Equal</a:t>
             </a:r>
             <a:r>
               <a:rPr lang="de-DE" i="1" dirty="0"/>
-              <a:t>Inside Crossover</a:t>
-            </a:r>
+              <a:t> Crossover</a:t>
+            </a:r>
+          </a:p>
+          <a:p>
+            <a:pPr lvl="1">
+              <a:buFont typeface="Wingdings" panose="05000000000000000000" pitchFamily="2" charset="2"/>
+              <a:buChar char="§"/>
+            </a:pPr>
+            <a:r>
+              <a:rPr lang="de-DE" i="1" dirty="0"/>
+              <a:t>Outside Crossover</a:t>
+            </a:r>
+          </a:p>
+          <a:p>
+            <a:pPr lvl="1">
+              <a:buFont typeface="Wingdings" panose="05000000000000000000" pitchFamily="2" charset="2"/>
+              <a:buChar char="§"/>
+            </a:pPr>
+            <a:r>
+              <a:rPr lang="de-DE" i="1" dirty="0"/>
+              <a:t> Inside Crossover</a:t>
+            </a:r>
+          </a:p>
+          <a:p>
+            <a:pPr marL="0" indent="0">
+              <a:buNone/>
+            </a:pPr>
+            <a:endParaRPr lang="de-DE" dirty="0"/>
+          </a:p>
+          <a:p>
+            <a:pPr marL="0" indent="0">
+              <a:buNone/>
+            </a:pPr>
+            <a:endParaRPr lang="de-DE" sz="800" dirty="0"/>
+          </a:p>
+          <a:p>
+            <a:pPr marL="0" indent="0">
+              <a:buNone/>
+            </a:pPr>
+            <a:endParaRPr lang="de-DE" dirty="0"/>
+          </a:p>
+          <a:p>
+            <a:pPr marL="0" indent="0">
+              <a:buNone/>
+            </a:pPr>
+            <a:r>
+              <a:rPr lang="de-DE" sz="1000" dirty="0"/>
+              <a:t>Grafik: </a:t>
+            </a:r>
+            <a:r>
+              <a:rPr lang="de-DE" sz="1000" dirty="0" err="1"/>
+              <a:t>Pavai</a:t>
+            </a:r>
+            <a:r>
+              <a:rPr lang="de-DE" sz="1000" dirty="0"/>
+              <a:t> &amp; </a:t>
+            </a:r>
+            <a:r>
+              <a:rPr lang="de-DE" sz="1000" dirty="0" err="1"/>
+              <a:t>Geetha</a:t>
+            </a:r>
+            <a:r>
+              <a:rPr lang="de-DE" sz="1000" dirty="0"/>
+              <a:t>, </a:t>
+            </a:r>
+            <a:r>
+              <a:rPr lang="en-US" sz="1000" dirty="0"/>
+              <a:t>A Survey on Crossover Operators, 2015</a:t>
+            </a:r>
+            <a:endParaRPr lang="de-DE" sz="1000" dirty="0"/>
           </a:p>
         </p:txBody>
       </p:sp>
@@ -6928,7 +6984,7 @@
           <a:p>
             <a:fld id="{7A101A87-D014-4826-A19A-EE438A1F464F}" type="datetime1">
               <a:rPr lang="de-DE" smtClean="0"/>
-              <a:t>11.07.2017</a:t>
+              <a:t>12.07.2017</a:t>
             </a:fld>
             <a:endParaRPr lang="en-GB" dirty="0"/>
           </a:p>
@@ -6958,6 +7014,42 @@
           </a:p>
         </p:txBody>
       </p:sp>
+      <p:pic>
+        <p:nvPicPr>
+          <p:cNvPr id="5" name="Grafik 4" descr="Bildschirmausschnitt">
+            <a:extLst>
+              <a:ext uri="{FF2B5EF4-FFF2-40B4-BE49-F238E27FC236}">
+                <a16:creationId xmlns:a16="http://schemas.microsoft.com/office/drawing/2014/main" id="{BF5C3F0F-2B9B-48BD-A67E-19C772B068F4}"/>
+              </a:ext>
+            </a:extLst>
+          </p:cNvPr>
+          <p:cNvPicPr>
+            <a:picLocks noChangeAspect="1"/>
+          </p:cNvPicPr>
+          <p:nvPr/>
+        </p:nvPicPr>
+        <p:blipFill>
+          <a:blip r:embed="rId3">
+            <a:extLst>
+              <a:ext uri="{28A0092B-C50C-407E-A947-70E740481C1C}">
+                <a14:useLocalDpi xmlns:a14="http://schemas.microsoft.com/office/drawing/2010/main" val="0"/>
+              </a:ext>
+            </a:extLst>
+          </a:blip>
+          <a:stretch>
+            <a:fillRect/>
+          </a:stretch>
+        </p:blipFill>
+        <p:spPr>
+          <a:xfrm>
+            <a:off x="5367867" y="3522133"/>
+            <a:ext cx="3581532" cy="2654830"/>
+          </a:xfrm>
+          <a:prstGeom prst="rect">
+            <a:avLst/>
+          </a:prstGeom>
+        </p:spPr>
+      </p:pic>
     </p:spTree>
     <p:extLst>
       <p:ext uri="{BB962C8B-B14F-4D97-AF65-F5344CB8AC3E}">
@@ -7117,7 +7209,7 @@
           <a:p>
             <a:fld id="{7A101A87-D014-4826-A19A-EE438A1F464F}" type="datetime1">
               <a:rPr lang="de-DE" smtClean="0"/>
-              <a:t>11.07.2017</a:t>
+              <a:t>12.07.2017</a:t>
             </a:fld>
             <a:endParaRPr lang="en-GB" dirty="0"/>
           </a:p>
@@ -7250,7 +7342,7 @@
           <a:p>
             <a:fld id="{7A101A87-D014-4826-A19A-EE438A1F464F}" type="datetime1">
               <a:rPr lang="de-DE" smtClean="0"/>
-              <a:t>11.07.2017</a:t>
+              <a:t>12.07.2017</a:t>
             </a:fld>
             <a:endParaRPr lang="en-GB" dirty="0"/>
           </a:p>
@@ -7481,7 +7573,7 @@
           <a:p>
             <a:fld id="{7A101A87-D014-4826-A19A-EE438A1F464F}" type="datetime1">
               <a:rPr lang="de-DE" smtClean="0"/>
-              <a:t>11.07.2017</a:t>
+              <a:t>12.07.2017</a:t>
             </a:fld>
             <a:endParaRPr lang="en-GB" dirty="0"/>
           </a:p>
@@ -7675,7 +7767,7 @@
           <a:p>
             <a:fld id="{7A101A87-D014-4826-A19A-EE438A1F464F}" type="datetime1">
               <a:rPr lang="de-DE" smtClean="0"/>
-              <a:t>11.07.2017</a:t>
+              <a:t>12.07.2017</a:t>
             </a:fld>
             <a:endParaRPr lang="en-GB" dirty="0"/>
           </a:p>
@@ -7885,7 +7977,7 @@
           <a:p>
             <a:fld id="{7A101A87-D014-4826-A19A-EE438A1F464F}" type="datetime1">
               <a:rPr lang="de-DE" smtClean="0"/>
-              <a:t>11.07.2017</a:t>
+              <a:t>12.07.2017</a:t>
             </a:fld>
             <a:endParaRPr lang="en-GB" dirty="0"/>
           </a:p>
@@ -7919,6 +8011,248 @@
     <p:extLst>
       <p:ext uri="{BB962C8B-B14F-4D97-AF65-F5344CB8AC3E}">
         <p14:creationId xmlns:p14="http://schemas.microsoft.com/office/powerpoint/2010/main" val="45071392"/>
+      </p:ext>
+    </p:extLst>
+  </p:cSld>
+  <p:clrMapOvr>
+    <a:masterClrMapping/>
+  </p:clrMapOvr>
+</p:sld>
+</file>
+
+<file path=ppt/slides/slide17.xml><?xml version="1.0" encoding="utf-8"?>
+<p:sld xmlns:a="http://schemas.openxmlformats.org/drawingml/2006/main" xmlns:r="http://schemas.openxmlformats.org/officeDocument/2006/relationships" xmlns:p="http://schemas.openxmlformats.org/presentationml/2006/main">
+  <p:cSld>
+    <p:spTree>
+      <p:nvGrpSpPr>
+        <p:cNvPr id="1" name=""/>
+        <p:cNvGrpSpPr/>
+        <p:nvPr/>
+      </p:nvGrpSpPr>
+      <p:grpSpPr>
+        <a:xfrm>
+          <a:off x="0" y="0"/>
+          <a:ext cx="0" cy="0"/>
+          <a:chOff x="0" y="0"/>
+          <a:chExt cx="0" cy="0"/>
+        </a:xfrm>
+      </p:grpSpPr>
+      <p:sp>
+        <p:nvSpPr>
+          <p:cNvPr id="2" name="Titel 1">
+            <a:extLst>
+              <a:ext uri="{FF2B5EF4-FFF2-40B4-BE49-F238E27FC236}">
+                <a16:creationId xmlns:a16="http://schemas.microsoft.com/office/drawing/2014/main" id="{A3870358-2C64-4AAE-8470-C6B326A24425}"/>
+              </a:ext>
+            </a:extLst>
+          </p:cNvPr>
+          <p:cNvSpPr>
+            <a:spLocks noGrp="1"/>
+          </p:cNvSpPr>
+          <p:nvPr>
+            <p:ph type="title"/>
+          </p:nvPr>
+        </p:nvSpPr>
+        <p:spPr/>
+        <p:txBody>
+          <a:bodyPr/>
+          <a:lstStyle/>
+          <a:p>
+            <a:r>
+              <a:rPr lang="de-DE" dirty="0"/>
+              <a:t>Fuzzy-Logik</a:t>
+            </a:r>
+          </a:p>
+        </p:txBody>
+      </p:sp>
+      <p:sp>
+        <p:nvSpPr>
+          <p:cNvPr id="3" name="Inhaltsplatzhalter 2">
+            <a:extLst>
+              <a:ext uri="{FF2B5EF4-FFF2-40B4-BE49-F238E27FC236}">
+                <a16:creationId xmlns:a16="http://schemas.microsoft.com/office/drawing/2014/main" id="{0A3B48FB-94C6-48D9-A62A-6577AC00BAAD}"/>
+              </a:ext>
+            </a:extLst>
+          </p:cNvPr>
+          <p:cNvSpPr>
+            <a:spLocks noGrp="1"/>
+          </p:cNvSpPr>
+          <p:nvPr>
+            <p:ph idx="1"/>
+          </p:nvPr>
+        </p:nvSpPr>
+        <p:spPr/>
+        <p:txBody>
+          <a:bodyPr>
+            <a:normAutofit/>
+          </a:bodyPr>
+          <a:lstStyle/>
+          <a:p>
+            <a:r>
+              <a:rPr lang="de-DE" dirty="0"/>
+              <a:t>Unscharfe, verschwommene Logik</a:t>
+            </a:r>
+          </a:p>
+          <a:p>
+            <a:r>
+              <a:rPr lang="de-DE" dirty="0"/>
+              <a:t>Basiert auf mehreren unscharfen Mengen</a:t>
+            </a:r>
+          </a:p>
+          <a:p>
+            <a:r>
+              <a:rPr lang="de-DE" dirty="0"/>
+              <a:t>Kommt vor allem im Bereich der Regelungstechnik zum Einsatz</a:t>
+            </a:r>
+          </a:p>
+          <a:p>
+            <a:endParaRPr lang="de-DE" dirty="0"/>
+          </a:p>
+          <a:p>
+            <a:endParaRPr lang="de-DE" dirty="0"/>
+          </a:p>
+          <a:p>
+            <a:endParaRPr lang="de-DE" dirty="0"/>
+          </a:p>
+          <a:p>
+            <a:endParaRPr lang="de-DE" dirty="0"/>
+          </a:p>
+          <a:p>
+            <a:endParaRPr lang="de-DE" dirty="0"/>
+          </a:p>
+          <a:p>
+            <a:pPr marL="0" indent="0">
+              <a:buNone/>
+            </a:pPr>
+            <a:endParaRPr lang="de-DE" dirty="0"/>
+          </a:p>
+          <a:p>
+            <a:endParaRPr lang="de-DE" dirty="0"/>
+          </a:p>
+          <a:p>
+            <a:endParaRPr lang="de-DE" sz="1050" dirty="0"/>
+          </a:p>
+          <a:p>
+            <a:pPr marL="0" indent="0">
+              <a:buNone/>
+            </a:pPr>
+            <a:r>
+              <a:rPr lang="de-DE" sz="1000" dirty="0"/>
+              <a:t>Grafik: Wikimedia Commons,</a:t>
+            </a:r>
+            <a:br>
+              <a:rPr lang="de-DE" sz="1000" dirty="0"/>
+            </a:br>
+            <a:r>
+              <a:rPr lang="de-DE" sz="1000" dirty="0" err="1"/>
+              <a:t>Fullofstars</a:t>
+            </a:r>
+            <a:r>
+              <a:rPr lang="de-DE" sz="1000" dirty="0"/>
+              <a:t>, CC-BY-SA 3.0</a:t>
+            </a:r>
+          </a:p>
+        </p:txBody>
+      </p:sp>
+      <p:sp>
+        <p:nvSpPr>
+          <p:cNvPr id="4" name="Foliennummernplatzhalter 3">
+            <a:extLst>
+              <a:ext uri="{FF2B5EF4-FFF2-40B4-BE49-F238E27FC236}">
+                <a16:creationId xmlns:a16="http://schemas.microsoft.com/office/drawing/2014/main" id="{36485AA9-B483-4104-A3AD-DA83CB8907EB}"/>
+              </a:ext>
+            </a:extLst>
+          </p:cNvPr>
+          <p:cNvSpPr>
+            <a:spLocks noGrp="1"/>
+          </p:cNvSpPr>
+          <p:nvPr>
+            <p:ph type="sldNum" sz="quarter" idx="12"/>
+          </p:nvPr>
+        </p:nvSpPr>
+        <p:spPr/>
+        <p:txBody>
+          <a:bodyPr/>
+          <a:lstStyle/>
+          <a:p>
+            <a:fld id="{D28BEBC9-775D-4085-B138-BED27E854DA8}" type="slidenum">
+              <a:rPr lang="en-GB" smtClean="0"/>
+              <a:pPr/>
+              <a:t>17</a:t>
+            </a:fld>
+            <a:endParaRPr lang="en-GB"/>
+          </a:p>
+        </p:txBody>
+      </p:sp>
+      <p:sp>
+        <p:nvSpPr>
+          <p:cNvPr id="5" name="Datumsplatzhalter 4">
+            <a:extLst>
+              <a:ext uri="{FF2B5EF4-FFF2-40B4-BE49-F238E27FC236}">
+                <a16:creationId xmlns:a16="http://schemas.microsoft.com/office/drawing/2014/main" id="{DDD5A459-476E-459B-BC9D-7CE591EA018A}"/>
+              </a:ext>
+            </a:extLst>
+          </p:cNvPr>
+          <p:cNvSpPr>
+            <a:spLocks noGrp="1"/>
+          </p:cNvSpPr>
+          <p:nvPr>
+            <p:ph type="dt" sz="half" idx="10"/>
+          </p:nvPr>
+        </p:nvSpPr>
+        <p:spPr/>
+        <p:txBody>
+          <a:bodyPr/>
+          <a:lstStyle/>
+          <a:p>
+            <a:fld id="{9575385B-867E-403C-90F0-311C74870C67}" type="datetime1">
+              <a:rPr lang="de-DE" smtClean="0"/>
+              <a:t>12.07.2017</a:t>
+            </a:fld>
+            <a:endParaRPr lang="en-GB" dirty="0"/>
+          </a:p>
+        </p:txBody>
+      </p:sp>
+      <p:pic>
+        <p:nvPicPr>
+          <p:cNvPr id="9" name="Grafik 8">
+            <a:extLst>
+              <a:ext uri="{FF2B5EF4-FFF2-40B4-BE49-F238E27FC236}">
+                <a16:creationId xmlns:a16="http://schemas.microsoft.com/office/drawing/2014/main" id="{EC7B8963-B9B2-4A36-A0FE-F436FDBA130F}"/>
+              </a:ext>
+            </a:extLst>
+          </p:cNvPr>
+          <p:cNvPicPr>
+            <a:picLocks noChangeAspect="1"/>
+          </p:cNvPicPr>
+          <p:nvPr/>
+        </p:nvPicPr>
+        <p:blipFill>
+          <a:blip r:embed="rId2">
+            <a:extLst>
+              <a:ext uri="{28A0092B-C50C-407E-A947-70E740481C1C}">
+                <a14:useLocalDpi xmlns:a14="http://schemas.microsoft.com/office/drawing/2010/main" val="0"/>
+              </a:ext>
+            </a:extLst>
+          </a:blip>
+          <a:stretch>
+            <a:fillRect/>
+          </a:stretch>
+        </p:blipFill>
+        <p:spPr>
+          <a:xfrm>
+            <a:off x="3282950" y="4052609"/>
+            <a:ext cx="5232400" cy="2124354"/>
+          </a:xfrm>
+          <a:prstGeom prst="rect">
+            <a:avLst/>
+          </a:prstGeom>
+        </p:spPr>
+      </p:pic>
+    </p:spTree>
+    <p:extLst>
+      <p:ext uri="{BB962C8B-B14F-4D97-AF65-F5344CB8AC3E}">
+        <p14:creationId xmlns:p14="http://schemas.microsoft.com/office/powerpoint/2010/main" val="955264045"/>
       </p:ext>
     </p:extLst>
   </p:cSld>
@@ -8076,7 +8410,7 @@
           <a:p>
             <a:fld id="{7A101A87-D014-4826-A19A-EE438A1F464F}" type="datetime1">
               <a:rPr lang="de-DE" smtClean="0"/>
-              <a:t>11.07.2017</a:t>
+              <a:t>12.07.2017</a:t>
             </a:fld>
             <a:endParaRPr lang="en-GB" dirty="0"/>
           </a:p>
@@ -8176,7 +8510,7 @@
           <a:p>
             <a:fld id="{7A101A87-D014-4826-A19A-EE438A1F464F}" type="datetime1">
               <a:rPr lang="de-DE" smtClean="0"/>
-              <a:t>11.07.2017</a:t>
+              <a:t>12.07.2017</a:t>
             </a:fld>
             <a:endParaRPr lang="en-GB" dirty="0"/>
           </a:p>
@@ -8400,7 +8734,7 @@
           <a:p>
             <a:fld id="{7A101A87-D014-4826-A19A-EE438A1F464F}" type="datetime1">
               <a:rPr lang="de-DE" smtClean="0"/>
-              <a:t>11.07.2017</a:t>
+              <a:t>12.07.2017</a:t>
             </a:fld>
             <a:endParaRPr lang="en-GB" dirty="0"/>
           </a:p>
@@ -8685,7 +9019,7 @@
           <a:p>
             <a:fld id="{7A101A87-D014-4826-A19A-EE438A1F464F}" type="datetime1">
               <a:rPr lang="de-DE" smtClean="0"/>
-              <a:t>11.07.2017</a:t>
+              <a:t>12.07.2017</a:t>
             </a:fld>
             <a:endParaRPr lang="en-GB" dirty="0"/>
           </a:p>
@@ -8929,7 +9263,7 @@
           <a:p>
             <a:fld id="{7A101A87-D014-4826-A19A-EE438A1F464F}" type="datetime1">
               <a:rPr lang="de-DE" smtClean="0"/>
-              <a:t>11.07.2017</a:t>
+              <a:t>12.07.2017</a:t>
             </a:fld>
             <a:endParaRPr lang="en-GB" dirty="0"/>
           </a:p>
@@ -9177,7 +9511,7 @@
           <a:p>
             <a:fld id="{7A101A87-D014-4826-A19A-EE438A1F464F}" type="datetime1">
               <a:rPr lang="de-DE" smtClean="0"/>
-              <a:t>11.07.2017</a:t>
+              <a:t>12.07.2017</a:t>
             </a:fld>
             <a:endParaRPr lang="en-GB" dirty="0"/>
           </a:p>
@@ -9425,7 +9759,7 @@
             </a:pPr>
             <a:r>
               <a:rPr lang="de-DE" sz="1000" dirty="0"/>
-              <a:t>Bild: Mumford, </a:t>
+              <a:t>Grafik: Mumford, </a:t>
             </a:r>
             <a:r>
               <a:rPr lang="en-US" sz="1000" dirty="0"/>
@@ -9462,7 +9796,7 @@
           <a:p>
             <a:fld id="{7A101A87-D014-4826-A19A-EE438A1F464F}" type="datetime1">
               <a:rPr lang="de-DE" smtClean="0"/>
-              <a:t>11.07.2017</a:t>
+              <a:t>12.07.2017</a:t>
             </a:fld>
             <a:endParaRPr lang="en-GB" dirty="0"/>
           </a:p>
@@ -9736,7 +10070,7 @@
           <a:p>
             <a:fld id="{7A101A87-D014-4826-A19A-EE438A1F464F}" type="datetime1">
               <a:rPr lang="de-DE" smtClean="0"/>
-              <a:t>11.07.2017</a:t>
+              <a:t>12.07.2017</a:t>
             </a:fld>
             <a:endParaRPr lang="en-GB" dirty="0"/>
           </a:p>

</xml_diff>